<commit_message>
-ExamTags ok - Messages ... working...
</commit_message>
<xml_diff>
--- a/ExaminerB/.appCatalog/ExaminerB notes 1404.pptx
+++ b/ExaminerB/.appCatalog/ExaminerB notes 1404.pptx
@@ -281,7 +281,7 @@
             </a:pPr>
             <a:fld id="{BCC18F51-09EC-435C-A3BA-64A766E099C0}" type="datetimeFigureOut">
               <a:rPr lang="fa-IR"/>
-              <a:t>29/05/1447</a:t>
+              <a:t>07/06/1447</a:t>
             </a:fld>
             <a:endParaRPr/>
           </a:p>
@@ -460,7 +460,7 @@
             </a:pPr>
             <a:fld id="{BCC18F51-09EC-435C-A3BA-64A766E099C0}" type="datetimeFigureOut">
               <a:rPr lang="fa-IR"/>
-              <a:t>29/05/1447</a:t>
+              <a:t>07/06/1447</a:t>
             </a:fld>
             <a:endParaRPr/>
           </a:p>
@@ -649,7 +649,7 @@
             </a:pPr>
             <a:fld id="{BCC18F51-09EC-435C-A3BA-64A766E099C0}" type="datetimeFigureOut">
               <a:rPr lang="fa-IR"/>
-              <a:t>29/05/1447</a:t>
+              <a:t>07/06/1447</a:t>
             </a:fld>
             <a:endParaRPr/>
           </a:p>
@@ -828,7 +828,7 @@
             </a:pPr>
             <a:fld id="{BCC18F51-09EC-435C-A3BA-64A766E099C0}" type="datetimeFigureOut">
               <a:rPr lang="fa-IR"/>
-              <a:t>29/05/1447</a:t>
+              <a:t>07/06/1447</a:t>
             </a:fld>
             <a:endParaRPr/>
           </a:p>
@@ -1080,7 +1080,7 @@
             </a:pPr>
             <a:fld id="{BCC18F51-09EC-435C-A3BA-64A766E099C0}" type="datetimeFigureOut">
               <a:rPr lang="fa-IR"/>
-              <a:t>29/05/1447</a:t>
+              <a:t>07/06/1447</a:t>
             </a:fld>
             <a:endParaRPr/>
           </a:p>
@@ -1325,7 +1325,7 @@
             </a:pPr>
             <a:fld id="{BCC18F51-09EC-435C-A3BA-64A766E099C0}" type="datetimeFigureOut">
               <a:rPr lang="fa-IR"/>
-              <a:t>29/05/1447</a:t>
+              <a:t>07/06/1447</a:t>
             </a:fld>
             <a:endParaRPr/>
           </a:p>
@@ -1707,7 +1707,7 @@
             </a:pPr>
             <a:fld id="{BCC18F51-09EC-435C-A3BA-64A766E099C0}" type="datetimeFigureOut">
               <a:rPr lang="fa-IR"/>
-              <a:t>29/05/1447</a:t>
+              <a:t>07/06/1447</a:t>
             </a:fld>
             <a:endParaRPr/>
           </a:p>
@@ -1830,7 +1830,7 @@
             </a:pPr>
             <a:fld id="{BCC18F51-09EC-435C-A3BA-64A766E099C0}" type="datetimeFigureOut">
               <a:rPr lang="fa-IR"/>
-              <a:t>29/05/1447</a:t>
+              <a:t>07/06/1447</a:t>
             </a:fld>
             <a:endParaRPr/>
           </a:p>
@@ -1929,7 +1929,7 @@
             </a:pPr>
             <a:fld id="{BCC18F51-09EC-435C-A3BA-64A766E099C0}" type="datetimeFigureOut">
               <a:rPr lang="fa-IR"/>
-              <a:t>29/05/1447</a:t>
+              <a:t>07/06/1447</a:t>
             </a:fld>
             <a:endParaRPr/>
           </a:p>
@@ -2216,7 +2216,7 @@
             </a:pPr>
             <a:fld id="{BCC18F51-09EC-435C-A3BA-64A766E099C0}" type="datetimeFigureOut">
               <a:rPr lang="fa-IR"/>
-              <a:t>29/05/1447</a:t>
+              <a:t>07/06/1447</a:t>
             </a:fld>
             <a:endParaRPr/>
           </a:p>
@@ -2480,7 +2480,7 @@
             </a:pPr>
             <a:fld id="{BCC18F51-09EC-435C-A3BA-64A766E099C0}" type="datetimeFigureOut">
               <a:rPr lang="fa-IR"/>
-              <a:t>29/05/1447</a:t>
+              <a:t>07/06/1447</a:t>
             </a:fld>
             <a:endParaRPr/>
           </a:p>
@@ -2702,7 +2702,7 @@
             </a:pPr>
             <a:fld id="{BCC18F51-09EC-435C-A3BA-64A766E099C0}" type="datetimeFigureOut">
               <a:rPr lang="fa-IR"/>
-              <a:t>29/05/1447</a:t>
+              <a:t>07/06/1447</a:t>
             </a:fld>
             <a:endParaRPr/>
           </a:p>
@@ -5231,8 +5231,8 @@
         </p:nvSpPr>
         <p:spPr>
           <a:xfrm>
-            <a:off x="1282615" y="1942011"/>
-            <a:ext cx="1506140" cy="630039"/>
+            <a:off x="1282615" y="1942012"/>
+            <a:ext cx="1506140" cy="533862"/>
           </a:xfrm>
           <a:prstGeom prst="borderCallout2">
             <a:avLst>
@@ -5240,8 +5240,8 @@
               <a:gd name="adj2" fmla="val 100433"/>
               <a:gd name="adj3" fmla="val 50700"/>
               <a:gd name="adj4" fmla="val 115464"/>
-              <a:gd name="adj5" fmla="val 25213"/>
-              <a:gd name="adj6" fmla="val 122747"/>
+              <a:gd name="adj5" fmla="val 27228"/>
+              <a:gd name="adj6" fmla="val 123461"/>
             </a:avLst>
           </a:prstGeom>
           <a:noFill/>
@@ -5269,7 +5269,7 @@
           <a:bodyPr rtlCol="1" anchor="ctr"/>
           <a:lstStyle/>
           <a:p>
-            <a:pPr>
+            <a:pPr algn="l" rtl="0">
               <a:buNone/>
             </a:pPr>
             <a:r>
@@ -5288,7 +5288,7 @@
             </a:r>
           </a:p>
           <a:p>
-            <a:pPr>
+            <a:pPr algn="l" rtl="0">
               <a:buNone/>
             </a:pPr>
             <a:r>
@@ -5303,15 +5303,15 @@
                 <a:ea typeface="Calibri" panose="020F0502020204030204" pitchFamily="34" charset="0"/>
                 <a:cs typeface="Calibri Light" panose="020F0302020204030204" pitchFamily="34" charset="0"/>
               </a:rPr>
-              <a:t>2 sample tests mode</a:t>
-            </a:r>
-          </a:p>
-          <a:p>
-            <a:pPr>
+              <a:t>2 training mode</a:t>
+            </a:r>
+          </a:p>
+          <a:p>
+            <a:pPr algn="l" rtl="0">
               <a:buNone/>
             </a:pPr>
             <a:r>
-              <a:rPr lang="en-US" sz="900" kern="100">
+              <a:rPr lang="en-US" sz="900">
                 <a:solidFill>
                   <a:schemeClr val="accent6">
                     <a:lumMod val="50000"/>
@@ -5322,26 +5322,7 @@
                 <a:ea typeface="Calibri" panose="020F0502020204030204" pitchFamily="34" charset="0"/>
                 <a:cs typeface="Calibri Light" panose="020F0302020204030204" pitchFamily="34" charset="0"/>
               </a:rPr>
-              <a:t>4 training mode</a:t>
-            </a:r>
-          </a:p>
-          <a:p>
-            <a:pPr>
-              <a:buNone/>
-            </a:pPr>
-            <a:r>
-              <a:rPr lang="en-US" sz="900">
-                <a:solidFill>
-                  <a:schemeClr val="accent6">
-                    <a:lumMod val="50000"/>
-                  </a:schemeClr>
-                </a:solidFill>
-                <a:effectLst/>
-                <a:latin typeface="Consolas" panose="020B0609020204030204" pitchFamily="49" charset="0"/>
-                <a:ea typeface="Calibri" panose="020F0502020204030204" pitchFamily="34" charset="0"/>
-                <a:cs typeface="Calibri Light" panose="020F0302020204030204" pitchFamily="34" charset="0"/>
-              </a:rPr>
-              <a:t>8 real exam mode</a:t>
+              <a:t>4 real exam mode</a:t>
             </a:r>
             <a:endParaRPr lang="fa-IR" sz="900">
               <a:solidFill>

</xml_diff>

<commit_message>
-improving codes on Messages at Student side
</commit_message>
<xml_diff>
--- a/ExaminerB/.appCatalog/ExaminerB notes 1404.pptx
+++ b/ExaminerB/.appCatalog/ExaminerB notes 1404.pptx
@@ -281,7 +281,7 @@
             </a:pPr>
             <a:fld id="{BCC18F51-09EC-435C-A3BA-64A766E099C0}" type="datetimeFigureOut">
               <a:rPr lang="fa-IR"/>
-              <a:t>07/06/1447</a:t>
+              <a:t>10/06/1447</a:t>
             </a:fld>
             <a:endParaRPr/>
           </a:p>
@@ -460,7 +460,7 @@
             </a:pPr>
             <a:fld id="{BCC18F51-09EC-435C-A3BA-64A766E099C0}" type="datetimeFigureOut">
               <a:rPr lang="fa-IR"/>
-              <a:t>07/06/1447</a:t>
+              <a:t>10/06/1447</a:t>
             </a:fld>
             <a:endParaRPr/>
           </a:p>
@@ -649,7 +649,7 @@
             </a:pPr>
             <a:fld id="{BCC18F51-09EC-435C-A3BA-64A766E099C0}" type="datetimeFigureOut">
               <a:rPr lang="fa-IR"/>
-              <a:t>07/06/1447</a:t>
+              <a:t>10/06/1447</a:t>
             </a:fld>
             <a:endParaRPr/>
           </a:p>
@@ -828,7 +828,7 @@
             </a:pPr>
             <a:fld id="{BCC18F51-09EC-435C-A3BA-64A766E099C0}" type="datetimeFigureOut">
               <a:rPr lang="fa-IR"/>
-              <a:t>07/06/1447</a:t>
+              <a:t>10/06/1447</a:t>
             </a:fld>
             <a:endParaRPr/>
           </a:p>
@@ -1080,7 +1080,7 @@
             </a:pPr>
             <a:fld id="{BCC18F51-09EC-435C-A3BA-64A766E099C0}" type="datetimeFigureOut">
               <a:rPr lang="fa-IR"/>
-              <a:t>07/06/1447</a:t>
+              <a:t>10/06/1447</a:t>
             </a:fld>
             <a:endParaRPr/>
           </a:p>
@@ -1325,7 +1325,7 @@
             </a:pPr>
             <a:fld id="{BCC18F51-09EC-435C-A3BA-64A766E099C0}" type="datetimeFigureOut">
               <a:rPr lang="fa-IR"/>
-              <a:t>07/06/1447</a:t>
+              <a:t>10/06/1447</a:t>
             </a:fld>
             <a:endParaRPr/>
           </a:p>
@@ -1707,7 +1707,7 @@
             </a:pPr>
             <a:fld id="{BCC18F51-09EC-435C-A3BA-64A766E099C0}" type="datetimeFigureOut">
               <a:rPr lang="fa-IR"/>
-              <a:t>07/06/1447</a:t>
+              <a:t>10/06/1447</a:t>
             </a:fld>
             <a:endParaRPr/>
           </a:p>
@@ -1830,7 +1830,7 @@
             </a:pPr>
             <a:fld id="{BCC18F51-09EC-435C-A3BA-64A766E099C0}" type="datetimeFigureOut">
               <a:rPr lang="fa-IR"/>
-              <a:t>07/06/1447</a:t>
+              <a:t>10/06/1447</a:t>
             </a:fld>
             <a:endParaRPr/>
           </a:p>
@@ -1929,7 +1929,7 @@
             </a:pPr>
             <a:fld id="{BCC18F51-09EC-435C-A3BA-64A766E099C0}" type="datetimeFigureOut">
               <a:rPr lang="fa-IR"/>
-              <a:t>07/06/1447</a:t>
+              <a:t>10/06/1447</a:t>
             </a:fld>
             <a:endParaRPr/>
           </a:p>
@@ -2216,7 +2216,7 @@
             </a:pPr>
             <a:fld id="{BCC18F51-09EC-435C-A3BA-64A766E099C0}" type="datetimeFigureOut">
               <a:rPr lang="fa-IR"/>
-              <a:t>07/06/1447</a:t>
+              <a:t>10/06/1447</a:t>
             </a:fld>
             <a:endParaRPr/>
           </a:p>
@@ -2480,7 +2480,7 @@
             </a:pPr>
             <a:fld id="{BCC18F51-09EC-435C-A3BA-64A766E099C0}" type="datetimeFigureOut">
               <a:rPr lang="fa-IR"/>
-              <a:t>07/06/1447</a:t>
+              <a:t>10/06/1447</a:t>
             </a:fld>
             <a:endParaRPr/>
           </a:p>
@@ -2702,7 +2702,7 @@
             </a:pPr>
             <a:fld id="{BCC18F51-09EC-435C-A3BA-64A766E099C0}" type="datetimeFigureOut">
               <a:rPr lang="fa-IR"/>
-              <a:t>07/06/1447</a:t>
+              <a:t>10/06/1447</a:t>
             </a:fld>
             <a:endParaRPr/>
           </a:p>
@@ -8306,6 +8306,173 @@
               <a:latin typeface="Segoe UI" panose="020B0502040204020203" pitchFamily="34" charset="0"/>
               <a:cs typeface="Segoe UI" panose="020B0502040204020203" pitchFamily="34" charset="0"/>
             </a:endParaRPr>
+          </a:p>
+        </p:txBody>
+      </p:sp>
+      <p:sp>
+        <p:nvSpPr>
+          <p:cNvPr id="15" name="Callout: Bent Line 14">
+            <a:extLst>
+              <a:ext uri="{FF2B5EF4-FFF2-40B4-BE49-F238E27FC236}">
+                <a16:creationId xmlns:a16="http://schemas.microsoft.com/office/drawing/2014/main" id="{67A1F549-A3AC-7F1E-3DDA-FEE24206EC9D}"/>
+              </a:ext>
+            </a:extLst>
+          </p:cNvPr>
+          <p:cNvSpPr/>
+          <p:nvPr/>
+        </p:nvSpPr>
+        <p:spPr bwMode="auto">
+          <a:xfrm>
+            <a:off x="8372104" y="5736724"/>
+            <a:ext cx="1359523" cy="873690"/>
+          </a:xfrm>
+          <a:prstGeom prst="borderCallout2">
+            <a:avLst>
+              <a:gd name="adj1" fmla="val -2091"/>
+              <a:gd name="adj2" fmla="val 22525"/>
+              <a:gd name="adj3" fmla="val -10209"/>
+              <a:gd name="adj4" fmla="val 21991"/>
+              <a:gd name="adj5" fmla="val -23593"/>
+              <a:gd name="adj6" fmla="val 8096"/>
+            </a:avLst>
+          </a:prstGeom>
+          <a:noFill/>
+          <a:ln>
+            <a:prstDash val="dash"/>
+          </a:ln>
+        </p:spPr>
+        <p:style>
+          <a:lnRef idx="2">
+            <a:schemeClr val="accent1">
+              <a:shade val="15000"/>
+            </a:schemeClr>
+          </a:lnRef>
+          <a:fillRef idx="1">
+            <a:schemeClr val="accent1"/>
+          </a:fillRef>
+          <a:effectRef idx="0">
+            <a:schemeClr val="accent1"/>
+          </a:effectRef>
+          <a:fontRef idx="minor">
+            <a:schemeClr val="lt1"/>
+          </a:fontRef>
+        </p:style>
+        <p:txBody>
+          <a:bodyPr rtlCol="1" anchor="ctr"/>
+          <a:lstStyle/>
+          <a:p>
+            <a:pPr rtl="0">
+              <a:buNone/>
+            </a:pPr>
+            <a:r>
+              <a:rPr lang="en-US" sz="900" kern="100">
+                <a:solidFill>
+                  <a:schemeClr val="accent6">
+                    <a:lumMod val="50000"/>
+                  </a:schemeClr>
+                </a:solidFill>
+                <a:effectLst/>
+                <a:latin typeface="Consolas" panose="020B0609020204030204" pitchFamily="49" charset="0"/>
+                <a:ea typeface="Calibri" panose="020F0502020204030204" pitchFamily="34" charset="0"/>
+                <a:cs typeface="Calibri Light" panose="020F0302020204030204" pitchFamily="34" charset="0"/>
+              </a:rPr>
+              <a:t>1  Read</a:t>
+            </a:r>
+          </a:p>
+          <a:p>
+            <a:pPr rtl="0">
+              <a:buNone/>
+            </a:pPr>
+            <a:r>
+              <a:rPr lang="en-US" sz="900" kern="100">
+                <a:solidFill>
+                  <a:schemeClr val="accent6">
+                    <a:lumMod val="50000"/>
+                  </a:schemeClr>
+                </a:solidFill>
+                <a:effectLst/>
+                <a:latin typeface="Consolas" panose="020B0609020204030204" pitchFamily="49" charset="0"/>
+                <a:ea typeface="Calibri" panose="020F0502020204030204" pitchFamily="34" charset="0"/>
+                <a:cs typeface="Calibri Light" panose="020F0302020204030204" pitchFamily="34" charset="0"/>
+              </a:rPr>
+              <a:t>2  bookmarked</a:t>
+            </a:r>
+          </a:p>
+          <a:p>
+            <a:pPr rtl="0">
+              <a:buNone/>
+            </a:pPr>
+            <a:r>
+              <a:rPr lang="en-US" sz="900" kern="100">
+                <a:solidFill>
+                  <a:schemeClr val="accent6">
+                    <a:lumMod val="50000"/>
+                  </a:schemeClr>
+                </a:solidFill>
+                <a:effectLst/>
+                <a:latin typeface="Consolas" panose="020B0609020204030204" pitchFamily="49" charset="0"/>
+                <a:ea typeface="Calibri" panose="020F0502020204030204" pitchFamily="34" charset="0"/>
+                <a:cs typeface="Calibri Light" panose="020F0302020204030204" pitchFamily="34" charset="0"/>
+              </a:rPr>
+              <a:t>4  Deleted</a:t>
+            </a:r>
+          </a:p>
+          <a:p>
+            <a:pPr rtl="0">
+              <a:buNone/>
+            </a:pPr>
+            <a:r>
+              <a:rPr lang="en-US" sz="900" kern="100">
+                <a:solidFill>
+                  <a:schemeClr val="accent6">
+                    <a:lumMod val="50000"/>
+                  </a:schemeClr>
+                </a:solidFill>
+                <a:effectLst/>
+                <a:latin typeface="Consolas" panose="020B0609020204030204" pitchFamily="49" charset="0"/>
+                <a:ea typeface="Calibri" panose="020F0502020204030204" pitchFamily="34" charset="0"/>
+                <a:cs typeface="Calibri Light" panose="020F0302020204030204" pitchFamily="34" charset="0"/>
+              </a:rPr>
+              <a:t>8  Ans:Yes</a:t>
+            </a:r>
+          </a:p>
+          <a:p>
+            <a:pPr rtl="0">
+              <a:buNone/>
+            </a:pPr>
+            <a:r>
+              <a:rPr lang="en-US" sz="900" kern="100">
+                <a:solidFill>
+                  <a:schemeClr val="accent6">
+                    <a:lumMod val="50000"/>
+                  </a:schemeClr>
+                </a:solidFill>
+                <a:effectLst/>
+                <a:latin typeface="Consolas" panose="020B0609020204030204" pitchFamily="49" charset="0"/>
+                <a:ea typeface="Calibri" panose="020F0502020204030204" pitchFamily="34" charset="0"/>
+                <a:cs typeface="Calibri Light" panose="020F0302020204030204" pitchFamily="34" charset="0"/>
+              </a:rPr>
+              <a:t>16 Ans:No</a:t>
+            </a:r>
+          </a:p>
+          <a:p>
+            <a:pPr rtl="0">
+              <a:buNone/>
+            </a:pPr>
+            <a:r>
+              <a:rPr lang="en-US" sz="900" kern="100">
+                <a:solidFill>
+                  <a:schemeClr val="accent6">
+                    <a:lumMod val="50000"/>
+                  </a:schemeClr>
+                </a:solidFill>
+                <a:effectLst/>
+                <a:latin typeface="Consolas" panose="020B0609020204030204" pitchFamily="49" charset="0"/>
+                <a:ea typeface="Calibri" panose="020F0502020204030204" pitchFamily="34" charset="0"/>
+                <a:cs typeface="Calibri Light" panose="020F0302020204030204" pitchFamily="34" charset="0"/>
+              </a:rPr>
+              <a:t>32 TypeIsFeedback</a:t>
+            </a:r>
           </a:p>
         </p:txBody>
       </p:sp>

</xml_diff>

<commit_message>
- paginate tests  in T_ReportTests - select tests in T_ReportTests - collect selected tests Ids
</commit_message>
<xml_diff>
--- a/ExaminerB/.appCatalog/ExaminerB notes 1404.pptx
+++ b/ExaminerB/.appCatalog/ExaminerB notes 1404.pptx
@@ -281,7 +281,7 @@
             </a:pPr>
             <a:fld id="{BCC18F51-09EC-435C-A3BA-64A766E099C0}" type="datetimeFigureOut">
               <a:rPr lang="fa-IR"/>
-              <a:t>10/06/1447</a:t>
+              <a:t>21/06/1447</a:t>
             </a:fld>
             <a:endParaRPr/>
           </a:p>
@@ -460,7 +460,7 @@
             </a:pPr>
             <a:fld id="{BCC18F51-09EC-435C-A3BA-64A766E099C0}" type="datetimeFigureOut">
               <a:rPr lang="fa-IR"/>
-              <a:t>10/06/1447</a:t>
+              <a:t>21/06/1447</a:t>
             </a:fld>
             <a:endParaRPr/>
           </a:p>
@@ -649,7 +649,7 @@
             </a:pPr>
             <a:fld id="{BCC18F51-09EC-435C-A3BA-64A766E099C0}" type="datetimeFigureOut">
               <a:rPr lang="fa-IR"/>
-              <a:t>10/06/1447</a:t>
+              <a:t>21/06/1447</a:t>
             </a:fld>
             <a:endParaRPr/>
           </a:p>
@@ -828,7 +828,7 @@
             </a:pPr>
             <a:fld id="{BCC18F51-09EC-435C-A3BA-64A766E099C0}" type="datetimeFigureOut">
               <a:rPr lang="fa-IR"/>
-              <a:t>10/06/1447</a:t>
+              <a:t>21/06/1447</a:t>
             </a:fld>
             <a:endParaRPr/>
           </a:p>
@@ -1080,7 +1080,7 @@
             </a:pPr>
             <a:fld id="{BCC18F51-09EC-435C-A3BA-64A766E099C0}" type="datetimeFigureOut">
               <a:rPr lang="fa-IR"/>
-              <a:t>10/06/1447</a:t>
+              <a:t>21/06/1447</a:t>
             </a:fld>
             <a:endParaRPr/>
           </a:p>
@@ -1325,7 +1325,7 @@
             </a:pPr>
             <a:fld id="{BCC18F51-09EC-435C-A3BA-64A766E099C0}" type="datetimeFigureOut">
               <a:rPr lang="fa-IR"/>
-              <a:t>10/06/1447</a:t>
+              <a:t>21/06/1447</a:t>
             </a:fld>
             <a:endParaRPr/>
           </a:p>
@@ -1707,7 +1707,7 @@
             </a:pPr>
             <a:fld id="{BCC18F51-09EC-435C-A3BA-64A766E099C0}" type="datetimeFigureOut">
               <a:rPr lang="fa-IR"/>
-              <a:t>10/06/1447</a:t>
+              <a:t>21/06/1447</a:t>
             </a:fld>
             <a:endParaRPr/>
           </a:p>
@@ -1830,7 +1830,7 @@
             </a:pPr>
             <a:fld id="{BCC18F51-09EC-435C-A3BA-64A766E099C0}" type="datetimeFigureOut">
               <a:rPr lang="fa-IR"/>
-              <a:t>10/06/1447</a:t>
+              <a:t>21/06/1447</a:t>
             </a:fld>
             <a:endParaRPr/>
           </a:p>
@@ -1929,7 +1929,7 @@
             </a:pPr>
             <a:fld id="{BCC18F51-09EC-435C-A3BA-64A766E099C0}" type="datetimeFigureOut">
               <a:rPr lang="fa-IR"/>
-              <a:t>10/06/1447</a:t>
+              <a:t>21/06/1447</a:t>
             </a:fld>
             <a:endParaRPr/>
           </a:p>
@@ -2216,7 +2216,7 @@
             </a:pPr>
             <a:fld id="{BCC18F51-09EC-435C-A3BA-64A766E099C0}" type="datetimeFigureOut">
               <a:rPr lang="fa-IR"/>
-              <a:t>10/06/1447</a:t>
+              <a:t>21/06/1447</a:t>
             </a:fld>
             <a:endParaRPr/>
           </a:p>
@@ -2480,7 +2480,7 @@
             </a:pPr>
             <a:fld id="{BCC18F51-09EC-435C-A3BA-64A766E099C0}" type="datetimeFigureOut">
               <a:rPr lang="fa-IR"/>
-              <a:t>10/06/1447</a:t>
+              <a:t>21/06/1447</a:t>
             </a:fld>
             <a:endParaRPr/>
           </a:p>
@@ -2702,7 +2702,7 @@
             </a:pPr>
             <a:fld id="{BCC18F51-09EC-435C-A3BA-64A766E099C0}" type="datetimeFigureOut">
               <a:rPr lang="fa-IR"/>
-              <a:t>10/06/1447</a:t>
+              <a:t>21/06/1447</a:t>
             </a:fld>
             <a:endParaRPr/>
           </a:p>
@@ -5439,8 +5439,8 @@
         </p:nvSpPr>
         <p:spPr bwMode="auto">
           <a:xfrm>
-            <a:off x="6642856" y="4132711"/>
-            <a:ext cx="1359523" cy="873690"/>
+            <a:off x="6642856" y="3973179"/>
+            <a:ext cx="1359523" cy="1078730"/>
           </a:xfrm>
           <a:prstGeom prst="borderCallout2">
             <a:avLst>
@@ -5448,8 +5448,8 @@
               <a:gd name="adj2" fmla="val 105"/>
               <a:gd name="adj3" fmla="val 79499"/>
               <a:gd name="adj4" fmla="val -13697"/>
-              <a:gd name="adj5" fmla="val 27669"/>
-              <a:gd name="adj6" fmla="val -28050"/>
+              <a:gd name="adj5" fmla="val 31824"/>
+              <a:gd name="adj6" fmla="val -25412"/>
             </a:avLst>
           </a:prstGeom>
           <a:noFill/>
@@ -5477,7 +5477,7 @@
           <a:bodyPr rtlCol="1" anchor="ctr"/>
           <a:lstStyle/>
           <a:p>
-            <a:pPr>
+            <a:pPr rtl="0">
               <a:buNone/>
             </a:pPr>
             <a:r>
@@ -5496,7 +5496,7 @@
             </a:r>
           </a:p>
           <a:p>
-            <a:pPr>
+            <a:pPr rtl="0">
               <a:buNone/>
             </a:pPr>
             <a:r>
@@ -5515,7 +5515,7 @@
             </a:r>
           </a:p>
           <a:p>
-            <a:pPr>
+            <a:pPr rtl="0">
               <a:buNone/>
             </a:pPr>
             <a:r>
@@ -5534,7 +5534,7 @@
             </a:r>
           </a:p>
           <a:p>
-            <a:pPr>
+            <a:pPr rtl="0">
               <a:buNone/>
             </a:pPr>
             <a:r>
@@ -5553,7 +5553,7 @@
             </a:r>
           </a:p>
           <a:p>
-            <a:pPr>
+            <a:pPr rtl="0">
               <a:buNone/>
             </a:pPr>
             <a:r>
@@ -5572,7 +5572,7 @@
             </a:r>
           </a:p>
           <a:p>
-            <a:pPr>
+            <a:pPr rtl="0">
               <a:buNone/>
             </a:pPr>
             <a:r>
@@ -5587,8 +5587,35 @@
                 <a:ea typeface="Calibri" panose="020F0502020204030204" pitchFamily="34" charset="0"/>
                 <a:cs typeface="Calibri Light" panose="020F0302020204030204" pitchFamily="34" charset="0"/>
               </a:rPr>
-              <a:t>32 report problem</a:t>
-            </a:r>
+              <a:t>32 problem report</a:t>
+            </a:r>
+          </a:p>
+          <a:p>
+            <a:pPr rtl="0"/>
+            <a:r>
+              <a:rPr lang="en-US" sz="900" kern="100">
+                <a:solidFill>
+                  <a:schemeClr val="accent6">
+                    <a:lumMod val="50000"/>
+                  </a:schemeClr>
+                </a:solidFill>
+                <a:latin typeface="Consolas" panose="020B0609020204030204" pitchFamily="49" charset="0"/>
+                <a:ea typeface="Calibri" panose="020F0502020204030204" pitchFamily="34" charset="0"/>
+                <a:cs typeface="Calibri Light" panose="020F0302020204030204" pitchFamily="34" charset="0"/>
+              </a:rPr>
+              <a:t>64 IsSelected</a:t>
+            </a:r>
+            <a:endParaRPr lang="en-US" sz="900" kern="100">
+              <a:solidFill>
+                <a:schemeClr val="accent6">
+                  <a:lumMod val="50000"/>
+                </a:schemeClr>
+              </a:solidFill>
+              <a:effectLst/>
+              <a:latin typeface="Consolas" panose="020B0609020204030204" pitchFamily="49" charset="0"/>
+              <a:ea typeface="Calibri" panose="020F0502020204030204" pitchFamily="34" charset="0"/>
+              <a:cs typeface="Calibri Light" panose="020F0302020204030204" pitchFamily="34" charset="0"/>
+            </a:endParaRPr>
           </a:p>
         </p:txBody>
       </p:sp>
@@ -5607,7 +5634,7 @@
         <p:spPr bwMode="auto">
           <a:xfrm>
             <a:off x="573912" y="5953472"/>
-            <a:ext cx="1121928" cy="388282"/>
+            <a:ext cx="1121928" cy="388281"/>
           </a:xfrm>
           <a:prstGeom prst="borderCallout2">
             <a:avLst>

</xml_diff>

<commit_message>
-working on messaging ...
</commit_message>
<xml_diff>
--- a/ExaminerB/.appCatalog/ExaminerB notes 1404.pptx
+++ b/ExaminerB/.appCatalog/ExaminerB notes 1404.pptx
@@ -5,13 +5,14 @@
     <p:sldMasterId id="2147483648" r:id="rId1"/>
   </p:sldMasterIdLst>
   <p:notesMasterIdLst>
-    <p:notesMasterId r:id="rId6"/>
+    <p:notesMasterId r:id="rId7"/>
   </p:notesMasterIdLst>
   <p:sldIdLst>
     <p:sldId id="262" r:id="rId2"/>
     <p:sldId id="267" r:id="rId3"/>
-    <p:sldId id="266" r:id="rId4"/>
-    <p:sldId id="264" r:id="rId5"/>
+    <p:sldId id="268" r:id="rId4"/>
+    <p:sldId id="266" r:id="rId5"/>
+    <p:sldId id="264" r:id="rId6"/>
   </p:sldIdLst>
   <p:sldSz cx="9906000" cy="6858000" type="A4"/>
   <p:notesSz cx="6858000" cy="9144000"/>
@@ -281,7 +282,7 @@
             </a:pPr>
             <a:fld id="{BCC18F51-09EC-435C-A3BA-64A766E099C0}" type="datetimeFigureOut">
               <a:rPr lang="fa-IR"/>
-              <a:t>21/06/1447</a:t>
+              <a:t>27/06/1447</a:t>
             </a:fld>
             <a:endParaRPr/>
           </a:p>
@@ -460,7 +461,7 @@
             </a:pPr>
             <a:fld id="{BCC18F51-09EC-435C-A3BA-64A766E099C0}" type="datetimeFigureOut">
               <a:rPr lang="fa-IR"/>
-              <a:t>21/06/1447</a:t>
+              <a:t>27/06/1447</a:t>
             </a:fld>
             <a:endParaRPr/>
           </a:p>
@@ -649,7 +650,7 @@
             </a:pPr>
             <a:fld id="{BCC18F51-09EC-435C-A3BA-64A766E099C0}" type="datetimeFigureOut">
               <a:rPr lang="fa-IR"/>
-              <a:t>21/06/1447</a:t>
+              <a:t>27/06/1447</a:t>
             </a:fld>
             <a:endParaRPr/>
           </a:p>
@@ -828,7 +829,7 @@
             </a:pPr>
             <a:fld id="{BCC18F51-09EC-435C-A3BA-64A766E099C0}" type="datetimeFigureOut">
               <a:rPr lang="fa-IR"/>
-              <a:t>21/06/1447</a:t>
+              <a:t>27/06/1447</a:t>
             </a:fld>
             <a:endParaRPr/>
           </a:p>
@@ -1080,7 +1081,7 @@
             </a:pPr>
             <a:fld id="{BCC18F51-09EC-435C-A3BA-64A766E099C0}" type="datetimeFigureOut">
               <a:rPr lang="fa-IR"/>
-              <a:t>21/06/1447</a:t>
+              <a:t>27/06/1447</a:t>
             </a:fld>
             <a:endParaRPr/>
           </a:p>
@@ -1325,7 +1326,7 @@
             </a:pPr>
             <a:fld id="{BCC18F51-09EC-435C-A3BA-64A766E099C0}" type="datetimeFigureOut">
               <a:rPr lang="fa-IR"/>
-              <a:t>21/06/1447</a:t>
+              <a:t>27/06/1447</a:t>
             </a:fld>
             <a:endParaRPr/>
           </a:p>
@@ -1707,7 +1708,7 @@
             </a:pPr>
             <a:fld id="{BCC18F51-09EC-435C-A3BA-64A766E099C0}" type="datetimeFigureOut">
               <a:rPr lang="fa-IR"/>
-              <a:t>21/06/1447</a:t>
+              <a:t>27/06/1447</a:t>
             </a:fld>
             <a:endParaRPr/>
           </a:p>
@@ -1830,7 +1831,7 @@
             </a:pPr>
             <a:fld id="{BCC18F51-09EC-435C-A3BA-64A766E099C0}" type="datetimeFigureOut">
               <a:rPr lang="fa-IR"/>
-              <a:t>21/06/1447</a:t>
+              <a:t>27/06/1447</a:t>
             </a:fld>
             <a:endParaRPr/>
           </a:p>
@@ -1929,7 +1930,7 @@
             </a:pPr>
             <a:fld id="{BCC18F51-09EC-435C-A3BA-64A766E099C0}" type="datetimeFigureOut">
               <a:rPr lang="fa-IR"/>
-              <a:t>21/06/1447</a:t>
+              <a:t>27/06/1447</a:t>
             </a:fld>
             <a:endParaRPr/>
           </a:p>
@@ -2216,7 +2217,7 @@
             </a:pPr>
             <a:fld id="{BCC18F51-09EC-435C-A3BA-64A766E099C0}" type="datetimeFigureOut">
               <a:rPr lang="fa-IR"/>
-              <a:t>21/06/1447</a:t>
+              <a:t>27/06/1447</a:t>
             </a:fld>
             <a:endParaRPr/>
           </a:p>
@@ -2480,7 +2481,7 @@
             </a:pPr>
             <a:fld id="{BCC18F51-09EC-435C-A3BA-64A766E099C0}" type="datetimeFigureOut">
               <a:rPr lang="fa-IR"/>
-              <a:t>21/06/1447</a:t>
+              <a:t>27/06/1447</a:t>
             </a:fld>
             <a:endParaRPr/>
           </a:p>
@@ -2702,7 +2703,7 @@
             </a:pPr>
             <a:fld id="{BCC18F51-09EC-435C-A3BA-64A766E099C0}" type="datetimeFigureOut">
               <a:rPr lang="fa-IR"/>
-              <a:t>21/06/1447</a:t>
+              <a:t>27/06/1447</a:t>
             </a:fld>
             <a:endParaRPr/>
           </a:p>
@@ -3128,8 +3129,8 @@
         </p:nvSpPr>
         <p:spPr bwMode="auto">
           <a:xfrm>
-            <a:off x="2945467" y="2650458"/>
-            <a:ext cx="1338093" cy="1124109"/>
+            <a:off x="2953463" y="2199903"/>
+            <a:ext cx="1223745" cy="1124109"/>
           </a:xfrm>
           <a:prstGeom prst="roundRect">
             <a:avLst>
@@ -3280,8 +3281,8 @@
         </p:nvSpPr>
         <p:spPr bwMode="auto">
           <a:xfrm>
-            <a:off x="2936776" y="670022"/>
-            <a:ext cx="1345888" cy="1489017"/>
+            <a:off x="2958144" y="211791"/>
+            <a:ext cx="1219064" cy="1489017"/>
           </a:xfrm>
           <a:prstGeom prst="roundRect">
             <a:avLst>
@@ -3468,8 +3469,8 @@
         </p:nvSpPr>
         <p:spPr bwMode="auto">
           <a:xfrm>
-            <a:off x="1712640" y="4365104"/>
-            <a:ext cx="947050" cy="1373607"/>
+            <a:off x="3715022" y="3909435"/>
+            <a:ext cx="822776" cy="1486728"/>
           </a:xfrm>
           <a:prstGeom prst="roundRect">
             <a:avLst>
@@ -3656,8 +3657,8 @@
         </p:nvSpPr>
         <p:spPr bwMode="auto">
           <a:xfrm>
-            <a:off x="238749" y="4365104"/>
-            <a:ext cx="1298639" cy="911120"/>
+            <a:off x="4939154" y="4811615"/>
+            <a:ext cx="1249047" cy="911120"/>
           </a:xfrm>
           <a:prstGeom prst="roundRect">
             <a:avLst>
@@ -3799,8 +3800,8 @@
         </p:nvSpPr>
         <p:spPr bwMode="auto">
           <a:xfrm>
-            <a:off x="1433833" y="2979164"/>
-            <a:ext cx="1428350" cy="799309"/>
+            <a:off x="2085107" y="3423961"/>
+            <a:ext cx="1223746" cy="803391"/>
           </a:xfrm>
           <a:prstGeom prst="roundRect">
             <a:avLst>
@@ -3917,7 +3918,7 @@
         </p:nvSpPr>
         <p:spPr bwMode="auto">
           <a:xfrm>
-            <a:off x="1208695" y="692697"/>
+            <a:off x="1231271" y="351849"/>
             <a:ext cx="1656073" cy="1167586"/>
           </a:xfrm>
           <a:prstGeom prst="roundRect">
@@ -4065,7 +4066,7 @@
         </p:nvSpPr>
         <p:spPr bwMode="auto">
           <a:xfrm>
-            <a:off x="14510" y="672164"/>
+            <a:off x="37086" y="331316"/>
             <a:ext cx="1139090" cy="1167586"/>
           </a:xfrm>
           <a:prstGeom prst="roundRect">
@@ -4228,7 +4229,7 @@
         </p:nvSpPr>
         <p:spPr bwMode="auto">
           <a:xfrm>
-            <a:off x="8409384" y="1078700"/>
+            <a:off x="8409384" y="1275515"/>
             <a:ext cx="959412" cy="713325"/>
           </a:xfrm>
           <a:prstGeom prst="roundRect">
@@ -4346,7 +4347,7 @@
         </p:nvSpPr>
         <p:spPr bwMode="auto">
           <a:xfrm>
-            <a:off x="7566270" y="2285686"/>
+            <a:off x="7375276" y="2285686"/>
             <a:ext cx="1250132" cy="1131475"/>
           </a:xfrm>
           <a:prstGeom prst="roundRect">
@@ -4520,7 +4521,7 @@
         <p:spPr bwMode="auto">
           <a:xfrm>
             <a:off x="4653331" y="2093949"/>
-            <a:ext cx="1883845" cy="2312884"/>
+            <a:ext cx="1883845" cy="2212275"/>
           </a:xfrm>
           <a:prstGeom prst="roundRect">
             <a:avLst>
@@ -5002,8 +5003,8 @@
         </p:nvCxnSpPr>
         <p:spPr>
           <a:xfrm rot="16200000" flipV="1">
-            <a:off x="5964218" y="58567"/>
-            <a:ext cx="1881022" cy="2573215"/>
+            <a:off x="5868721" y="154064"/>
+            <a:ext cx="1881022" cy="2382221"/>
           </a:xfrm>
           <a:prstGeom prst="bentConnector3">
             <a:avLst>
@@ -5046,13 +5047,13 @@
           <p:nvPr/>
         </p:nvCxnSpPr>
         <p:spPr>
-          <a:xfrm rot="5400000" flipH="1" flipV="1">
-            <a:off x="4481241" y="-466857"/>
-            <a:ext cx="265358" cy="2008401"/>
+          <a:xfrm rot="16200000" flipH="1">
+            <a:off x="4496461" y="-716995"/>
+            <a:ext cx="192873" cy="2050445"/>
           </a:xfrm>
           <a:prstGeom prst="bentConnector3">
             <a:avLst>
-              <a:gd name="adj1" fmla="val 186148"/>
+              <a:gd name="adj1" fmla="val -56685"/>
             </a:avLst>
           </a:prstGeom>
           <a:ln>
@@ -5096,7 +5097,7 @@
         <p:spPr>
           <a:xfrm rot="10800000" flipV="1">
             <a:off x="4653332" y="1213685"/>
-            <a:ext cx="3" cy="2036705"/>
+            <a:ext cx="3" cy="1986401"/>
           </a:xfrm>
           <a:prstGeom prst="bentConnector3">
             <a:avLst>
@@ -5143,8 +5144,8 @@
         </p:nvCxnSpPr>
         <p:spPr>
           <a:xfrm flipV="1">
-            <a:off x="2710762" y="4406833"/>
-            <a:ext cx="2884492" cy="289981"/>
+            <a:off x="4732500" y="4306224"/>
+            <a:ext cx="862754" cy="346912"/>
           </a:xfrm>
           <a:prstGeom prst="bentConnector2">
             <a:avLst/>
@@ -5188,9 +5189,9 @@
           <p:nvPr/>
         </p:nvCxnSpPr>
         <p:spPr>
-          <a:xfrm flipH="1" flipV="1">
-            <a:off x="3609720" y="2159039"/>
-            <a:ext cx="4794" cy="491419"/>
+          <a:xfrm flipV="1">
+            <a:off x="3565336" y="1700808"/>
+            <a:ext cx="2340" cy="499095"/>
           </a:xfrm>
           <a:prstGeom prst="straightConnector1">
             <a:avLst/>
@@ -5231,17 +5232,17 @@
         </p:nvSpPr>
         <p:spPr>
           <a:xfrm>
-            <a:off x="1282615" y="1942012"/>
-            <a:ext cx="1506140" cy="533862"/>
+            <a:off x="1509204" y="1741381"/>
+            <a:ext cx="1312832" cy="357539"/>
           </a:xfrm>
           <a:prstGeom prst="borderCallout2">
             <a:avLst>
-              <a:gd name="adj1" fmla="val 51289"/>
-              <a:gd name="adj2" fmla="val 100433"/>
-              <a:gd name="adj3" fmla="val 50700"/>
-              <a:gd name="adj4" fmla="val 115464"/>
-              <a:gd name="adj5" fmla="val 27228"/>
-              <a:gd name="adj6" fmla="val 123461"/>
+              <a:gd name="adj1" fmla="val 29050"/>
+              <a:gd name="adj2" fmla="val 100961"/>
+              <a:gd name="adj3" fmla="val 30685"/>
+              <a:gd name="adj4" fmla="val 114253"/>
+              <a:gd name="adj5" fmla="val -21698"/>
+              <a:gd name="adj6" fmla="val 121038"/>
             </a:avLst>
           </a:prstGeom>
           <a:noFill/>
@@ -5306,32 +5307,6 @@
               <a:t>2 training mode</a:t>
             </a:r>
           </a:p>
-          <a:p>
-            <a:pPr algn="l" rtl="0">
-              <a:buNone/>
-            </a:pPr>
-            <a:r>
-              <a:rPr lang="en-US" sz="900">
-                <a:solidFill>
-                  <a:schemeClr val="accent6">
-                    <a:lumMod val="50000"/>
-                  </a:schemeClr>
-                </a:solidFill>
-                <a:effectLst/>
-                <a:latin typeface="Consolas" panose="020B0609020204030204" pitchFamily="49" charset="0"/>
-                <a:ea typeface="Calibri" panose="020F0502020204030204" pitchFamily="34" charset="0"/>
-                <a:cs typeface="Calibri Light" panose="020F0302020204030204" pitchFamily="34" charset="0"/>
-              </a:rPr>
-              <a:t>4 real exam mode</a:t>
-            </a:r>
-            <a:endParaRPr lang="fa-IR" sz="900">
-              <a:solidFill>
-                <a:schemeClr val="accent6">
-                  <a:lumMod val="50000"/>
-                </a:schemeClr>
-              </a:solidFill>
-            </a:endParaRPr>
-          </a:p>
         </p:txBody>
       </p:sp>
       <p:sp>
@@ -5357,8 +5332,8 @@
               <a:gd name="adj2" fmla="val -1795"/>
               <a:gd name="adj3" fmla="val 84259"/>
               <a:gd name="adj4" fmla="val -22225"/>
-              <a:gd name="adj5" fmla="val 234468"/>
-              <a:gd name="adj6" fmla="val -71308"/>
+              <a:gd name="adj5" fmla="val 236590"/>
+              <a:gd name="adj6" fmla="val -65701"/>
             </a:avLst>
           </a:prstGeom>
           <a:noFill/>
@@ -5439,17 +5414,17 @@
         </p:nvSpPr>
         <p:spPr bwMode="auto">
           <a:xfrm>
-            <a:off x="6642856" y="3973179"/>
-            <a:ext cx="1359523" cy="1078730"/>
+            <a:off x="6651047" y="3556055"/>
+            <a:ext cx="1191770" cy="1078730"/>
           </a:xfrm>
           <a:prstGeom prst="borderCallout2">
             <a:avLst>
-              <a:gd name="adj1" fmla="val 79785"/>
-              <a:gd name="adj2" fmla="val 105"/>
-              <a:gd name="adj3" fmla="val 79499"/>
+              <a:gd name="adj1" fmla="val 90104"/>
+              <a:gd name="adj2" fmla="val -1065"/>
+              <a:gd name="adj3" fmla="val 89081"/>
               <a:gd name="adj4" fmla="val -13697"/>
-              <a:gd name="adj5" fmla="val 31824"/>
-              <a:gd name="adj6" fmla="val -25412"/>
+              <a:gd name="adj5" fmla="val 62045"/>
+              <a:gd name="adj6" fmla="val -27833"/>
             </a:avLst>
           </a:prstGeom>
           <a:noFill/>
@@ -5587,7 +5562,7 @@
                 <a:ea typeface="Calibri" panose="020F0502020204030204" pitchFamily="34" charset="0"/>
                 <a:cs typeface="Calibri Light" panose="020F0302020204030204" pitchFamily="34" charset="0"/>
               </a:rPr>
-              <a:t>32 problem report</a:t>
+              <a:t>32 problem rep</a:t>
             </a:r>
           </a:p>
           <a:p>
@@ -5633,17 +5608,17 @@
         </p:nvSpPr>
         <p:spPr bwMode="auto">
           <a:xfrm>
-            <a:off x="573912" y="5953472"/>
-            <a:ext cx="1121928" cy="388281"/>
+            <a:off x="3715022" y="5651879"/>
+            <a:ext cx="853095" cy="388281"/>
           </a:xfrm>
           <a:prstGeom prst="borderCallout2">
             <a:avLst>
-              <a:gd name="adj1" fmla="val 44106"/>
-              <a:gd name="adj2" fmla="val 103494"/>
-              <a:gd name="adj3" fmla="val -12924"/>
-              <a:gd name="adj4" fmla="val 147080"/>
-              <a:gd name="adj5" fmla="val -47344"/>
-              <a:gd name="adj6" fmla="val 147392"/>
+              <a:gd name="adj1" fmla="val 1102"/>
+              <a:gd name="adj2" fmla="val 81036"/>
+              <a:gd name="adj3" fmla="val -43641"/>
+              <a:gd name="adj4" fmla="val 79878"/>
+              <a:gd name="adj5" fmla="val -69870"/>
+              <a:gd name="adj6" fmla="val 55844"/>
             </a:avLst>
           </a:prstGeom>
           <a:noFill/>
@@ -5705,7 +5680,7 @@
                 <a:ea typeface="Calibri" panose="020F0502020204030204" pitchFamily="34" charset="0"/>
                 <a:cs typeface="Calibri Light" panose="020F0302020204030204" pitchFamily="34" charset="0"/>
               </a:rPr>
-              <a:t>2 options rtl</a:t>
+              <a:t>2 opt rtl</a:t>
             </a:r>
           </a:p>
         </p:txBody>
@@ -5724,17 +5699,17 @@
         </p:nvSpPr>
         <p:spPr bwMode="auto">
           <a:xfrm>
-            <a:off x="174373" y="5399472"/>
-            <a:ext cx="1001746" cy="388281"/>
+            <a:off x="5670692" y="5811866"/>
+            <a:ext cx="1035018" cy="367286"/>
           </a:xfrm>
           <a:prstGeom prst="borderCallout2">
             <a:avLst>
-              <a:gd name="adj1" fmla="val 24994"/>
-              <a:gd name="adj2" fmla="val 98922"/>
-              <a:gd name="adj3" fmla="val 8692"/>
-              <a:gd name="adj4" fmla="val 111910"/>
-              <a:gd name="adj5" fmla="val -35543"/>
-              <a:gd name="adj6" fmla="val 113790"/>
+              <a:gd name="adj1" fmla="val -3150"/>
+              <a:gd name="adj2" fmla="val 89704"/>
+              <a:gd name="adj3" fmla="val -45430"/>
+              <a:gd name="adj4" fmla="val 85021"/>
+              <a:gd name="adj5" fmla="val -48532"/>
+              <a:gd name="adj6" fmla="val 40040"/>
             </a:avLst>
           </a:prstGeom>
           <a:noFill/>
@@ -5832,12 +5807,22 @@
         </p:blipFill>
         <p:spPr>
           <a:xfrm>
-            <a:off x="154932" y="14468"/>
-            <a:ext cx="920915" cy="208302"/>
+            <a:off x="102843" y="3929607"/>
+            <a:ext cx="1316348" cy="297745"/>
           </a:xfrm>
           <a:prstGeom prst="rect">
             <a:avLst/>
           </a:prstGeom>
+          <a:ln>
+            <a:noFill/>
+          </a:ln>
+          <a:effectLst>
+            <a:outerShdw blurRad="292100" dist="139700" dir="2700000" algn="tl" rotWithShape="0">
+              <a:srgbClr val="333333">
+                <a:alpha val="65000"/>
+              </a:srgbClr>
+            </a:outerShdw>
+          </a:effectLst>
         </p:spPr>
       </p:pic>
       <p:sp>
@@ -5854,13 +5839,13 @@
         </p:nvSpPr>
         <p:spPr bwMode="auto">
           <a:xfrm>
-            <a:off x="6653968" y="1160416"/>
-            <a:ext cx="1496377" cy="933533"/>
+            <a:off x="6652899" y="1160416"/>
+            <a:ext cx="1292337" cy="933533"/>
           </a:xfrm>
           <a:prstGeom prst="borderCallout2">
             <a:avLst>
-              <a:gd name="adj1" fmla="val 98983"/>
-              <a:gd name="adj2" fmla="val 42080"/>
+              <a:gd name="adj1" fmla="val 103242"/>
+              <a:gd name="adj2" fmla="val 46183"/>
               <a:gd name="adj3" fmla="val 214696"/>
               <a:gd name="adj4" fmla="val 48232"/>
               <a:gd name="adj5" fmla="val 215517"/>
@@ -6000,7 +5985,7 @@
                 <a:ea typeface="Calibri" panose="020F0502020204030204" pitchFamily="34" charset="0"/>
                 <a:cs typeface="Calibri Light" panose="020F0302020204030204" pitchFamily="34" charset="0"/>
               </a:rPr>
-              <a:t>32 ReviewCourseTests</a:t>
+              <a:t>32 RevCourseTests</a:t>
             </a:r>
           </a:p>
         </p:txBody>
@@ -6019,8 +6004,8 @@
         </p:nvSpPr>
         <p:spPr bwMode="auto">
           <a:xfrm>
-            <a:off x="6310797" y="5296390"/>
-            <a:ext cx="1718015" cy="1224136"/>
+            <a:off x="56440" y="5157192"/>
+            <a:ext cx="1718015" cy="1221075"/>
           </a:xfrm>
           <a:prstGeom prst="roundRect">
             <a:avLst>
@@ -6187,14 +6172,14 @@
           <p:cNvCxnSpPr>
             <a:cxnSpLocks/>
             <a:stCxn id="4" idx="2"/>
-            <a:endCxn id="6" idx="3"/>
+            <a:endCxn id="6" idx="1"/>
           </p:cNvCxnSpPr>
           <p:nvPr/>
         </p:nvCxnSpPr>
         <p:spPr bwMode="auto">
-          <a:xfrm rot="5400000">
-            <a:off x="2498432" y="3935825"/>
-            <a:ext cx="1277341" cy="954824"/>
+          <a:xfrm rot="16200000" flipH="1">
+            <a:off x="2975786" y="3913562"/>
+            <a:ext cx="1328787" cy="149686"/>
           </a:xfrm>
           <a:prstGeom prst="bentConnector2">
             <a:avLst/>
@@ -6235,8 +6220,8 @@
         </p:nvSpPr>
         <p:spPr bwMode="auto">
           <a:xfrm>
-            <a:off x="4579052" y="5298184"/>
-            <a:ext cx="1565596" cy="1224136"/>
+            <a:off x="1910355" y="5157192"/>
+            <a:ext cx="1367880" cy="1224136"/>
           </a:xfrm>
           <a:prstGeom prst="roundRect">
             <a:avLst>
@@ -6399,12 +6384,12 @@
         </p:nvCxnSpPr>
         <p:spPr bwMode="auto">
           <a:xfrm rot="5400000">
-            <a:off x="5224014" y="3554997"/>
-            <a:ext cx="3105159" cy="2829486"/>
+            <a:off x="3815236" y="2196221"/>
+            <a:ext cx="2964167" cy="5406047"/>
           </a:xfrm>
           <a:prstGeom prst="bentConnector3">
             <a:avLst>
-              <a:gd name="adj1" fmla="val 107362"/>
+              <a:gd name="adj1" fmla="val 107712"/>
             </a:avLst>
           </a:prstGeom>
           <a:ln>
@@ -6438,19 +6423,17 @@
           <p:cNvCxnSpPr>
             <a:cxnSpLocks/>
             <a:stCxn id="4" idx="2"/>
-            <a:endCxn id="71" idx="0"/>
+            <a:endCxn id="68" idx="3"/>
           </p:cNvCxnSpPr>
           <p:nvPr/>
         </p:nvCxnSpPr>
         <p:spPr bwMode="auto">
-          <a:xfrm rot="16200000" flipH="1">
-            <a:off x="3726374" y="3662707"/>
-            <a:ext cx="1523617" cy="1747336"/>
-          </a:xfrm>
-          <a:prstGeom prst="bentConnector3">
-            <a:avLst>
-              <a:gd name="adj1" fmla="val 83988"/>
-            </a:avLst>
+          <a:xfrm rot="5400000">
+            <a:off x="2251164" y="4432348"/>
+            <a:ext cx="2422509" cy="205837"/>
+          </a:xfrm>
+          <a:prstGeom prst="bentConnector2">
+            <a:avLst/>
           </a:prstGeom>
           <a:ln>
             <a:solidFill>
@@ -6474,43 +6457,6 @@
           </a:fontRef>
         </p:style>
       </p:cxnSp>
-      <p:sp>
-        <p:nvSpPr>
-          <p:cNvPr id="100" name="TextBox 99">
-            <a:extLst>
-              <a:ext uri="{FF2B5EF4-FFF2-40B4-BE49-F238E27FC236}">
-                <a16:creationId xmlns:a16="http://schemas.microsoft.com/office/drawing/2014/main" id="{17221F67-B11B-3ADB-2B3A-42D1D53419F6}"/>
-              </a:ext>
-            </a:extLst>
-          </p:cNvPr>
-          <p:cNvSpPr txBox="1"/>
-          <p:nvPr/>
-        </p:nvSpPr>
-        <p:spPr>
-          <a:xfrm>
-            <a:off x="150957" y="174539"/>
-            <a:ext cx="892767" cy="261610"/>
-          </a:xfrm>
-          <a:prstGeom prst="rect">
-            <a:avLst/>
-          </a:prstGeom>
-          <a:noFill/>
-        </p:spPr>
-        <p:txBody>
-          <a:bodyPr wrap="square" rtlCol="1">
-            <a:spAutoFit/>
-          </a:bodyPr>
-          <a:lstStyle/>
-          <a:p>
-            <a:pPr algn="ctr" rtl="0"/>
-            <a:r>
-              <a:rPr lang="en-US" sz="1050"/>
-              <a:t>x.msht.ir</a:t>
-            </a:r>
-            <a:endParaRPr lang="fa-IR" sz="1050"/>
-          </a:p>
-        </p:txBody>
-      </p:sp>
       <p:sp>
         <p:nvSpPr>
           <p:cNvPr id="22" name="Rectangle: Rounded Corners 44">
@@ -6643,8 +6589,8 @@
         </p:nvSpPr>
         <p:spPr bwMode="auto">
           <a:xfrm>
-            <a:off x="8874235" y="2285684"/>
-            <a:ext cx="989122" cy="1131475"/>
+            <a:off x="8697416" y="2285684"/>
+            <a:ext cx="1005361" cy="1131475"/>
           </a:xfrm>
           <a:prstGeom prst="roundRect">
             <a:avLst>
@@ -6795,8 +6741,8 @@
         </p:nvCxnSpPr>
         <p:spPr bwMode="auto">
           <a:xfrm rot="16200000" flipV="1">
-            <a:off x="8620477" y="1144100"/>
-            <a:ext cx="1749551" cy="265164"/>
+            <a:off x="8537599" y="1226978"/>
+            <a:ext cx="1829487" cy="179343"/>
           </a:xfrm>
           <a:prstGeom prst="bentConnector2">
             <a:avLst/>
@@ -6835,14 +6781,14 @@
           <p:cNvCxnSpPr>
             <a:cxnSpLocks/>
             <a:stCxn id="54" idx="0"/>
-            <a:endCxn id="11" idx="3"/>
+            <a:endCxn id="64" idx="3"/>
           </p:cNvCxnSpPr>
           <p:nvPr/>
         </p:nvCxnSpPr>
         <p:spPr bwMode="auto">
           <a:xfrm rot="16200000" flipV="1">
-            <a:off x="9140268" y="1663891"/>
-            <a:ext cx="716094" cy="259038"/>
+            <a:off x="9131848" y="1821227"/>
+            <a:ext cx="719122" cy="101209"/>
           </a:xfrm>
           <a:prstGeom prst="bentConnector2">
             <a:avLst/>
@@ -6883,7 +6829,7 @@
         </p:nvSpPr>
         <p:spPr>
           <a:xfrm>
-            <a:off x="9483818" y="2151457"/>
+            <a:off x="9397997" y="2231393"/>
             <a:ext cx="288032" cy="261503"/>
           </a:xfrm>
           <a:prstGeom prst="roundRect">
@@ -6942,7 +6888,7 @@
         </p:nvSpPr>
         <p:spPr bwMode="auto">
           <a:xfrm>
-            <a:off x="4035949" y="2767885"/>
+            <a:off x="3953640" y="2592674"/>
             <a:ext cx="288032" cy="261503"/>
           </a:xfrm>
           <a:prstGeom prst="roundRect">
@@ -7001,7 +6947,7 @@
         </p:nvSpPr>
         <p:spPr bwMode="auto">
           <a:xfrm>
-            <a:off x="2571949" y="3278484"/>
+            <a:off x="3070776" y="3717266"/>
             <a:ext cx="288032" cy="261503"/>
           </a:xfrm>
           <a:prstGeom prst="roundRect">
@@ -7060,7 +7006,7 @@
         </p:nvSpPr>
         <p:spPr bwMode="auto">
           <a:xfrm>
-            <a:off x="2422730" y="4566062"/>
+            <a:off x="4444468" y="4522384"/>
             <a:ext cx="288032" cy="261503"/>
           </a:xfrm>
           <a:prstGeom prst="roundRect">
@@ -7119,7 +7065,7 @@
         </p:nvSpPr>
         <p:spPr bwMode="auto">
           <a:xfrm>
-            <a:off x="1265466" y="4588275"/>
+            <a:off x="4704891" y="5083038"/>
             <a:ext cx="288032" cy="261503"/>
           </a:xfrm>
           <a:prstGeom prst="roundRect">
@@ -7178,7 +7124,7 @@
         </p:nvSpPr>
         <p:spPr bwMode="auto">
           <a:xfrm>
-            <a:off x="3896881" y="625209"/>
+            <a:off x="3944888" y="688816"/>
             <a:ext cx="288032" cy="261503"/>
           </a:xfrm>
           <a:prstGeom prst="roundRect">
@@ -7237,7 +7183,7 @@
         </p:nvSpPr>
         <p:spPr bwMode="auto">
           <a:xfrm>
-            <a:off x="879344" y="1029664"/>
+            <a:off x="901920" y="688816"/>
             <a:ext cx="288032" cy="261503"/>
           </a:xfrm>
           <a:prstGeom prst="roundRect">
@@ -7296,7 +7242,7 @@
         </p:nvSpPr>
         <p:spPr bwMode="auto">
           <a:xfrm>
-            <a:off x="2599602" y="1095489"/>
+            <a:off x="2640631" y="693096"/>
             <a:ext cx="288032" cy="261503"/>
           </a:xfrm>
           <a:prstGeom prst="roundRect">
@@ -7355,7 +7301,7 @@
         </p:nvSpPr>
         <p:spPr bwMode="auto">
           <a:xfrm>
-            <a:off x="9114014" y="1029664"/>
+            <a:off x="9152772" y="1381519"/>
             <a:ext cx="288032" cy="261503"/>
           </a:xfrm>
           <a:prstGeom prst="roundRect">
@@ -7414,7 +7360,7 @@
         </p:nvSpPr>
         <p:spPr bwMode="auto">
           <a:xfrm>
-            <a:off x="8357513" y="2160568"/>
+            <a:off x="8183580" y="2250930"/>
             <a:ext cx="391368" cy="261503"/>
           </a:xfrm>
           <a:prstGeom prst="roundRect">
@@ -7473,7 +7419,7 @@
         </p:nvSpPr>
         <p:spPr bwMode="auto">
           <a:xfrm>
-            <a:off x="6186610" y="490471"/>
+            <a:off x="6007624" y="323586"/>
             <a:ext cx="391368" cy="261503"/>
           </a:xfrm>
           <a:prstGeom prst="roundRect">
@@ -7532,7 +7478,7 @@
         </p:nvSpPr>
         <p:spPr bwMode="auto">
           <a:xfrm>
-            <a:off x="6174725" y="2336734"/>
+            <a:off x="6204036" y="2471156"/>
             <a:ext cx="391368" cy="261503"/>
           </a:xfrm>
           <a:prstGeom prst="roundRect">
@@ -7591,7 +7537,7 @@
         </p:nvSpPr>
         <p:spPr bwMode="auto">
           <a:xfrm>
-            <a:off x="5834543" y="5691970"/>
+            <a:off x="2968131" y="5615769"/>
             <a:ext cx="391368" cy="261503"/>
           </a:xfrm>
           <a:prstGeom prst="roundRect">
@@ -7650,7 +7596,7 @@
         </p:nvSpPr>
         <p:spPr bwMode="auto">
           <a:xfrm>
-            <a:off x="7697576" y="5691969"/>
+            <a:off x="1429949" y="5638508"/>
             <a:ext cx="391368" cy="261503"/>
           </a:xfrm>
           <a:prstGeom prst="roundRect">
@@ -7695,70 +7641,22 @@
           </a:p>
         </p:txBody>
       </p:sp>
-      <p:cxnSp>
-        <p:nvCxnSpPr>
-          <p:cNvPr id="96" name="Connector: Elbow 95">
-            <a:extLst>
-              <a:ext uri="{FF2B5EF4-FFF2-40B4-BE49-F238E27FC236}">
-                <a16:creationId xmlns:a16="http://schemas.microsoft.com/office/drawing/2014/main" id="{AE946DC9-7A59-6BE0-1CBA-FC8B91288750}"/>
-              </a:ext>
-            </a:extLst>
-          </p:cNvPr>
-          <p:cNvCxnSpPr>
-            <a:cxnSpLocks/>
-            <a:stCxn id="11" idx="2"/>
-            <a:endCxn id="65" idx="0"/>
-          </p:cNvCxnSpPr>
-          <p:nvPr/>
-        </p:nvCxnSpPr>
+      <p:sp>
+        <p:nvSpPr>
+          <p:cNvPr id="97" name="Rectangle: Rounded Corners 45">
+            <a:extLst>
+              <a:ext uri="{FF2B5EF4-FFF2-40B4-BE49-F238E27FC236}">
+                <a16:creationId xmlns:a16="http://schemas.microsoft.com/office/drawing/2014/main" id="{E6BA6EAB-7AC6-19DD-11F7-782C47CCE5CC}"/>
+              </a:ext>
+            </a:extLst>
+          </p:cNvPr>
+          <p:cNvSpPr/>
+          <p:nvPr/>
+        </p:nvSpPr>
         <p:spPr bwMode="auto">
-          <a:xfrm rot="5400000">
-            <a:off x="8536873" y="1808350"/>
-            <a:ext cx="368543" cy="335893"/>
-          </a:xfrm>
-          <a:prstGeom prst="bentConnector3">
-            <a:avLst>
-              <a:gd name="adj1" fmla="val 50000"/>
-            </a:avLst>
-          </a:prstGeom>
-          <a:ln>
-            <a:solidFill>
-              <a:schemeClr val="accent5"/>
-            </a:solidFill>
-            <a:tailEnd type="triangle"/>
-          </a:ln>
-        </p:spPr>
-        <p:style>
-          <a:lnRef idx="1">
-            <a:schemeClr val="accent1"/>
-          </a:lnRef>
-          <a:fillRef idx="0">
-            <a:schemeClr val="accent1"/>
-          </a:fillRef>
-          <a:effectRef idx="0">
-            <a:schemeClr val="accent1"/>
-          </a:effectRef>
-          <a:fontRef idx="minor">
-            <a:schemeClr val="tx1"/>
-          </a:fontRef>
-        </p:style>
-      </p:cxnSp>
-      <p:sp>
-        <p:nvSpPr>
-          <p:cNvPr id="97" name="Rectangle: Rounded Corners 45">
-            <a:extLst>
-              <a:ext uri="{FF2B5EF4-FFF2-40B4-BE49-F238E27FC236}">
-                <a16:creationId xmlns:a16="http://schemas.microsoft.com/office/drawing/2014/main" id="{E6BA6EAB-7AC6-19DD-11F7-782C47CCE5CC}"/>
-              </a:ext>
-            </a:extLst>
-          </p:cNvPr>
-          <p:cNvSpPr/>
-          <p:nvPr/>
-        </p:nvSpPr>
-        <p:spPr bwMode="auto">
-          <a:xfrm>
-            <a:off x="8337376" y="4157059"/>
-            <a:ext cx="1250132" cy="1369367"/>
+          <a:xfrm>
+            <a:off x="8265368" y="3480500"/>
+            <a:ext cx="1250132" cy="1041883"/>
           </a:xfrm>
           <a:prstGeom prst="roundRect">
             <a:avLst>
@@ -7841,7 +7739,7 @@
                 <a:latin typeface="Segoe UI" panose="020B0502040204020203" pitchFamily="34" charset="0"/>
                 <a:cs typeface="Segoe UI" panose="020B0502040204020203" pitchFamily="34" charset="0"/>
               </a:rPr>
-              <a:t>FromId</a:t>
+              <a:t>UserId</a:t>
             </a:r>
           </a:p>
           <a:p>
@@ -7856,7 +7754,7 @@
                 <a:latin typeface="Segoe UI" panose="020B0502040204020203" pitchFamily="34" charset="0"/>
                 <a:cs typeface="Segoe UI" panose="020B0502040204020203" pitchFamily="34" charset="0"/>
               </a:rPr>
-              <a:t>ToId</a:t>
+              <a:t>DateTimeCreated</a:t>
             </a:r>
           </a:p>
           <a:p>
@@ -7871,7 +7769,7 @@
                 <a:latin typeface="Segoe UI" panose="020B0502040204020203" pitchFamily="34" charset="0"/>
                 <a:cs typeface="Segoe UI" panose="020B0502040204020203" pitchFamily="34" charset="0"/>
               </a:rPr>
-              <a:t>DateTimeSent</a:t>
+              <a:t>MessageTitle</a:t>
             </a:r>
           </a:p>
           <a:p>
@@ -7886,47 +7784,7 @@
                 <a:latin typeface="Segoe UI" panose="020B0502040204020203" pitchFamily="34" charset="0"/>
                 <a:cs typeface="Segoe UI" panose="020B0502040204020203" pitchFamily="34" charset="0"/>
               </a:rPr>
-              <a:t>DateTimeRead</a:t>
-            </a:r>
-          </a:p>
-          <a:p>
-            <a:pPr rtl="0">
-              <a:defRPr/>
-            </a:pPr>
-            <a:r>
-              <a:rPr lang="en-US" sz="1000">
-                <a:solidFill>
-                  <a:schemeClr val="tx1"/>
-                </a:solidFill>
-                <a:latin typeface="Segoe UI" panose="020B0502040204020203" pitchFamily="34" charset="0"/>
-                <a:cs typeface="Segoe UI" panose="020B0502040204020203" pitchFamily="34" charset="0"/>
-              </a:rPr>
-              <a:t>MessageText</a:t>
-            </a:r>
-          </a:p>
-          <a:p>
-            <a:pPr rtl="0">
-              <a:defRPr/>
-            </a:pPr>
-            <a:r>
-              <a:rPr lang="en-US" sz="1000">
-                <a:solidFill>
-                  <a:schemeClr val="tx1"/>
-                </a:solidFill>
-                <a:latin typeface="Segoe UI" panose="020B0502040204020203" pitchFamily="34" charset="0"/>
-                <a:cs typeface="Segoe UI" panose="020B0502040204020203" pitchFamily="34" charset="0"/>
-              </a:rPr>
-              <a:t>Message</a:t>
-            </a:r>
-            <a:r>
-              <a:rPr lang="en-US" sz="1000">
-                <a:solidFill>
-                  <a:srgbClr val="C00000"/>
-                </a:solidFill>
-                <a:latin typeface="Segoe UI" panose="020B0502040204020203" pitchFamily="34" charset="0"/>
-                <a:cs typeface="Segoe UI" panose="020B0502040204020203" pitchFamily="34" charset="0"/>
-              </a:rPr>
-              <a:t>Tags</a:t>
+              <a:t>MessageBody</a:t>
             </a:r>
           </a:p>
         </p:txBody>
@@ -7945,7 +7803,7 @@
         </p:nvSpPr>
         <p:spPr bwMode="auto">
           <a:xfrm>
-            <a:off x="9242078" y="4446190"/>
+            <a:off x="9166986" y="3647932"/>
             <a:ext cx="391368" cy="261503"/>
           </a:xfrm>
           <a:prstGeom prst="roundRect">
@@ -8002,19 +7860,17 @@
           <p:cNvCxnSpPr>
             <a:cxnSpLocks/>
             <a:stCxn id="12" idx="2"/>
-            <a:endCxn id="97" idx="0"/>
+            <a:endCxn id="26" idx="1"/>
           </p:cNvCxnSpPr>
           <p:nvPr/>
         </p:nvCxnSpPr>
         <p:spPr bwMode="auto">
           <a:xfrm rot="16200000" flipH="1">
-            <a:off x="8206940" y="3401557"/>
-            <a:ext cx="739898" cy="771106"/>
-          </a:xfrm>
-          <a:prstGeom prst="bentConnector3">
-            <a:avLst>
-              <a:gd name="adj1" fmla="val 50000"/>
-            </a:avLst>
+            <a:off x="7242131" y="4175372"/>
+            <a:ext cx="1794350" cy="277928"/>
+          </a:xfrm>
+          <a:prstGeom prst="bentConnector2">
+            <a:avLst/>
           </a:prstGeom>
           <a:ln>
             <a:tailEnd type="triangle"/>
@@ -8046,19 +7902,19 @@
           </p:cNvPr>
           <p:cNvCxnSpPr>
             <a:cxnSpLocks/>
-            <a:stCxn id="23" idx="2"/>
-            <a:endCxn id="97" idx="0"/>
+            <a:stCxn id="23" idx="3"/>
+            <a:endCxn id="98" idx="3"/>
           </p:cNvCxnSpPr>
           <p:nvPr/>
         </p:nvCxnSpPr>
         <p:spPr bwMode="auto">
-          <a:xfrm rot="5400000">
-            <a:off x="8795669" y="3583932"/>
-            <a:ext cx="739900" cy="406354"/>
+          <a:xfrm flipH="1">
+            <a:off x="9558354" y="2851422"/>
+            <a:ext cx="144423" cy="927262"/>
           </a:xfrm>
           <a:prstGeom prst="bentConnector3">
             <a:avLst>
-              <a:gd name="adj1" fmla="val 50000"/>
+              <a:gd name="adj1" fmla="val -71383"/>
             </a:avLst>
           </a:prstGeom>
           <a:ln>
@@ -8094,8 +7950,8 @@
         </p:nvSpPr>
         <p:spPr bwMode="auto">
           <a:xfrm>
-            <a:off x="2941444" y="5526426"/>
-            <a:ext cx="1342117" cy="1224136"/>
+            <a:off x="438362" y="2294380"/>
+            <a:ext cx="1342117" cy="1124109"/>
           </a:xfrm>
           <a:prstGeom prst="roundRect">
             <a:avLst>
@@ -8229,70 +8085,22 @@
           </a:p>
         </p:txBody>
       </p:sp>
-      <p:cxnSp>
-        <p:nvCxnSpPr>
-          <p:cNvPr id="24" name="Connector: Elbow 23">
-            <a:extLst>
-              <a:ext uri="{FF2B5EF4-FFF2-40B4-BE49-F238E27FC236}">
-                <a16:creationId xmlns:a16="http://schemas.microsoft.com/office/drawing/2014/main" id="{32DB2978-5C52-2BDC-A137-444FBE76C194}"/>
-              </a:ext>
-            </a:extLst>
-          </p:cNvPr>
-          <p:cNvCxnSpPr>
-            <a:cxnSpLocks/>
-            <a:stCxn id="4" idx="2"/>
-            <a:endCxn id="21" idx="0"/>
-          </p:cNvCxnSpPr>
-          <p:nvPr/>
-        </p:nvCxnSpPr>
+      <p:sp>
+        <p:nvSpPr>
+          <p:cNvPr id="158" name="Rectangle: Rounded Corners 157">
+            <a:extLst>
+              <a:ext uri="{FF2B5EF4-FFF2-40B4-BE49-F238E27FC236}">
+                <a16:creationId xmlns:a16="http://schemas.microsoft.com/office/drawing/2014/main" id="{4B78B2CF-C7E0-D77A-D051-BB3E404C393B}"/>
+              </a:ext>
+            </a:extLst>
+          </p:cNvPr>
+          <p:cNvSpPr/>
+          <p:nvPr/>
+        </p:nvSpPr>
         <p:spPr bwMode="auto">
-          <a:xfrm rot="5400000">
-            <a:off x="2737580" y="4649491"/>
-            <a:ext cx="1751859" cy="2011"/>
-          </a:xfrm>
-          <a:prstGeom prst="bentConnector3">
-            <a:avLst>
-              <a:gd name="adj1" fmla="val 50000"/>
-            </a:avLst>
-          </a:prstGeom>
-          <a:ln>
-            <a:solidFill>
-              <a:srgbClr val="FF0000"/>
-            </a:solidFill>
-            <a:tailEnd type="triangle"/>
-          </a:ln>
-        </p:spPr>
-        <p:style>
-          <a:lnRef idx="1">
-            <a:schemeClr val="accent1"/>
-          </a:lnRef>
-          <a:fillRef idx="0">
-            <a:schemeClr val="accent1"/>
-          </a:fillRef>
-          <a:effectRef idx="0">
-            <a:schemeClr val="accent1"/>
-          </a:effectRef>
-          <a:fontRef idx="minor">
-            <a:schemeClr val="tx1"/>
-          </a:fontRef>
-        </p:style>
-      </p:cxnSp>
-      <p:sp>
-        <p:nvSpPr>
-          <p:cNvPr id="158" name="Rectangle: Rounded Corners 157">
-            <a:extLst>
-              <a:ext uri="{FF2B5EF4-FFF2-40B4-BE49-F238E27FC236}">
-                <a16:creationId xmlns:a16="http://schemas.microsoft.com/office/drawing/2014/main" id="{4B78B2CF-C7E0-D77A-D051-BB3E404C393B}"/>
-              </a:ext>
-            </a:extLst>
-          </p:cNvPr>
-          <p:cNvSpPr/>
-          <p:nvPr/>
-        </p:nvSpPr>
-        <p:spPr bwMode="auto">
-          <a:xfrm>
-            <a:off x="3991969" y="5872429"/>
-            <a:ext cx="391368" cy="261503"/>
+          <a:xfrm>
+            <a:off x="1595385" y="2642963"/>
+            <a:ext cx="339449" cy="261503"/>
           </a:xfrm>
           <a:prstGeom prst="roundRect">
             <a:avLst/>
@@ -8338,10 +8146,10 @@
       </p:sp>
       <p:sp>
         <p:nvSpPr>
-          <p:cNvPr id="15" name="Callout: Bent Line 14">
-            <a:extLst>
-              <a:ext uri="{FF2B5EF4-FFF2-40B4-BE49-F238E27FC236}">
-                <a16:creationId xmlns:a16="http://schemas.microsoft.com/office/drawing/2014/main" id="{67A1F549-A3AC-7F1E-3DDA-FEE24206EC9D}"/>
+          <p:cNvPr id="26" name="Rectangle: Rounded Corners 45">
+            <a:extLst>
+              <a:ext uri="{FF2B5EF4-FFF2-40B4-BE49-F238E27FC236}">
+                <a16:creationId xmlns:a16="http://schemas.microsoft.com/office/drawing/2014/main" id="{7266CE16-7587-170A-225B-764671352673}"/>
               </a:ext>
             </a:extLst>
           </p:cNvPr>
@@ -8350,23 +8158,168 @@
         </p:nvSpPr>
         <p:spPr bwMode="auto">
           <a:xfrm>
-            <a:off x="8372104" y="5736724"/>
-            <a:ext cx="1359523" cy="873690"/>
-          </a:xfrm>
-          <a:prstGeom prst="borderCallout2">
+            <a:off x="8278270" y="4617758"/>
+            <a:ext cx="1515506" cy="1187506"/>
+          </a:xfrm>
+          <a:prstGeom prst="roundRect">
             <a:avLst>
-              <a:gd name="adj1" fmla="val -2091"/>
-              <a:gd name="adj2" fmla="val 22525"/>
-              <a:gd name="adj3" fmla="val -10209"/>
-              <a:gd name="adj4" fmla="val 21991"/>
-              <a:gd name="adj5" fmla="val -23593"/>
-              <a:gd name="adj6" fmla="val 8096"/>
+              <a:gd name="adj" fmla="val 8076"/>
             </a:avLst>
           </a:prstGeom>
-          <a:noFill/>
+          <a:solidFill>
+            <a:schemeClr val="bg1"/>
+          </a:solidFill>
           <a:ln>
+            <a:solidFill>
+              <a:schemeClr val="accent5"/>
+            </a:solidFill>
             <a:prstDash val="dash"/>
           </a:ln>
+          <a:effectLst/>
+        </p:spPr>
+        <p:style>
+          <a:lnRef idx="0">
+            <a:schemeClr val="accent4"/>
+          </a:lnRef>
+          <a:fillRef idx="3">
+            <a:schemeClr val="accent4"/>
+          </a:fillRef>
+          <a:effectRef idx="3">
+            <a:schemeClr val="accent4"/>
+          </a:effectRef>
+          <a:fontRef idx="minor">
+            <a:schemeClr val="lt1"/>
+          </a:fontRef>
+        </p:style>
+        <p:txBody>
+          <a:bodyPr rtlCol="1" anchor="ctr"/>
+          <a:lstStyle/>
+          <a:p>
+            <a:r>
+              <a:rPr lang="en-US" sz="1200" b="1">
+                <a:solidFill>
+                  <a:schemeClr val="tx1"/>
+                </a:solidFill>
+                <a:latin typeface="Segoe UI" panose="020B0502040204020203" pitchFamily="34" charset="0"/>
+                <a:cs typeface="Segoe UI" panose="020B0502040204020203" pitchFamily="34" charset="0"/>
+              </a:rPr>
+              <a:t>StudentMessages</a:t>
+            </a:r>
+            <a:endParaRPr sz="1200" b="1">
+              <a:solidFill>
+                <a:schemeClr val="tx1"/>
+              </a:solidFill>
+              <a:latin typeface="Segoe UI" panose="020B0502040204020203" pitchFamily="34" charset="0"/>
+              <a:cs typeface="Segoe UI" panose="020B0502040204020203" pitchFamily="34" charset="0"/>
+            </a:endParaRPr>
+          </a:p>
+          <a:p>
+            <a:r>
+              <a:rPr lang="en-US" sz="1000" i="1">
+                <a:solidFill>
+                  <a:schemeClr val="accent5"/>
+                </a:solidFill>
+                <a:latin typeface="Segoe UI" panose="020B0502040204020203" pitchFamily="34" charset="0"/>
+                <a:cs typeface="Segoe UI" panose="020B0502040204020203" pitchFamily="34" charset="0"/>
+              </a:rPr>
+              <a:t>StudentMessageId</a:t>
+            </a:r>
+          </a:p>
+          <a:p>
+            <a:r>
+              <a:rPr lang="en-US" sz="1000">
+                <a:solidFill>
+                  <a:schemeClr val="tx1"/>
+                </a:solidFill>
+                <a:latin typeface="Segoe UI" panose="020B0502040204020203" pitchFamily="34" charset="0"/>
+                <a:cs typeface="Segoe UI" panose="020B0502040204020203" pitchFamily="34" charset="0"/>
+              </a:rPr>
+              <a:t>StudentId</a:t>
+            </a:r>
+          </a:p>
+          <a:p>
+            <a:r>
+              <a:rPr lang="en-US" sz="1000">
+                <a:solidFill>
+                  <a:schemeClr val="tx1"/>
+                </a:solidFill>
+                <a:latin typeface="Segoe UI" panose="020B0502040204020203" pitchFamily="34" charset="0"/>
+                <a:cs typeface="Segoe UI" panose="020B0502040204020203" pitchFamily="34" charset="0"/>
+              </a:rPr>
+              <a:t>MessageId</a:t>
+            </a:r>
+          </a:p>
+          <a:p>
+            <a:r>
+              <a:rPr lang="en-US" sz="1000">
+                <a:solidFill>
+                  <a:schemeClr val="tx1"/>
+                </a:solidFill>
+                <a:latin typeface="Segoe UI" panose="020B0502040204020203" pitchFamily="34" charset="0"/>
+                <a:cs typeface="Segoe UI" panose="020B0502040204020203" pitchFamily="34" charset="0"/>
+              </a:rPr>
+              <a:t>DateTimeSent</a:t>
+            </a:r>
+          </a:p>
+          <a:p>
+            <a:r>
+              <a:rPr lang="en-US" sz="1000">
+                <a:solidFill>
+                  <a:schemeClr val="tx1"/>
+                </a:solidFill>
+                <a:latin typeface="Segoe UI" panose="020B0502040204020203" pitchFamily="34" charset="0"/>
+                <a:cs typeface="Segoe UI" panose="020B0502040204020203" pitchFamily="34" charset="0"/>
+              </a:rPr>
+              <a:t>DateTimeRead</a:t>
+            </a:r>
+          </a:p>
+          <a:p>
+            <a:r>
+              <a:rPr lang="en-US" sz="1000">
+                <a:solidFill>
+                  <a:schemeClr val="tx1"/>
+                </a:solidFill>
+                <a:latin typeface="Segoe UI" panose="020B0502040204020203" pitchFamily="34" charset="0"/>
+                <a:cs typeface="Segoe UI" panose="020B0502040204020203" pitchFamily="34" charset="0"/>
+              </a:rPr>
+              <a:t>Message</a:t>
+            </a:r>
+            <a:r>
+              <a:rPr lang="en-US" sz="1000">
+                <a:solidFill>
+                  <a:srgbClr val="C00000"/>
+                </a:solidFill>
+                <a:latin typeface="Segoe UI" panose="020B0502040204020203" pitchFamily="34" charset="0"/>
+                <a:cs typeface="Segoe UI" panose="020B0502040204020203" pitchFamily="34" charset="0"/>
+              </a:rPr>
+              <a:t>Tags</a:t>
+            </a:r>
+          </a:p>
+        </p:txBody>
+      </p:sp>
+      <p:sp>
+        <p:nvSpPr>
+          <p:cNvPr id="34" name="Rectangle: Rounded Corners 33">
+            <a:extLst>
+              <a:ext uri="{FF2B5EF4-FFF2-40B4-BE49-F238E27FC236}">
+                <a16:creationId xmlns:a16="http://schemas.microsoft.com/office/drawing/2014/main" id="{541408A2-7579-F8B0-AEEF-745D9491957E}"/>
+              </a:ext>
+            </a:extLst>
+          </p:cNvPr>
+          <p:cNvSpPr/>
+          <p:nvPr/>
+        </p:nvSpPr>
+        <p:spPr bwMode="auto">
+          <a:xfrm>
+            <a:off x="9491445" y="4908819"/>
+            <a:ext cx="391368" cy="261503"/>
+          </a:xfrm>
+          <a:prstGeom prst="roundRect">
+            <a:avLst/>
+          </a:prstGeom>
+          <a:solidFill>
+            <a:schemeClr val="tx1"/>
+          </a:solidFill>
         </p:spPr>
         <p:style>
           <a:lnRef idx="2">
@@ -8388,6 +8341,73 @@
           <a:bodyPr rtlCol="1" anchor="ctr"/>
           <a:lstStyle/>
           <a:p>
+            <a:pPr algn="ctr"/>
+            <a:r>
+              <a:rPr lang="en-US" sz="1200" b="1">
+                <a:latin typeface="Segoe UI" panose="020B0502040204020203" pitchFamily="34" charset="0"/>
+                <a:cs typeface="Segoe UI" panose="020B0502040204020203" pitchFamily="34" charset="0"/>
+              </a:rPr>
+              <a:t>17</a:t>
+            </a:r>
+            <a:endParaRPr lang="fa-IR" sz="1200" b="1">
+              <a:latin typeface="Segoe UI" panose="020B0502040204020203" pitchFamily="34" charset="0"/>
+              <a:cs typeface="Segoe UI" panose="020B0502040204020203" pitchFamily="34" charset="0"/>
+            </a:endParaRPr>
+          </a:p>
+        </p:txBody>
+      </p:sp>
+      <p:sp>
+        <p:nvSpPr>
+          <p:cNvPr id="15" name="Callout: Bent Line 14">
+            <a:extLst>
+              <a:ext uri="{FF2B5EF4-FFF2-40B4-BE49-F238E27FC236}">
+                <a16:creationId xmlns:a16="http://schemas.microsoft.com/office/drawing/2014/main" id="{67A1F549-A3AC-7F1E-3DDA-FEE24206EC9D}"/>
+              </a:ext>
+            </a:extLst>
+          </p:cNvPr>
+          <p:cNvSpPr/>
+          <p:nvPr/>
+        </p:nvSpPr>
+        <p:spPr bwMode="auto">
+          <a:xfrm>
+            <a:off x="8304971" y="5900011"/>
+            <a:ext cx="1349565" cy="886576"/>
+          </a:xfrm>
+          <a:prstGeom prst="borderCallout2">
+            <a:avLst>
+              <a:gd name="adj1" fmla="val -1181"/>
+              <a:gd name="adj2" fmla="val 95055"/>
+              <a:gd name="adj3" fmla="val -19311"/>
+              <a:gd name="adj4" fmla="val 95265"/>
+              <a:gd name="adj5" fmla="val -22280"/>
+              <a:gd name="adj6" fmla="val 84748"/>
+            </a:avLst>
+          </a:prstGeom>
+          <a:noFill/>
+          <a:ln>
+            <a:prstDash val="dash"/>
+          </a:ln>
+        </p:spPr>
+        <p:style>
+          <a:lnRef idx="2">
+            <a:schemeClr val="accent1">
+              <a:shade val="15000"/>
+            </a:schemeClr>
+          </a:lnRef>
+          <a:fillRef idx="1">
+            <a:schemeClr val="accent1"/>
+          </a:fillRef>
+          <a:effectRef idx="0">
+            <a:schemeClr val="accent1"/>
+          </a:effectRef>
+          <a:fontRef idx="minor">
+            <a:schemeClr val="lt1"/>
+          </a:fontRef>
+        </p:style>
+        <p:txBody>
+          <a:bodyPr rtlCol="1" anchor="ctr"/>
+          <a:lstStyle/>
+          <a:p>
             <a:pPr rtl="0">
               <a:buNone/>
             </a:pPr>
@@ -8445,9 +8465,7 @@
             </a:r>
           </a:p>
           <a:p>
-            <a:pPr rtl="0">
-              <a:buNone/>
-            </a:pPr>
+            <a:pPr rtl="0"/>
             <a:r>
               <a:rPr lang="en-US" sz="900" kern="100">
                 <a:solidFill>
@@ -8460,7 +8478,7 @@
                 <a:ea typeface="Calibri" panose="020F0502020204030204" pitchFamily="34" charset="0"/>
                 <a:cs typeface="Calibri Light" panose="020F0302020204030204" pitchFamily="34" charset="0"/>
               </a:rPr>
-              <a:t>8  Ans:Yes</a:t>
+              <a:t>8  TypeIsFeedback</a:t>
             </a:r>
           </a:p>
           <a:p>
@@ -8479,7 +8497,7 @@
                 <a:ea typeface="Calibri" panose="020F0502020204030204" pitchFamily="34" charset="0"/>
                 <a:cs typeface="Calibri Light" panose="020F0302020204030204" pitchFamily="34" charset="0"/>
               </a:rPr>
-              <a:t>16 Ans:No</a:t>
+              <a:t>16 Ans:Yes</a:t>
             </a:r>
           </a:p>
           <a:p>
@@ -8498,8 +8516,113 @@
                 <a:ea typeface="Calibri" panose="020F0502020204030204" pitchFamily="34" charset="0"/>
                 <a:cs typeface="Calibri Light" panose="020F0302020204030204" pitchFamily="34" charset="0"/>
               </a:rPr>
-              <a:t>32 TypeIsFeedback</a:t>
-            </a:r>
+              <a:t>32 Ans:No</a:t>
+            </a:r>
+          </a:p>
+        </p:txBody>
+      </p:sp>
+      <p:cxnSp>
+        <p:nvCxnSpPr>
+          <p:cNvPr id="120" name="Straight Arrow Connector 119">
+            <a:extLst>
+              <a:ext uri="{FF2B5EF4-FFF2-40B4-BE49-F238E27FC236}">
+                <a16:creationId xmlns:a16="http://schemas.microsoft.com/office/drawing/2014/main" id="{0A0B7755-0308-C645-5F18-8BD18AF57B12}"/>
+              </a:ext>
+            </a:extLst>
+          </p:cNvPr>
+          <p:cNvCxnSpPr>
+            <a:cxnSpLocks/>
+            <a:stCxn id="4" idx="1"/>
+            <a:endCxn id="41" idx="3"/>
+          </p:cNvCxnSpPr>
+          <p:nvPr/>
+        </p:nvCxnSpPr>
+        <p:spPr bwMode="auto">
+          <a:xfrm flipH="1">
+            <a:off x="1986755" y="2761958"/>
+            <a:ext cx="966708" cy="11757"/>
+          </a:xfrm>
+          <a:prstGeom prst="straightConnector1">
+            <a:avLst/>
+          </a:prstGeom>
+          <a:ln>
+            <a:solidFill>
+              <a:srgbClr val="C00000"/>
+            </a:solidFill>
+            <a:tailEnd type="triangle"/>
+          </a:ln>
+        </p:spPr>
+        <p:style>
+          <a:lnRef idx="1">
+            <a:schemeClr val="accent1"/>
+          </a:lnRef>
+          <a:fillRef idx="0">
+            <a:schemeClr val="accent1"/>
+          </a:fillRef>
+          <a:effectRef idx="0">
+            <a:schemeClr val="accent1"/>
+          </a:effectRef>
+          <a:fontRef idx="minor">
+            <a:schemeClr val="tx1"/>
+          </a:fontRef>
+        </p:style>
+      </p:cxnSp>
+      <p:sp>
+        <p:nvSpPr>
+          <p:cNvPr id="41" name="Rectangle: Rounded Corners 40">
+            <a:extLst>
+              <a:ext uri="{FF2B5EF4-FFF2-40B4-BE49-F238E27FC236}">
+                <a16:creationId xmlns:a16="http://schemas.microsoft.com/office/drawing/2014/main" id="{A2CA28B1-E10F-16B5-8CBC-C0B8B06ED81E}"/>
+              </a:ext>
+            </a:extLst>
+          </p:cNvPr>
+          <p:cNvSpPr/>
+          <p:nvPr/>
+        </p:nvSpPr>
+        <p:spPr bwMode="auto">
+          <a:xfrm>
+            <a:off x="1595387" y="2642963"/>
+            <a:ext cx="391368" cy="261503"/>
+          </a:xfrm>
+          <a:prstGeom prst="roundRect">
+            <a:avLst/>
+          </a:prstGeom>
+          <a:solidFill>
+            <a:schemeClr val="tx1"/>
+          </a:solidFill>
+        </p:spPr>
+        <p:style>
+          <a:lnRef idx="2">
+            <a:schemeClr val="accent1">
+              <a:shade val="15000"/>
+            </a:schemeClr>
+          </a:lnRef>
+          <a:fillRef idx="1">
+            <a:schemeClr val="accent1"/>
+          </a:fillRef>
+          <a:effectRef idx="0">
+            <a:schemeClr val="accent1"/>
+          </a:effectRef>
+          <a:fontRef idx="minor">
+            <a:schemeClr val="lt1"/>
+          </a:fontRef>
+        </p:style>
+        <p:txBody>
+          <a:bodyPr rtlCol="1" anchor="ctr"/>
+          <a:lstStyle/>
+          <a:p>
+            <a:pPr algn="ctr"/>
+            <a:r>
+              <a:rPr lang="en-US" sz="1200" b="1">
+                <a:latin typeface="Segoe UI" panose="020B0502040204020203" pitchFamily="34" charset="0"/>
+                <a:cs typeface="Segoe UI" panose="020B0502040204020203" pitchFamily="34" charset="0"/>
+              </a:rPr>
+              <a:t>15</a:t>
+            </a:r>
+            <a:endParaRPr lang="fa-IR" sz="1200" b="1">
+              <a:latin typeface="Segoe UI" panose="020B0502040204020203" pitchFamily="34" charset="0"/>
+              <a:cs typeface="Segoe UI" panose="020B0502040204020203" pitchFamily="34" charset="0"/>
+            </a:endParaRPr>
           </a:p>
         </p:txBody>
       </p:sp>
@@ -8547,8 +8670,8 @@
         </p:nvSpPr>
         <p:spPr bwMode="auto">
           <a:xfrm>
-            <a:off x="3648806" y="1832695"/>
-            <a:ext cx="1152128" cy="432048"/>
+            <a:off x="613550" y="1422400"/>
+            <a:ext cx="1465365" cy="261504"/>
           </a:xfrm>
           <a:prstGeom prst="roundRect">
             <a:avLst>
@@ -8620,7 +8743,7 @@
         </p:nvSpPr>
         <p:spPr bwMode="auto">
           <a:xfrm>
-            <a:off x="3738654" y="2814337"/>
+            <a:off x="4664968" y="104380"/>
             <a:ext cx="846256" cy="251020"/>
           </a:xfrm>
           <a:prstGeom prst="roundRect">
@@ -8669,7 +8792,7 @@
                 <a:latin typeface="Segoe UI" panose="020B0502040204020203" pitchFamily="34" charset="0"/>
                 <a:cs typeface="Segoe UI" panose="020B0502040204020203" pitchFamily="34" charset="0"/>
               </a:rPr>
-              <a:t>Users</a:t>
+              <a:t>Login</a:t>
             </a:r>
             <a:endParaRPr sz="1000">
               <a:solidFill>
@@ -8695,8 +8818,8 @@
         </p:nvSpPr>
         <p:spPr bwMode="auto">
           <a:xfrm>
-            <a:off x="3648806" y="3803943"/>
-            <a:ext cx="1152128" cy="432048"/>
+            <a:off x="8697416" y="3102616"/>
+            <a:ext cx="1070636" cy="251020"/>
           </a:xfrm>
           <a:prstGeom prst="roundRect">
             <a:avLst>
@@ -8768,8 +8891,8 @@
         </p:nvSpPr>
         <p:spPr bwMode="auto">
           <a:xfrm>
-            <a:off x="3094475" y="4187842"/>
-            <a:ext cx="846257" cy="251020"/>
+            <a:off x="8412633" y="2791618"/>
+            <a:ext cx="1355419" cy="251020"/>
           </a:xfrm>
           <a:prstGeom prst="roundRect">
             <a:avLst>
@@ -8777,7 +8900,9 @@
             </a:avLst>
           </a:prstGeom>
           <a:solidFill>
-            <a:schemeClr val="bg1"/>
+            <a:schemeClr val="bg1">
+              <a:lumMod val="95000"/>
+            </a:schemeClr>
           </a:solidFill>
           <a:ln>
             <a:solidFill>
@@ -8804,9 +8929,7 @@
           <a:bodyPr rtlCol="1" anchor="ctr"/>
           <a:lstStyle/>
           <a:p>
-            <a:pPr algn="ctr" rtl="0">
-              <a:defRPr/>
-            </a:pPr>
+            <a:pPr algn="ctr" rtl="0"/>
             <a:r>
               <a:rPr lang="en-US" sz="1200" b="1">
                 <a:solidFill>
@@ -8817,7 +8940,7 @@
               </a:rPr>
               <a:t>Students</a:t>
             </a:r>
-            <a:endParaRPr sz="1000">
+            <a:endParaRPr sz="1200" b="1">
               <a:solidFill>
                 <a:schemeClr val="tx1"/>
               </a:solidFill>
@@ -8841,8 +8964,8 @@
         </p:nvSpPr>
         <p:spPr bwMode="auto">
           <a:xfrm>
-            <a:off x="5088398" y="1922713"/>
-            <a:ext cx="1152128" cy="249732"/>
+            <a:off x="826699" y="1728389"/>
+            <a:ext cx="1245979" cy="249732"/>
           </a:xfrm>
           <a:prstGeom prst="roundRect">
             <a:avLst>
@@ -8914,8 +9037,8 @@
         </p:nvSpPr>
         <p:spPr bwMode="auto">
           <a:xfrm>
-            <a:off x="5737038" y="772296"/>
-            <a:ext cx="1080120" cy="432048"/>
+            <a:off x="613550" y="2575987"/>
+            <a:ext cx="1459130" cy="249732"/>
           </a:xfrm>
           <a:prstGeom prst="roundRect">
             <a:avLst>
@@ -8987,8 +9110,8 @@
         </p:nvSpPr>
         <p:spPr bwMode="auto">
           <a:xfrm>
-            <a:off x="6085300" y="1239690"/>
-            <a:ext cx="1080120" cy="237855"/>
+            <a:off x="829576" y="2864761"/>
+            <a:ext cx="1249340" cy="237855"/>
           </a:xfrm>
           <a:prstGeom prst="roundRect">
             <a:avLst>
@@ -9060,8 +9183,8 @@
         </p:nvSpPr>
         <p:spPr bwMode="auto">
           <a:xfrm>
-            <a:off x="5737038" y="3039132"/>
-            <a:ext cx="1080120" cy="432048"/>
+            <a:off x="604440" y="4376525"/>
+            <a:ext cx="1468239" cy="261504"/>
           </a:xfrm>
           <a:prstGeom prst="roundRect">
             <a:avLst>
@@ -9133,8 +9256,8 @@
         </p:nvSpPr>
         <p:spPr bwMode="auto">
           <a:xfrm>
-            <a:off x="6586705" y="3390208"/>
-            <a:ext cx="1800201" cy="237855"/>
+            <a:off x="823340" y="4694241"/>
+            <a:ext cx="1249340" cy="237855"/>
           </a:xfrm>
           <a:prstGeom prst="roundRect">
             <a:avLst>
@@ -9180,7 +9303,7 @@
                 <a:latin typeface="Segoe UI" panose="020B0502040204020203" pitchFamily="34" charset="0"/>
                 <a:cs typeface="Segoe UI" panose="020B0502040204020203" pitchFamily="34" charset="0"/>
               </a:rPr>
-              <a:t>ExamCompositions</a:t>
+              <a:t>ExamComps</a:t>
             </a:r>
             <a:endParaRPr sz="1000">
               <a:solidFill>
@@ -9206,8 +9329,8 @@
         </p:nvSpPr>
         <p:spPr bwMode="auto">
           <a:xfrm>
-            <a:off x="7033183" y="1832695"/>
-            <a:ext cx="1152128" cy="432048"/>
+            <a:off x="1823080" y="3639853"/>
+            <a:ext cx="1245978" cy="261503"/>
           </a:xfrm>
           <a:prstGeom prst="roundRect">
             <a:avLst>
@@ -9279,8 +9402,8 @@
         </p:nvSpPr>
         <p:spPr bwMode="auto">
           <a:xfrm>
-            <a:off x="8257318" y="1832695"/>
-            <a:ext cx="1584176" cy="432048"/>
+            <a:off x="4582577" y="3167497"/>
+            <a:ext cx="1724120" cy="261503"/>
           </a:xfrm>
           <a:prstGeom prst="roundRect">
             <a:avLst>
@@ -9352,8 +9475,8 @@
         </p:nvSpPr>
         <p:spPr bwMode="auto">
           <a:xfrm>
-            <a:off x="4692922" y="5539446"/>
-            <a:ext cx="1584176" cy="432048"/>
+            <a:off x="4336256" y="2863051"/>
+            <a:ext cx="1965017" cy="249732"/>
           </a:xfrm>
           <a:prstGeom prst="roundRect">
             <a:avLst>
@@ -9425,8 +9548,8 @@
         </p:nvSpPr>
         <p:spPr bwMode="auto">
           <a:xfrm>
-            <a:off x="277887" y="2723823"/>
-            <a:ext cx="1440160" cy="432048"/>
+            <a:off x="4341679" y="1767550"/>
+            <a:ext cx="1965018" cy="261503"/>
           </a:xfrm>
           <a:prstGeom prst="roundRect">
             <a:avLst>
@@ -9498,8 +9621,8 @@
         </p:nvSpPr>
         <p:spPr bwMode="auto">
           <a:xfrm>
-            <a:off x="358943" y="1844824"/>
-            <a:ext cx="1713737" cy="432048"/>
+            <a:off x="4592960" y="2087377"/>
+            <a:ext cx="1713737" cy="261503"/>
           </a:xfrm>
           <a:prstGeom prst="roundRect">
             <a:avLst>
@@ -9559,10 +9682,2367 @@
       </p:sp>
       <p:sp>
         <p:nvSpPr>
+          <p:cNvPr id="3" name="Rectangle: Rounded Corners 2">
+            <a:extLst>
+              <a:ext uri="{FF2B5EF4-FFF2-40B4-BE49-F238E27FC236}">
+                <a16:creationId xmlns:a16="http://schemas.microsoft.com/office/drawing/2014/main" id="{6C6E5A19-E85E-77F7-057B-7B3341F86A4F}"/>
+              </a:ext>
+            </a:extLst>
+          </p:cNvPr>
+          <p:cNvSpPr/>
+          <p:nvPr/>
+        </p:nvSpPr>
+        <p:spPr bwMode="auto">
+          <a:xfrm>
+            <a:off x="209583" y="1415366"/>
+            <a:ext cx="403969" cy="261503"/>
+          </a:xfrm>
+          <a:prstGeom prst="roundRect">
+            <a:avLst/>
+          </a:prstGeom>
+          <a:solidFill>
+            <a:schemeClr val="tx1"/>
+          </a:solidFill>
+        </p:spPr>
+        <p:style>
+          <a:lnRef idx="2">
+            <a:schemeClr val="accent1">
+              <a:shade val="15000"/>
+            </a:schemeClr>
+          </a:lnRef>
+          <a:fillRef idx="1">
+            <a:schemeClr val="accent1"/>
+          </a:fillRef>
+          <a:effectRef idx="0">
+            <a:schemeClr val="accent1"/>
+          </a:effectRef>
+          <a:fontRef idx="minor">
+            <a:schemeClr val="lt1"/>
+          </a:fontRef>
+        </p:style>
+        <p:txBody>
+          <a:bodyPr rtlCol="1" anchor="ctr"/>
+          <a:lstStyle/>
+          <a:p>
+            <a:pPr algn="ctr"/>
+            <a:r>
+              <a:rPr lang="en-US" sz="1200" b="1">
+                <a:latin typeface="Segoe UI" panose="020B0502040204020203" pitchFamily="34" charset="0"/>
+                <a:cs typeface="Segoe UI" panose="020B0502040204020203" pitchFamily="34" charset="0"/>
+              </a:rPr>
+              <a:t>2</a:t>
+            </a:r>
+            <a:endParaRPr lang="fa-IR" sz="1200" b="1">
+              <a:latin typeface="Segoe UI" panose="020B0502040204020203" pitchFamily="34" charset="0"/>
+              <a:cs typeface="Segoe UI" panose="020B0502040204020203" pitchFamily="34" charset="0"/>
+            </a:endParaRPr>
+          </a:p>
+        </p:txBody>
+      </p:sp>
+      <p:sp>
+        <p:nvSpPr>
+          <p:cNvPr id="18" name="Rectangle: Rounded Corners 17">
+            <a:extLst>
+              <a:ext uri="{FF2B5EF4-FFF2-40B4-BE49-F238E27FC236}">
+                <a16:creationId xmlns:a16="http://schemas.microsoft.com/office/drawing/2014/main" id="{2E823AB6-0A51-32D0-C7BA-2E155E6C4A95}"/>
+              </a:ext>
+            </a:extLst>
+          </p:cNvPr>
+          <p:cNvSpPr/>
+          <p:nvPr/>
+        </p:nvSpPr>
+        <p:spPr bwMode="auto">
+          <a:xfrm>
+            <a:off x="425607" y="1727337"/>
+            <a:ext cx="403969" cy="261503"/>
+          </a:xfrm>
+          <a:prstGeom prst="roundRect">
+            <a:avLst/>
+          </a:prstGeom>
+          <a:solidFill>
+            <a:schemeClr val="tx1"/>
+          </a:solidFill>
+        </p:spPr>
+        <p:style>
+          <a:lnRef idx="2">
+            <a:schemeClr val="accent1">
+              <a:shade val="15000"/>
+            </a:schemeClr>
+          </a:lnRef>
+          <a:fillRef idx="1">
+            <a:schemeClr val="accent1"/>
+          </a:fillRef>
+          <a:effectRef idx="0">
+            <a:schemeClr val="accent1"/>
+          </a:effectRef>
+          <a:fontRef idx="minor">
+            <a:schemeClr val="lt1"/>
+          </a:fontRef>
+        </p:style>
+        <p:txBody>
+          <a:bodyPr rtlCol="1" anchor="ctr"/>
+          <a:lstStyle/>
+          <a:p>
+            <a:pPr algn="ctr"/>
+            <a:r>
+              <a:rPr lang="en-US" sz="1200" b="1">
+                <a:latin typeface="Segoe UI" panose="020B0502040204020203" pitchFamily="34" charset="0"/>
+                <a:cs typeface="Segoe UI" panose="020B0502040204020203" pitchFamily="34" charset="0"/>
+              </a:rPr>
+              <a:t>3</a:t>
+            </a:r>
+            <a:endParaRPr lang="fa-IR" sz="1200" b="1">
+              <a:latin typeface="Segoe UI" panose="020B0502040204020203" pitchFamily="34" charset="0"/>
+              <a:cs typeface="Segoe UI" panose="020B0502040204020203" pitchFamily="34" charset="0"/>
+            </a:endParaRPr>
+          </a:p>
+        </p:txBody>
+      </p:sp>
+      <p:sp>
+        <p:nvSpPr>
+          <p:cNvPr id="19" name="Rectangle: Rounded Corners 18">
+            <a:extLst>
+              <a:ext uri="{FF2B5EF4-FFF2-40B4-BE49-F238E27FC236}">
+                <a16:creationId xmlns:a16="http://schemas.microsoft.com/office/drawing/2014/main" id="{80506A92-C627-2D82-BCD4-0E2E9C9E2A93}"/>
+              </a:ext>
+            </a:extLst>
+          </p:cNvPr>
+          <p:cNvSpPr/>
+          <p:nvPr/>
+        </p:nvSpPr>
+        <p:spPr bwMode="auto">
+          <a:xfrm>
+            <a:off x="206708" y="2567494"/>
+            <a:ext cx="403969" cy="261503"/>
+          </a:xfrm>
+          <a:prstGeom prst="roundRect">
+            <a:avLst/>
+          </a:prstGeom>
+          <a:solidFill>
+            <a:schemeClr val="tx1"/>
+          </a:solidFill>
+        </p:spPr>
+        <p:style>
+          <a:lnRef idx="2">
+            <a:schemeClr val="accent1">
+              <a:shade val="15000"/>
+            </a:schemeClr>
+          </a:lnRef>
+          <a:fillRef idx="1">
+            <a:schemeClr val="accent1"/>
+          </a:fillRef>
+          <a:effectRef idx="0">
+            <a:schemeClr val="accent1"/>
+          </a:effectRef>
+          <a:fontRef idx="minor">
+            <a:schemeClr val="lt1"/>
+          </a:fontRef>
+        </p:style>
+        <p:txBody>
+          <a:bodyPr rtlCol="1" anchor="ctr"/>
+          <a:lstStyle/>
+          <a:p>
+            <a:pPr algn="ctr"/>
+            <a:r>
+              <a:rPr lang="en-US" sz="1200" b="1">
+                <a:latin typeface="Segoe UI" panose="020B0502040204020203" pitchFamily="34" charset="0"/>
+                <a:cs typeface="Segoe UI" panose="020B0502040204020203" pitchFamily="34" charset="0"/>
+              </a:rPr>
+              <a:t>4</a:t>
+            </a:r>
+            <a:endParaRPr lang="fa-IR" sz="1200" b="1">
+              <a:latin typeface="Segoe UI" panose="020B0502040204020203" pitchFamily="34" charset="0"/>
+              <a:cs typeface="Segoe UI" panose="020B0502040204020203" pitchFamily="34" charset="0"/>
+            </a:endParaRPr>
+          </a:p>
+        </p:txBody>
+      </p:sp>
+      <p:sp>
+        <p:nvSpPr>
+          <p:cNvPr id="20" name="Rectangle: Rounded Corners 19">
+            <a:extLst>
+              <a:ext uri="{FF2B5EF4-FFF2-40B4-BE49-F238E27FC236}">
+                <a16:creationId xmlns:a16="http://schemas.microsoft.com/office/drawing/2014/main" id="{C6141F14-86F4-09B7-F9BC-DD3DFB3C5568}"/>
+              </a:ext>
+            </a:extLst>
+          </p:cNvPr>
+          <p:cNvSpPr/>
+          <p:nvPr/>
+        </p:nvSpPr>
+        <p:spPr bwMode="auto">
+          <a:xfrm>
+            <a:off x="422732" y="2852936"/>
+            <a:ext cx="403969" cy="261503"/>
+          </a:xfrm>
+          <a:prstGeom prst="roundRect">
+            <a:avLst/>
+          </a:prstGeom>
+          <a:solidFill>
+            <a:schemeClr val="tx1"/>
+          </a:solidFill>
+        </p:spPr>
+        <p:style>
+          <a:lnRef idx="2">
+            <a:schemeClr val="accent1">
+              <a:shade val="15000"/>
+            </a:schemeClr>
+          </a:lnRef>
+          <a:fillRef idx="1">
+            <a:schemeClr val="accent1"/>
+          </a:fillRef>
+          <a:effectRef idx="0">
+            <a:schemeClr val="accent1"/>
+          </a:effectRef>
+          <a:fontRef idx="minor">
+            <a:schemeClr val="lt1"/>
+          </a:fontRef>
+        </p:style>
+        <p:txBody>
+          <a:bodyPr rtlCol="1" anchor="ctr"/>
+          <a:lstStyle/>
+          <a:p>
+            <a:pPr algn="ctr"/>
+            <a:r>
+              <a:rPr lang="en-US" sz="1200" b="1">
+                <a:latin typeface="Segoe UI" panose="020B0502040204020203" pitchFamily="34" charset="0"/>
+                <a:cs typeface="Segoe UI" panose="020B0502040204020203" pitchFamily="34" charset="0"/>
+              </a:rPr>
+              <a:t>5</a:t>
+            </a:r>
+            <a:endParaRPr lang="fa-IR" sz="1200" b="1">
+              <a:latin typeface="Segoe UI" panose="020B0502040204020203" pitchFamily="34" charset="0"/>
+              <a:cs typeface="Segoe UI" panose="020B0502040204020203" pitchFamily="34" charset="0"/>
+            </a:endParaRPr>
+          </a:p>
+        </p:txBody>
+      </p:sp>
+      <p:sp>
+        <p:nvSpPr>
+          <p:cNvPr id="21" name="Rectangle: Rounded Corners 20">
+            <a:extLst>
+              <a:ext uri="{FF2B5EF4-FFF2-40B4-BE49-F238E27FC236}">
+                <a16:creationId xmlns:a16="http://schemas.microsoft.com/office/drawing/2014/main" id="{604AC010-6D83-33EC-62E6-3D3628888634}"/>
+              </a:ext>
+            </a:extLst>
+          </p:cNvPr>
+          <p:cNvSpPr/>
+          <p:nvPr/>
+        </p:nvSpPr>
+        <p:spPr bwMode="auto">
+          <a:xfrm>
+            <a:off x="200472" y="4372804"/>
+            <a:ext cx="403969" cy="261503"/>
+          </a:xfrm>
+          <a:prstGeom prst="roundRect">
+            <a:avLst/>
+          </a:prstGeom>
+          <a:solidFill>
+            <a:schemeClr val="tx1"/>
+          </a:solidFill>
+        </p:spPr>
+        <p:style>
+          <a:lnRef idx="2">
+            <a:schemeClr val="accent1">
+              <a:shade val="15000"/>
+            </a:schemeClr>
+          </a:lnRef>
+          <a:fillRef idx="1">
+            <a:schemeClr val="accent1"/>
+          </a:fillRef>
+          <a:effectRef idx="0">
+            <a:schemeClr val="accent1"/>
+          </a:effectRef>
+          <a:fontRef idx="minor">
+            <a:schemeClr val="lt1"/>
+          </a:fontRef>
+        </p:style>
+        <p:txBody>
+          <a:bodyPr rtlCol="1" anchor="ctr"/>
+          <a:lstStyle/>
+          <a:p>
+            <a:pPr algn="ctr"/>
+            <a:r>
+              <a:rPr lang="en-US" sz="1200" b="1">
+                <a:latin typeface="Segoe UI" panose="020B0502040204020203" pitchFamily="34" charset="0"/>
+                <a:cs typeface="Segoe UI" panose="020B0502040204020203" pitchFamily="34" charset="0"/>
+              </a:rPr>
+              <a:t>6</a:t>
+            </a:r>
+            <a:endParaRPr lang="fa-IR" sz="1200" b="1">
+              <a:latin typeface="Segoe UI" panose="020B0502040204020203" pitchFamily="34" charset="0"/>
+              <a:cs typeface="Segoe UI" panose="020B0502040204020203" pitchFamily="34" charset="0"/>
+            </a:endParaRPr>
+          </a:p>
+        </p:txBody>
+      </p:sp>
+      <p:sp>
+        <p:nvSpPr>
+          <p:cNvPr id="22" name="Rectangle: Rounded Corners 21">
+            <a:extLst>
+              <a:ext uri="{FF2B5EF4-FFF2-40B4-BE49-F238E27FC236}">
+                <a16:creationId xmlns:a16="http://schemas.microsoft.com/office/drawing/2014/main" id="{66218F53-4E7E-7846-3A64-AEA25DC1DA78}"/>
+              </a:ext>
+            </a:extLst>
+          </p:cNvPr>
+          <p:cNvSpPr/>
+          <p:nvPr/>
+        </p:nvSpPr>
+        <p:spPr bwMode="auto">
+          <a:xfrm>
+            <a:off x="1416238" y="3639853"/>
+            <a:ext cx="403966" cy="261503"/>
+          </a:xfrm>
+          <a:prstGeom prst="roundRect">
+            <a:avLst/>
+          </a:prstGeom>
+          <a:solidFill>
+            <a:schemeClr val="tx1"/>
+          </a:solidFill>
+        </p:spPr>
+        <p:style>
+          <a:lnRef idx="2">
+            <a:schemeClr val="accent1">
+              <a:shade val="15000"/>
+            </a:schemeClr>
+          </a:lnRef>
+          <a:fillRef idx="1">
+            <a:schemeClr val="accent1"/>
+          </a:fillRef>
+          <a:effectRef idx="0">
+            <a:schemeClr val="accent1"/>
+          </a:effectRef>
+          <a:fontRef idx="minor">
+            <a:schemeClr val="lt1"/>
+          </a:fontRef>
+        </p:style>
+        <p:txBody>
+          <a:bodyPr rtlCol="1" anchor="ctr"/>
+          <a:lstStyle/>
+          <a:p>
+            <a:pPr algn="ctr"/>
+            <a:r>
+              <a:rPr lang="en-US" sz="1200" b="1">
+                <a:latin typeface="Segoe UI" panose="020B0502040204020203" pitchFamily="34" charset="0"/>
+                <a:cs typeface="Segoe UI" panose="020B0502040204020203" pitchFamily="34" charset="0"/>
+              </a:rPr>
+              <a:t>8</a:t>
+            </a:r>
+            <a:endParaRPr lang="fa-IR" sz="1200" b="1">
+              <a:latin typeface="Segoe UI" panose="020B0502040204020203" pitchFamily="34" charset="0"/>
+              <a:cs typeface="Segoe UI" panose="020B0502040204020203" pitchFamily="34" charset="0"/>
+            </a:endParaRPr>
+          </a:p>
+        </p:txBody>
+      </p:sp>
+      <p:sp>
+        <p:nvSpPr>
+          <p:cNvPr id="23" name="Rectangle: Rounded Corners 22">
+            <a:extLst>
+              <a:ext uri="{FF2B5EF4-FFF2-40B4-BE49-F238E27FC236}">
+                <a16:creationId xmlns:a16="http://schemas.microsoft.com/office/drawing/2014/main" id="{F71CBD1C-529C-95A9-CD00-77CFBEDE60FB}"/>
+              </a:ext>
+            </a:extLst>
+          </p:cNvPr>
+          <p:cNvSpPr/>
+          <p:nvPr/>
+        </p:nvSpPr>
+        <p:spPr bwMode="auto">
+          <a:xfrm>
+            <a:off x="416496" y="4703313"/>
+            <a:ext cx="403969" cy="237855"/>
+          </a:xfrm>
+          <a:prstGeom prst="roundRect">
+            <a:avLst/>
+          </a:prstGeom>
+          <a:solidFill>
+            <a:schemeClr val="tx1"/>
+          </a:solidFill>
+        </p:spPr>
+        <p:style>
+          <a:lnRef idx="2">
+            <a:schemeClr val="accent1">
+              <a:shade val="15000"/>
+            </a:schemeClr>
+          </a:lnRef>
+          <a:fillRef idx="1">
+            <a:schemeClr val="accent1"/>
+          </a:fillRef>
+          <a:effectRef idx="0">
+            <a:schemeClr val="accent1"/>
+          </a:effectRef>
+          <a:fontRef idx="minor">
+            <a:schemeClr val="lt1"/>
+          </a:fontRef>
+        </p:style>
+        <p:txBody>
+          <a:bodyPr rtlCol="1" anchor="ctr"/>
+          <a:lstStyle/>
+          <a:p>
+            <a:pPr algn="ctr"/>
+            <a:r>
+              <a:rPr lang="en-US" sz="1200" b="1">
+                <a:latin typeface="Segoe UI" panose="020B0502040204020203" pitchFamily="34" charset="0"/>
+                <a:cs typeface="Segoe UI" panose="020B0502040204020203" pitchFamily="34" charset="0"/>
+              </a:rPr>
+              <a:t>7</a:t>
+            </a:r>
+            <a:endParaRPr lang="fa-IR" sz="1200" b="1">
+              <a:latin typeface="Segoe UI" panose="020B0502040204020203" pitchFamily="34" charset="0"/>
+              <a:cs typeface="Segoe UI" panose="020B0502040204020203" pitchFamily="34" charset="0"/>
+            </a:endParaRPr>
+          </a:p>
+        </p:txBody>
+      </p:sp>
+      <p:sp>
+        <p:nvSpPr>
+          <p:cNvPr id="24" name="Rectangle: Rounded Corners 23">
+            <a:extLst>
+              <a:ext uri="{FF2B5EF4-FFF2-40B4-BE49-F238E27FC236}">
+                <a16:creationId xmlns:a16="http://schemas.microsoft.com/office/drawing/2014/main" id="{9B31348A-FBF9-A1ED-AC2F-6CA801913EB2}"/>
+              </a:ext>
+            </a:extLst>
+          </p:cNvPr>
+          <p:cNvSpPr/>
+          <p:nvPr/>
+        </p:nvSpPr>
+        <p:spPr bwMode="auto">
+          <a:xfrm>
+            <a:off x="8306049" y="3102616"/>
+            <a:ext cx="391368" cy="261503"/>
+          </a:xfrm>
+          <a:prstGeom prst="roundRect">
+            <a:avLst/>
+          </a:prstGeom>
+          <a:solidFill>
+            <a:schemeClr val="tx1"/>
+          </a:solidFill>
+        </p:spPr>
+        <p:style>
+          <a:lnRef idx="2">
+            <a:schemeClr val="accent1">
+              <a:shade val="15000"/>
+            </a:schemeClr>
+          </a:lnRef>
+          <a:fillRef idx="1">
+            <a:schemeClr val="accent1"/>
+          </a:fillRef>
+          <a:effectRef idx="0">
+            <a:schemeClr val="accent1"/>
+          </a:effectRef>
+          <a:fontRef idx="minor">
+            <a:schemeClr val="lt1"/>
+          </a:fontRef>
+        </p:style>
+        <p:txBody>
+          <a:bodyPr rtlCol="1" anchor="ctr"/>
+          <a:lstStyle/>
+          <a:p>
+            <a:pPr algn="ctr"/>
+            <a:r>
+              <a:rPr lang="en-US" sz="1200" b="1">
+                <a:latin typeface="Segoe UI" panose="020B0502040204020203" pitchFamily="34" charset="0"/>
+                <a:cs typeface="Segoe UI" panose="020B0502040204020203" pitchFamily="34" charset="0"/>
+              </a:rPr>
+              <a:t>9</a:t>
+            </a:r>
+            <a:endParaRPr lang="fa-IR" sz="1200" b="1">
+              <a:latin typeface="Segoe UI" panose="020B0502040204020203" pitchFamily="34" charset="0"/>
+              <a:cs typeface="Segoe UI" panose="020B0502040204020203" pitchFamily="34" charset="0"/>
+            </a:endParaRPr>
+          </a:p>
+        </p:txBody>
+      </p:sp>
+      <p:sp>
+        <p:nvSpPr>
+          <p:cNvPr id="25" name="Rectangle: Rounded Corners 24">
+            <a:extLst>
+              <a:ext uri="{FF2B5EF4-FFF2-40B4-BE49-F238E27FC236}">
+                <a16:creationId xmlns:a16="http://schemas.microsoft.com/office/drawing/2014/main" id="{191D76E8-7214-17C6-F9ED-7155246EDE04}"/>
+              </a:ext>
+            </a:extLst>
+          </p:cNvPr>
+          <p:cNvSpPr/>
+          <p:nvPr/>
+        </p:nvSpPr>
+        <p:spPr bwMode="auto">
+          <a:xfrm>
+            <a:off x="8021265" y="2791618"/>
+            <a:ext cx="391368" cy="261503"/>
+          </a:xfrm>
+          <a:prstGeom prst="roundRect">
+            <a:avLst/>
+          </a:prstGeom>
+          <a:solidFill>
+            <a:schemeClr val="tx1"/>
+          </a:solidFill>
+        </p:spPr>
+        <p:style>
+          <a:lnRef idx="2">
+            <a:schemeClr val="accent1">
+              <a:shade val="15000"/>
+            </a:schemeClr>
+          </a:lnRef>
+          <a:fillRef idx="1">
+            <a:schemeClr val="accent1"/>
+          </a:fillRef>
+          <a:effectRef idx="0">
+            <a:schemeClr val="accent1"/>
+          </a:effectRef>
+          <a:fontRef idx="minor">
+            <a:schemeClr val="lt1"/>
+          </a:fontRef>
+        </p:style>
+        <p:txBody>
+          <a:bodyPr rtlCol="1" anchor="ctr"/>
+          <a:lstStyle/>
+          <a:p>
+            <a:pPr algn="ctr"/>
+            <a:r>
+              <a:rPr lang="en-US" sz="1200" b="1">
+                <a:latin typeface="Segoe UI" panose="020B0502040204020203" pitchFamily="34" charset="0"/>
+                <a:cs typeface="Segoe UI" panose="020B0502040204020203" pitchFamily="34" charset="0"/>
+              </a:rPr>
+              <a:t>10</a:t>
+            </a:r>
+            <a:endParaRPr lang="fa-IR" sz="1200" b="1">
+              <a:latin typeface="Segoe UI" panose="020B0502040204020203" pitchFamily="34" charset="0"/>
+              <a:cs typeface="Segoe UI" panose="020B0502040204020203" pitchFamily="34" charset="0"/>
+            </a:endParaRPr>
+          </a:p>
+        </p:txBody>
+      </p:sp>
+      <p:sp>
+        <p:nvSpPr>
+          <p:cNvPr id="26" name="Rectangle: Rounded Corners 25">
+            <a:extLst>
+              <a:ext uri="{FF2B5EF4-FFF2-40B4-BE49-F238E27FC236}">
+                <a16:creationId xmlns:a16="http://schemas.microsoft.com/office/drawing/2014/main" id="{CA4A9FD8-959B-38C0-1D77-3997B806CA72}"/>
+              </a:ext>
+            </a:extLst>
+          </p:cNvPr>
+          <p:cNvSpPr/>
+          <p:nvPr/>
+        </p:nvSpPr>
+        <p:spPr bwMode="auto">
+          <a:xfrm>
+            <a:off x="3955272" y="2857165"/>
+            <a:ext cx="391368" cy="261503"/>
+          </a:xfrm>
+          <a:prstGeom prst="roundRect">
+            <a:avLst/>
+          </a:prstGeom>
+          <a:solidFill>
+            <a:schemeClr val="tx1"/>
+          </a:solidFill>
+        </p:spPr>
+        <p:style>
+          <a:lnRef idx="2">
+            <a:schemeClr val="accent1">
+              <a:shade val="15000"/>
+            </a:schemeClr>
+          </a:lnRef>
+          <a:fillRef idx="1">
+            <a:schemeClr val="accent1"/>
+          </a:fillRef>
+          <a:effectRef idx="0">
+            <a:schemeClr val="accent1"/>
+          </a:effectRef>
+          <a:fontRef idx="minor">
+            <a:schemeClr val="lt1"/>
+          </a:fontRef>
+        </p:style>
+        <p:txBody>
+          <a:bodyPr rtlCol="1" anchor="ctr"/>
+          <a:lstStyle/>
+          <a:p>
+            <a:pPr algn="ctr"/>
+            <a:r>
+              <a:rPr lang="en-US" sz="1200" b="1">
+                <a:latin typeface="Segoe UI" panose="020B0502040204020203" pitchFamily="34" charset="0"/>
+                <a:cs typeface="Segoe UI" panose="020B0502040204020203" pitchFamily="34" charset="0"/>
+              </a:rPr>
+              <a:t>11</a:t>
+            </a:r>
+            <a:endParaRPr lang="fa-IR" sz="1200" b="1">
+              <a:latin typeface="Segoe UI" panose="020B0502040204020203" pitchFamily="34" charset="0"/>
+              <a:cs typeface="Segoe UI" panose="020B0502040204020203" pitchFamily="34" charset="0"/>
+            </a:endParaRPr>
+          </a:p>
+        </p:txBody>
+      </p:sp>
+      <p:sp>
+        <p:nvSpPr>
+          <p:cNvPr id="27" name="Rectangle: Rounded Corners 26">
+            <a:extLst>
+              <a:ext uri="{FF2B5EF4-FFF2-40B4-BE49-F238E27FC236}">
+                <a16:creationId xmlns:a16="http://schemas.microsoft.com/office/drawing/2014/main" id="{9635EA43-F3DB-E2F8-479F-52C5BE0D6683}"/>
+              </a:ext>
+            </a:extLst>
+          </p:cNvPr>
+          <p:cNvSpPr/>
+          <p:nvPr/>
+        </p:nvSpPr>
+        <p:spPr bwMode="auto">
+          <a:xfrm>
+            <a:off x="4191208" y="3167496"/>
+            <a:ext cx="391368" cy="261503"/>
+          </a:xfrm>
+          <a:prstGeom prst="roundRect">
+            <a:avLst/>
+          </a:prstGeom>
+          <a:solidFill>
+            <a:schemeClr val="tx1"/>
+          </a:solidFill>
+        </p:spPr>
+        <p:style>
+          <a:lnRef idx="2">
+            <a:schemeClr val="accent1">
+              <a:shade val="15000"/>
+            </a:schemeClr>
+          </a:lnRef>
+          <a:fillRef idx="1">
+            <a:schemeClr val="accent1"/>
+          </a:fillRef>
+          <a:effectRef idx="0">
+            <a:schemeClr val="accent1"/>
+          </a:effectRef>
+          <a:fontRef idx="minor">
+            <a:schemeClr val="lt1"/>
+          </a:fontRef>
+        </p:style>
+        <p:txBody>
+          <a:bodyPr rtlCol="1" anchor="ctr"/>
+          <a:lstStyle/>
+          <a:p>
+            <a:pPr algn="ctr"/>
+            <a:r>
+              <a:rPr lang="en-US" sz="1200" b="1">
+                <a:latin typeface="Segoe UI" panose="020B0502040204020203" pitchFamily="34" charset="0"/>
+                <a:cs typeface="Segoe UI" panose="020B0502040204020203" pitchFamily="34" charset="0"/>
+              </a:rPr>
+              <a:t>12</a:t>
+            </a:r>
+            <a:endParaRPr lang="fa-IR" sz="1200" b="1">
+              <a:latin typeface="Segoe UI" panose="020B0502040204020203" pitchFamily="34" charset="0"/>
+              <a:cs typeface="Segoe UI" panose="020B0502040204020203" pitchFamily="34" charset="0"/>
+            </a:endParaRPr>
+          </a:p>
+        </p:txBody>
+      </p:sp>
+      <p:sp>
+        <p:nvSpPr>
+          <p:cNvPr id="28" name="Rectangle: Rounded Corners 27">
+            <a:extLst>
+              <a:ext uri="{FF2B5EF4-FFF2-40B4-BE49-F238E27FC236}">
+                <a16:creationId xmlns:a16="http://schemas.microsoft.com/office/drawing/2014/main" id="{E4EF6A6F-25B6-33A8-027B-D62A4D82E484}"/>
+              </a:ext>
+            </a:extLst>
+          </p:cNvPr>
+          <p:cNvSpPr/>
+          <p:nvPr/>
+        </p:nvSpPr>
+        <p:spPr bwMode="auto">
+          <a:xfrm>
+            <a:off x="3961021" y="1771160"/>
+            <a:ext cx="391368" cy="261503"/>
+          </a:xfrm>
+          <a:prstGeom prst="roundRect">
+            <a:avLst/>
+          </a:prstGeom>
+          <a:solidFill>
+            <a:schemeClr val="tx1"/>
+          </a:solidFill>
+        </p:spPr>
+        <p:style>
+          <a:lnRef idx="2">
+            <a:schemeClr val="accent1">
+              <a:shade val="15000"/>
+            </a:schemeClr>
+          </a:lnRef>
+          <a:fillRef idx="1">
+            <a:schemeClr val="accent1"/>
+          </a:fillRef>
+          <a:effectRef idx="0">
+            <a:schemeClr val="accent1"/>
+          </a:effectRef>
+          <a:fontRef idx="minor">
+            <a:schemeClr val="lt1"/>
+          </a:fontRef>
+        </p:style>
+        <p:txBody>
+          <a:bodyPr rtlCol="1" anchor="ctr"/>
+          <a:lstStyle/>
+          <a:p>
+            <a:pPr algn="ctr"/>
+            <a:r>
+              <a:rPr lang="en-US" sz="1200" b="1">
+                <a:latin typeface="Segoe UI" panose="020B0502040204020203" pitchFamily="34" charset="0"/>
+                <a:cs typeface="Segoe UI" panose="020B0502040204020203" pitchFamily="34" charset="0"/>
+              </a:rPr>
+              <a:t>13</a:t>
+            </a:r>
+            <a:endParaRPr lang="fa-IR" sz="1200" b="1">
+              <a:latin typeface="Segoe UI" panose="020B0502040204020203" pitchFamily="34" charset="0"/>
+              <a:cs typeface="Segoe UI" panose="020B0502040204020203" pitchFamily="34" charset="0"/>
+            </a:endParaRPr>
+          </a:p>
+        </p:txBody>
+      </p:sp>
+      <p:sp>
+        <p:nvSpPr>
+          <p:cNvPr id="29" name="Rectangle: Rounded Corners 28">
+            <a:extLst>
+              <a:ext uri="{FF2B5EF4-FFF2-40B4-BE49-F238E27FC236}">
+                <a16:creationId xmlns:a16="http://schemas.microsoft.com/office/drawing/2014/main" id="{D9D7D786-C6AB-16AF-9442-77A87021CC54}"/>
+              </a:ext>
+            </a:extLst>
+          </p:cNvPr>
+          <p:cNvSpPr/>
+          <p:nvPr/>
+        </p:nvSpPr>
+        <p:spPr bwMode="auto">
+          <a:xfrm>
+            <a:off x="4201591" y="2081492"/>
+            <a:ext cx="391368" cy="261503"/>
+          </a:xfrm>
+          <a:prstGeom prst="roundRect">
+            <a:avLst/>
+          </a:prstGeom>
+          <a:solidFill>
+            <a:schemeClr val="tx1"/>
+          </a:solidFill>
+        </p:spPr>
+        <p:style>
+          <a:lnRef idx="2">
+            <a:schemeClr val="accent1">
+              <a:shade val="15000"/>
+            </a:schemeClr>
+          </a:lnRef>
+          <a:fillRef idx="1">
+            <a:schemeClr val="accent1"/>
+          </a:fillRef>
+          <a:effectRef idx="0">
+            <a:schemeClr val="accent1"/>
+          </a:effectRef>
+          <a:fontRef idx="minor">
+            <a:schemeClr val="lt1"/>
+          </a:fontRef>
+        </p:style>
+        <p:txBody>
+          <a:bodyPr rtlCol="1" anchor="ctr"/>
+          <a:lstStyle/>
+          <a:p>
+            <a:pPr algn="ctr"/>
+            <a:r>
+              <a:rPr lang="en-US" sz="1200" b="1">
+                <a:latin typeface="Segoe UI" panose="020B0502040204020203" pitchFamily="34" charset="0"/>
+                <a:cs typeface="Segoe UI" panose="020B0502040204020203" pitchFamily="34" charset="0"/>
+              </a:rPr>
+              <a:t>14</a:t>
+            </a:r>
+            <a:endParaRPr lang="fa-IR" sz="1200" b="1">
+              <a:latin typeface="Segoe UI" panose="020B0502040204020203" pitchFamily="34" charset="0"/>
+              <a:cs typeface="Segoe UI" panose="020B0502040204020203" pitchFamily="34" charset="0"/>
+            </a:endParaRPr>
+          </a:p>
+        </p:txBody>
+      </p:sp>
+      <p:sp>
+        <p:nvSpPr>
+          <p:cNvPr id="30" name="Rectangle: Rounded Corners 44">
+            <a:extLst>
+              <a:ext uri="{FF2B5EF4-FFF2-40B4-BE49-F238E27FC236}">
+                <a16:creationId xmlns:a16="http://schemas.microsoft.com/office/drawing/2014/main" id="{50C3D96D-85B0-4E5F-F5C0-F508F1A82CB5}"/>
+              </a:ext>
+            </a:extLst>
+          </p:cNvPr>
+          <p:cNvSpPr/>
+          <p:nvPr/>
+        </p:nvSpPr>
+        <p:spPr bwMode="auto">
+          <a:xfrm>
+            <a:off x="610677" y="780122"/>
+            <a:ext cx="1212404" cy="251020"/>
+          </a:xfrm>
+          <a:prstGeom prst="roundRect">
+            <a:avLst>
+              <a:gd name="adj" fmla="val 9941"/>
+            </a:avLst>
+          </a:prstGeom>
+          <a:solidFill>
+            <a:schemeClr val="bg1">
+              <a:lumMod val="95000"/>
+            </a:schemeClr>
+          </a:solidFill>
+          <a:ln>
+            <a:solidFill>
+              <a:schemeClr val="tx1"/>
+            </a:solidFill>
+          </a:ln>
+          <a:effectLst/>
+        </p:spPr>
+        <p:style>
+          <a:lnRef idx="0">
+            <a:schemeClr val="accent4"/>
+          </a:lnRef>
+          <a:fillRef idx="3">
+            <a:schemeClr val="accent4"/>
+          </a:fillRef>
+          <a:effectRef idx="3">
+            <a:schemeClr val="accent4"/>
+          </a:effectRef>
+          <a:fontRef idx="minor">
+            <a:schemeClr val="lt1"/>
+          </a:fontRef>
+        </p:style>
+        <p:txBody>
+          <a:bodyPr rtlCol="1" anchor="ctr"/>
+          <a:lstStyle/>
+          <a:p>
+            <a:pPr algn="ctr" rtl="0">
+              <a:defRPr/>
+            </a:pPr>
+            <a:r>
+              <a:rPr lang="en-US" sz="1200" b="1">
+                <a:solidFill>
+                  <a:schemeClr val="tx1"/>
+                </a:solidFill>
+                <a:latin typeface="Segoe UI" panose="020B0502040204020203" pitchFamily="34" charset="0"/>
+                <a:cs typeface="Segoe UI" panose="020B0502040204020203" pitchFamily="34" charset="0"/>
+              </a:rPr>
+              <a:t>Users</a:t>
+            </a:r>
+            <a:endParaRPr sz="1000">
+              <a:solidFill>
+                <a:schemeClr val="tx1"/>
+              </a:solidFill>
+              <a:latin typeface="Segoe UI" panose="020B0502040204020203" pitchFamily="34" charset="0"/>
+              <a:cs typeface="Segoe UI" panose="020B0502040204020203" pitchFamily="34" charset="0"/>
+            </a:endParaRPr>
+          </a:p>
+        </p:txBody>
+      </p:sp>
+      <p:sp>
+        <p:nvSpPr>
+          <p:cNvPr id="35" name="Rectangle: Rounded Corners 34">
+            <a:extLst>
+              <a:ext uri="{FF2B5EF4-FFF2-40B4-BE49-F238E27FC236}">
+                <a16:creationId xmlns:a16="http://schemas.microsoft.com/office/drawing/2014/main" id="{E968FA60-D131-D2E0-E416-712EECC32398}"/>
+              </a:ext>
+            </a:extLst>
+          </p:cNvPr>
+          <p:cNvSpPr/>
+          <p:nvPr/>
+        </p:nvSpPr>
+        <p:spPr bwMode="auto">
+          <a:xfrm>
+            <a:off x="206708" y="774695"/>
+            <a:ext cx="403969" cy="261503"/>
+          </a:xfrm>
+          <a:prstGeom prst="roundRect">
+            <a:avLst/>
+          </a:prstGeom>
+          <a:solidFill>
+            <a:schemeClr val="tx1"/>
+          </a:solidFill>
+        </p:spPr>
+        <p:style>
+          <a:lnRef idx="2">
+            <a:schemeClr val="accent1">
+              <a:shade val="15000"/>
+            </a:schemeClr>
+          </a:lnRef>
+          <a:fillRef idx="1">
+            <a:schemeClr val="accent1"/>
+          </a:fillRef>
+          <a:effectRef idx="0">
+            <a:schemeClr val="accent1"/>
+          </a:effectRef>
+          <a:fontRef idx="minor">
+            <a:schemeClr val="lt1"/>
+          </a:fontRef>
+        </p:style>
+        <p:txBody>
+          <a:bodyPr rtlCol="1" anchor="ctr"/>
+          <a:lstStyle/>
+          <a:p>
+            <a:pPr algn="ctr"/>
+            <a:r>
+              <a:rPr lang="en-US" sz="1200" b="1">
+                <a:latin typeface="Segoe UI" panose="020B0502040204020203" pitchFamily="34" charset="0"/>
+                <a:cs typeface="Segoe UI" panose="020B0502040204020203" pitchFamily="34" charset="0"/>
+              </a:rPr>
+              <a:t>1</a:t>
+            </a:r>
+            <a:endParaRPr lang="fa-IR" sz="1200" b="1">
+              <a:latin typeface="Segoe UI" panose="020B0502040204020203" pitchFamily="34" charset="0"/>
+              <a:cs typeface="Segoe UI" panose="020B0502040204020203" pitchFamily="34" charset="0"/>
+            </a:endParaRPr>
+          </a:p>
+        </p:txBody>
+      </p:sp>
+      <p:sp>
+        <p:nvSpPr>
+          <p:cNvPr id="36" name="Rectangle: Rounded Corners 44">
+            <a:extLst>
+              <a:ext uri="{FF2B5EF4-FFF2-40B4-BE49-F238E27FC236}">
+                <a16:creationId xmlns:a16="http://schemas.microsoft.com/office/drawing/2014/main" id="{57E3E993-722C-8235-6607-66129CE60A34}"/>
+              </a:ext>
+            </a:extLst>
+          </p:cNvPr>
+          <p:cNvSpPr/>
+          <p:nvPr/>
+        </p:nvSpPr>
+        <p:spPr bwMode="auto">
+          <a:xfrm>
+            <a:off x="604441" y="5615768"/>
+            <a:ext cx="1468238" cy="261504"/>
+          </a:xfrm>
+          <a:prstGeom prst="roundRect">
+            <a:avLst>
+              <a:gd name="adj" fmla="val 9941"/>
+            </a:avLst>
+          </a:prstGeom>
+          <a:solidFill>
+            <a:schemeClr val="bg1"/>
+          </a:solidFill>
+          <a:ln>
+            <a:solidFill>
+              <a:schemeClr val="tx1"/>
+            </a:solidFill>
+          </a:ln>
+          <a:effectLst/>
+        </p:spPr>
+        <p:style>
+          <a:lnRef idx="0">
+            <a:schemeClr val="accent4"/>
+          </a:lnRef>
+          <a:fillRef idx="3">
+            <a:schemeClr val="accent4"/>
+          </a:fillRef>
+          <a:effectRef idx="3">
+            <a:schemeClr val="accent4"/>
+          </a:effectRef>
+          <a:fontRef idx="minor">
+            <a:schemeClr val="lt1"/>
+          </a:fontRef>
+        </p:style>
+        <p:txBody>
+          <a:bodyPr rtlCol="1" anchor="ctr"/>
+          <a:lstStyle/>
+          <a:p>
+            <a:pPr algn="ctr" rtl="0">
+              <a:defRPr/>
+            </a:pPr>
+            <a:r>
+              <a:rPr lang="en-US" sz="1200" b="1">
+                <a:solidFill>
+                  <a:schemeClr val="tx1"/>
+                </a:solidFill>
+                <a:latin typeface="Segoe UI" panose="020B0502040204020203" pitchFamily="34" charset="0"/>
+                <a:cs typeface="Segoe UI" panose="020B0502040204020203" pitchFamily="34" charset="0"/>
+              </a:rPr>
+              <a:t>Messages</a:t>
+            </a:r>
+            <a:endParaRPr sz="1000">
+              <a:solidFill>
+                <a:schemeClr val="tx1"/>
+              </a:solidFill>
+              <a:latin typeface="Segoe UI" panose="020B0502040204020203" pitchFamily="34" charset="0"/>
+              <a:cs typeface="Segoe UI" panose="020B0502040204020203" pitchFamily="34" charset="0"/>
+            </a:endParaRPr>
+          </a:p>
+        </p:txBody>
+      </p:sp>
+      <p:sp>
+        <p:nvSpPr>
+          <p:cNvPr id="37" name="Rectangle: Rounded Corners 36">
+            <a:extLst>
+              <a:ext uri="{FF2B5EF4-FFF2-40B4-BE49-F238E27FC236}">
+                <a16:creationId xmlns:a16="http://schemas.microsoft.com/office/drawing/2014/main" id="{AE9FFDB9-2FEB-E09E-E68B-B010B5307EC6}"/>
+              </a:ext>
+            </a:extLst>
+          </p:cNvPr>
+          <p:cNvSpPr/>
+          <p:nvPr/>
+        </p:nvSpPr>
+        <p:spPr bwMode="auto">
+          <a:xfrm>
+            <a:off x="206708" y="5612047"/>
+            <a:ext cx="397733" cy="261503"/>
+          </a:xfrm>
+          <a:prstGeom prst="roundRect">
+            <a:avLst/>
+          </a:prstGeom>
+          <a:solidFill>
+            <a:schemeClr val="tx1"/>
+          </a:solidFill>
+        </p:spPr>
+        <p:style>
+          <a:lnRef idx="2">
+            <a:schemeClr val="accent1">
+              <a:shade val="15000"/>
+            </a:schemeClr>
+          </a:lnRef>
+          <a:fillRef idx="1">
+            <a:schemeClr val="accent1"/>
+          </a:fillRef>
+          <a:effectRef idx="0">
+            <a:schemeClr val="accent1"/>
+          </a:effectRef>
+          <a:fontRef idx="minor">
+            <a:schemeClr val="lt1"/>
+          </a:fontRef>
+        </p:style>
+        <p:txBody>
+          <a:bodyPr rtlCol="1" anchor="ctr"/>
+          <a:lstStyle/>
+          <a:p>
+            <a:pPr algn="ctr"/>
+            <a:r>
+              <a:rPr lang="en-US" sz="1200" b="1">
+                <a:latin typeface="Segoe UI" panose="020B0502040204020203" pitchFamily="34" charset="0"/>
+                <a:cs typeface="Segoe UI" panose="020B0502040204020203" pitchFamily="34" charset="0"/>
+              </a:rPr>
+              <a:t>16</a:t>
+            </a:r>
+            <a:endParaRPr lang="fa-IR" sz="1200" b="1">
+              <a:latin typeface="Segoe UI" panose="020B0502040204020203" pitchFamily="34" charset="0"/>
+              <a:cs typeface="Segoe UI" panose="020B0502040204020203" pitchFamily="34" charset="0"/>
+            </a:endParaRPr>
+          </a:p>
+        </p:txBody>
+      </p:sp>
+      <p:sp>
+        <p:nvSpPr>
+          <p:cNvPr id="38" name="Rectangle: Rounded Corners 44">
+            <a:extLst>
+              <a:ext uri="{FF2B5EF4-FFF2-40B4-BE49-F238E27FC236}">
+                <a16:creationId xmlns:a16="http://schemas.microsoft.com/office/drawing/2014/main" id="{FCE95780-500B-3264-5CDD-47FC649AE466}"/>
+              </a:ext>
+            </a:extLst>
+          </p:cNvPr>
+          <p:cNvSpPr/>
+          <p:nvPr/>
+        </p:nvSpPr>
+        <p:spPr bwMode="auto">
+          <a:xfrm>
+            <a:off x="4331065" y="5612047"/>
+            <a:ext cx="1975631" cy="249732"/>
+          </a:xfrm>
+          <a:prstGeom prst="roundRect">
+            <a:avLst>
+              <a:gd name="adj" fmla="val 9941"/>
+            </a:avLst>
+          </a:prstGeom>
+          <a:solidFill>
+            <a:schemeClr val="bg1"/>
+          </a:solidFill>
+          <a:ln>
+            <a:solidFill>
+              <a:schemeClr val="tx1"/>
+            </a:solidFill>
+          </a:ln>
+          <a:effectLst/>
+        </p:spPr>
+        <p:style>
+          <a:lnRef idx="0">
+            <a:schemeClr val="accent4"/>
+          </a:lnRef>
+          <a:fillRef idx="3">
+            <a:schemeClr val="accent4"/>
+          </a:fillRef>
+          <a:effectRef idx="3">
+            <a:schemeClr val="accent4"/>
+          </a:effectRef>
+          <a:fontRef idx="minor">
+            <a:schemeClr val="lt1"/>
+          </a:fontRef>
+        </p:style>
+        <p:txBody>
+          <a:bodyPr rtlCol="1" anchor="ctr"/>
+          <a:lstStyle/>
+          <a:p>
+            <a:pPr algn="ctr" rtl="0">
+              <a:defRPr/>
+            </a:pPr>
+            <a:r>
+              <a:rPr lang="en-US" sz="1200" b="1">
+                <a:solidFill>
+                  <a:schemeClr val="tx1"/>
+                </a:solidFill>
+                <a:latin typeface="Segoe UI" panose="020B0502040204020203" pitchFamily="34" charset="0"/>
+                <a:cs typeface="Segoe UI" panose="020B0502040204020203" pitchFamily="34" charset="0"/>
+              </a:rPr>
+              <a:t>StudentMessages</a:t>
+            </a:r>
+            <a:endParaRPr sz="1000">
+              <a:solidFill>
+                <a:schemeClr val="tx1"/>
+              </a:solidFill>
+              <a:latin typeface="Segoe UI" panose="020B0502040204020203" pitchFamily="34" charset="0"/>
+              <a:cs typeface="Segoe UI" panose="020B0502040204020203" pitchFamily="34" charset="0"/>
+            </a:endParaRPr>
+          </a:p>
+        </p:txBody>
+      </p:sp>
+      <p:sp>
+        <p:nvSpPr>
+          <p:cNvPr id="39" name="Rectangle: Rounded Corners 38">
+            <a:extLst>
+              <a:ext uri="{FF2B5EF4-FFF2-40B4-BE49-F238E27FC236}">
+                <a16:creationId xmlns:a16="http://schemas.microsoft.com/office/drawing/2014/main" id="{A70EB11C-5B71-475A-3D12-98529697C7B2}"/>
+              </a:ext>
+            </a:extLst>
+          </p:cNvPr>
+          <p:cNvSpPr/>
+          <p:nvPr/>
+        </p:nvSpPr>
+        <p:spPr bwMode="auto">
+          <a:xfrm>
+            <a:off x="3950081" y="5606161"/>
+            <a:ext cx="391368" cy="261503"/>
+          </a:xfrm>
+          <a:prstGeom prst="roundRect">
+            <a:avLst/>
+          </a:prstGeom>
+          <a:solidFill>
+            <a:schemeClr val="tx1"/>
+          </a:solidFill>
+        </p:spPr>
+        <p:style>
+          <a:lnRef idx="2">
+            <a:schemeClr val="accent1">
+              <a:shade val="15000"/>
+            </a:schemeClr>
+          </a:lnRef>
+          <a:fillRef idx="1">
+            <a:schemeClr val="accent1"/>
+          </a:fillRef>
+          <a:effectRef idx="0">
+            <a:schemeClr val="accent1"/>
+          </a:effectRef>
+          <a:fontRef idx="minor">
+            <a:schemeClr val="lt1"/>
+          </a:fontRef>
+        </p:style>
+        <p:txBody>
+          <a:bodyPr rtlCol="1" anchor="ctr"/>
+          <a:lstStyle/>
+          <a:p>
+            <a:pPr algn="ctr"/>
+            <a:r>
+              <a:rPr lang="en-US" sz="1200" b="1">
+                <a:latin typeface="Segoe UI" panose="020B0502040204020203" pitchFamily="34" charset="0"/>
+                <a:cs typeface="Segoe UI" panose="020B0502040204020203" pitchFamily="34" charset="0"/>
+              </a:rPr>
+              <a:t>17</a:t>
+            </a:r>
+            <a:endParaRPr lang="fa-IR" sz="1200" b="1">
+              <a:latin typeface="Segoe UI" panose="020B0502040204020203" pitchFamily="34" charset="0"/>
+              <a:cs typeface="Segoe UI" panose="020B0502040204020203" pitchFamily="34" charset="0"/>
+            </a:endParaRPr>
+          </a:p>
+        </p:txBody>
+      </p:sp>
+      <p:sp>
+        <p:nvSpPr>
+          <p:cNvPr id="43" name="Rectangle: Rounded Corners 44">
+            <a:extLst>
+              <a:ext uri="{FF2B5EF4-FFF2-40B4-BE49-F238E27FC236}">
+                <a16:creationId xmlns:a16="http://schemas.microsoft.com/office/drawing/2014/main" id="{74B95C77-F7E4-D1F5-12D6-3BBED57D2BB6}"/>
+              </a:ext>
+            </a:extLst>
+          </p:cNvPr>
+          <p:cNvSpPr/>
+          <p:nvPr/>
+        </p:nvSpPr>
+        <p:spPr bwMode="auto">
+          <a:xfrm>
+            <a:off x="4341449" y="1081435"/>
+            <a:ext cx="1965018" cy="261503"/>
+          </a:xfrm>
+          <a:prstGeom prst="roundRect">
+            <a:avLst>
+              <a:gd name="adj" fmla="val 9941"/>
+            </a:avLst>
+          </a:prstGeom>
+          <a:solidFill>
+            <a:schemeClr val="bg1"/>
+          </a:solidFill>
+          <a:ln>
+            <a:solidFill>
+              <a:schemeClr val="tx1"/>
+            </a:solidFill>
+          </a:ln>
+          <a:effectLst/>
+        </p:spPr>
+        <p:style>
+          <a:lnRef idx="0">
+            <a:schemeClr val="accent4"/>
+          </a:lnRef>
+          <a:fillRef idx="3">
+            <a:schemeClr val="accent4"/>
+          </a:fillRef>
+          <a:effectRef idx="3">
+            <a:schemeClr val="accent4"/>
+          </a:effectRef>
+          <a:fontRef idx="minor">
+            <a:schemeClr val="lt1"/>
+          </a:fontRef>
+        </p:style>
+        <p:txBody>
+          <a:bodyPr rtlCol="1" anchor="ctr"/>
+          <a:lstStyle/>
+          <a:p>
+            <a:pPr algn="ctr" rtl="0">
+              <a:defRPr/>
+            </a:pPr>
+            <a:r>
+              <a:rPr lang="en-US" sz="1200" b="1">
+                <a:solidFill>
+                  <a:schemeClr val="tx1"/>
+                </a:solidFill>
+                <a:latin typeface="Segoe UI" panose="020B0502040204020203" pitchFamily="34" charset="0"/>
+                <a:cs typeface="Segoe UI" panose="020B0502040204020203" pitchFamily="34" charset="0"/>
+              </a:rPr>
+              <a:t>CourseFolders</a:t>
+            </a:r>
+            <a:endParaRPr sz="1000">
+              <a:solidFill>
+                <a:schemeClr val="tx1"/>
+              </a:solidFill>
+              <a:latin typeface="Segoe UI" panose="020B0502040204020203" pitchFamily="34" charset="0"/>
+              <a:cs typeface="Segoe UI" panose="020B0502040204020203" pitchFamily="34" charset="0"/>
+            </a:endParaRPr>
+          </a:p>
+        </p:txBody>
+      </p:sp>
+      <p:sp>
+        <p:nvSpPr>
+          <p:cNvPr id="44" name="Rectangle: Rounded Corners 43">
+            <a:extLst>
+              <a:ext uri="{FF2B5EF4-FFF2-40B4-BE49-F238E27FC236}">
+                <a16:creationId xmlns:a16="http://schemas.microsoft.com/office/drawing/2014/main" id="{228560BB-2A81-9463-6A0A-E99E7140BB46}"/>
+              </a:ext>
+            </a:extLst>
+          </p:cNvPr>
+          <p:cNvSpPr/>
+          <p:nvPr/>
+        </p:nvSpPr>
+        <p:spPr bwMode="auto">
+          <a:xfrm>
+            <a:off x="3960791" y="1085045"/>
+            <a:ext cx="391368" cy="261503"/>
+          </a:xfrm>
+          <a:prstGeom prst="roundRect">
+            <a:avLst/>
+          </a:prstGeom>
+          <a:solidFill>
+            <a:schemeClr val="tx1"/>
+          </a:solidFill>
+        </p:spPr>
+        <p:style>
+          <a:lnRef idx="2">
+            <a:schemeClr val="accent1">
+              <a:shade val="15000"/>
+            </a:schemeClr>
+          </a:lnRef>
+          <a:fillRef idx="1">
+            <a:schemeClr val="accent1"/>
+          </a:fillRef>
+          <a:effectRef idx="0">
+            <a:schemeClr val="accent1"/>
+          </a:effectRef>
+          <a:fontRef idx="minor">
+            <a:schemeClr val="lt1"/>
+          </a:fontRef>
+        </p:style>
+        <p:txBody>
+          <a:bodyPr rtlCol="1" anchor="ctr"/>
+          <a:lstStyle/>
+          <a:p>
+            <a:pPr algn="ctr"/>
+            <a:r>
+              <a:rPr lang="en-US" sz="1200" b="1">
+                <a:latin typeface="Segoe UI" panose="020B0502040204020203" pitchFamily="34" charset="0"/>
+                <a:cs typeface="Segoe UI" panose="020B0502040204020203" pitchFamily="34" charset="0"/>
+              </a:rPr>
+              <a:t>15</a:t>
+            </a:r>
+            <a:endParaRPr lang="fa-IR" sz="1200" b="1">
+              <a:latin typeface="Segoe UI" panose="020B0502040204020203" pitchFamily="34" charset="0"/>
+              <a:cs typeface="Segoe UI" panose="020B0502040204020203" pitchFamily="34" charset="0"/>
+            </a:endParaRPr>
+          </a:p>
+        </p:txBody>
+      </p:sp>
+    </p:spTree>
+    <p:extLst>
+      <p:ext uri="{BB962C8B-B14F-4D97-AF65-F5344CB8AC3E}">
+        <p14:creationId xmlns:p14="http://schemas.microsoft.com/office/powerpoint/2010/main" val="2004589811"/>
+      </p:ext>
+    </p:extLst>
+  </p:cSld>
+  <p:clrMapOvr>
+    <a:masterClrMapping/>
+  </p:clrMapOvr>
+</p:sld>
+</file>
+
+<file path=ppt/slides/slide3.xml><?xml version="1.0" encoding="utf-8"?>
+<p:sld xmlns:a="http://schemas.openxmlformats.org/drawingml/2006/main" xmlns:r="http://schemas.openxmlformats.org/officeDocument/2006/relationships" xmlns:p="http://schemas.openxmlformats.org/presentationml/2006/main">
+  <p:cSld>
+    <p:spTree>
+      <p:nvGrpSpPr>
+        <p:cNvPr id="1" name="">
+          <a:extLst>
+            <a:ext uri="{FF2B5EF4-FFF2-40B4-BE49-F238E27FC236}">
+              <a16:creationId xmlns:a16="http://schemas.microsoft.com/office/drawing/2014/main" id="{CDC2CFA1-6A1B-222E-19F9-A3E5F6093092}"/>
+            </a:ext>
+          </a:extLst>
+        </p:cNvPr>
+        <p:cNvGrpSpPr/>
+        <p:nvPr/>
+      </p:nvGrpSpPr>
+      <p:grpSpPr>
+        <a:xfrm>
+          <a:off x="0" y="0"/>
+          <a:ext cx="0" cy="0"/>
+          <a:chOff x="0" y="0"/>
+          <a:chExt cx="0" cy="0"/>
+        </a:xfrm>
+      </p:grpSpPr>
+      <p:sp>
+        <p:nvSpPr>
+          <p:cNvPr id="4" name="Rectangle: Rounded Corners 44">
+            <a:extLst>
+              <a:ext uri="{FF2B5EF4-FFF2-40B4-BE49-F238E27FC236}">
+                <a16:creationId xmlns:a16="http://schemas.microsoft.com/office/drawing/2014/main" id="{11A6DC2C-ED6B-1DD7-CA08-8BA74CB869AF}"/>
+              </a:ext>
+            </a:extLst>
+          </p:cNvPr>
+          <p:cNvSpPr/>
+          <p:nvPr/>
+        </p:nvSpPr>
+        <p:spPr bwMode="auto">
+          <a:xfrm>
+            <a:off x="3648806" y="1832695"/>
+            <a:ext cx="1152128" cy="432048"/>
+          </a:xfrm>
+          <a:prstGeom prst="roundRect">
+            <a:avLst>
+              <a:gd name="adj" fmla="val 9941"/>
+            </a:avLst>
+          </a:prstGeom>
+          <a:solidFill>
+            <a:schemeClr val="bg1"/>
+          </a:solidFill>
+          <a:ln>
+            <a:solidFill>
+              <a:schemeClr val="tx1"/>
+            </a:solidFill>
+          </a:ln>
+          <a:effectLst/>
+        </p:spPr>
+        <p:style>
+          <a:lnRef idx="0">
+            <a:schemeClr val="accent4"/>
+          </a:lnRef>
+          <a:fillRef idx="3">
+            <a:schemeClr val="accent4"/>
+          </a:fillRef>
+          <a:effectRef idx="3">
+            <a:schemeClr val="accent4"/>
+          </a:effectRef>
+          <a:fontRef idx="minor">
+            <a:schemeClr val="lt1"/>
+          </a:fontRef>
+        </p:style>
+        <p:txBody>
+          <a:bodyPr rtlCol="1" anchor="ctr"/>
+          <a:lstStyle/>
+          <a:p>
+            <a:pPr algn="ctr" rtl="0">
+              <a:defRPr/>
+            </a:pPr>
+            <a:r>
+              <a:rPr lang="en-US" sz="1200" b="1">
+                <a:solidFill>
+                  <a:schemeClr val="tx1"/>
+                </a:solidFill>
+                <a:latin typeface="Segoe UI" panose="020B0502040204020203" pitchFamily="34" charset="0"/>
+                <a:cs typeface="Segoe UI" panose="020B0502040204020203" pitchFamily="34" charset="0"/>
+              </a:rPr>
+              <a:t>Courses</a:t>
+            </a:r>
+            <a:endParaRPr sz="1000">
+              <a:solidFill>
+                <a:schemeClr val="tx1"/>
+              </a:solidFill>
+              <a:latin typeface="Segoe UI" panose="020B0502040204020203" pitchFamily="34" charset="0"/>
+              <a:cs typeface="Segoe UI" panose="020B0502040204020203" pitchFamily="34" charset="0"/>
+            </a:endParaRPr>
+          </a:p>
+        </p:txBody>
+      </p:sp>
+      <p:sp>
+        <p:nvSpPr>
+          <p:cNvPr id="5" name="Rectangle: Rounded Corners 44">
+            <a:extLst>
+              <a:ext uri="{FF2B5EF4-FFF2-40B4-BE49-F238E27FC236}">
+                <a16:creationId xmlns:a16="http://schemas.microsoft.com/office/drawing/2014/main" id="{CB9065F4-27F5-2DBB-CB41-1999A768C41F}"/>
+              </a:ext>
+            </a:extLst>
+          </p:cNvPr>
+          <p:cNvSpPr/>
+          <p:nvPr/>
+        </p:nvSpPr>
+        <p:spPr bwMode="auto">
+          <a:xfrm>
+            <a:off x="3738654" y="2814337"/>
+            <a:ext cx="846256" cy="251020"/>
+          </a:xfrm>
+          <a:prstGeom prst="roundRect">
+            <a:avLst>
+              <a:gd name="adj" fmla="val 9941"/>
+            </a:avLst>
+          </a:prstGeom>
+          <a:solidFill>
+            <a:schemeClr val="bg1">
+              <a:lumMod val="95000"/>
+            </a:schemeClr>
+          </a:solidFill>
+          <a:ln>
+            <a:solidFill>
+              <a:schemeClr val="tx1"/>
+            </a:solidFill>
+          </a:ln>
+          <a:effectLst/>
+        </p:spPr>
+        <p:style>
+          <a:lnRef idx="0">
+            <a:schemeClr val="accent4"/>
+          </a:lnRef>
+          <a:fillRef idx="3">
+            <a:schemeClr val="accent4"/>
+          </a:fillRef>
+          <a:effectRef idx="3">
+            <a:schemeClr val="accent4"/>
+          </a:effectRef>
+          <a:fontRef idx="minor">
+            <a:schemeClr val="lt1"/>
+          </a:fontRef>
+        </p:style>
+        <p:txBody>
+          <a:bodyPr rtlCol="1" anchor="ctr"/>
+          <a:lstStyle/>
+          <a:p>
+            <a:pPr algn="ctr" rtl="0">
+              <a:defRPr/>
+            </a:pPr>
+            <a:r>
+              <a:rPr lang="en-US" sz="1200" b="1">
+                <a:solidFill>
+                  <a:schemeClr val="tx1"/>
+                </a:solidFill>
+                <a:latin typeface="Segoe UI" panose="020B0502040204020203" pitchFamily="34" charset="0"/>
+                <a:cs typeface="Segoe UI" panose="020B0502040204020203" pitchFamily="34" charset="0"/>
+              </a:rPr>
+              <a:t>Users</a:t>
+            </a:r>
+            <a:endParaRPr sz="1000">
+              <a:solidFill>
+                <a:schemeClr val="tx1"/>
+              </a:solidFill>
+              <a:latin typeface="Segoe UI" panose="020B0502040204020203" pitchFamily="34" charset="0"/>
+              <a:cs typeface="Segoe UI" panose="020B0502040204020203" pitchFamily="34" charset="0"/>
+            </a:endParaRPr>
+          </a:p>
+        </p:txBody>
+      </p:sp>
+      <p:sp>
+        <p:nvSpPr>
+          <p:cNvPr id="6" name="Rectangle: Rounded Corners 44">
+            <a:extLst>
+              <a:ext uri="{FF2B5EF4-FFF2-40B4-BE49-F238E27FC236}">
+                <a16:creationId xmlns:a16="http://schemas.microsoft.com/office/drawing/2014/main" id="{23DD969A-5E51-C544-D6FB-B95C19157184}"/>
+              </a:ext>
+            </a:extLst>
+          </p:cNvPr>
+          <p:cNvSpPr/>
+          <p:nvPr/>
+        </p:nvSpPr>
+        <p:spPr bwMode="auto">
+          <a:xfrm>
+            <a:off x="3648806" y="3803943"/>
+            <a:ext cx="1152128" cy="432048"/>
+          </a:xfrm>
+          <a:prstGeom prst="roundRect">
+            <a:avLst>
+              <a:gd name="adj" fmla="val 9941"/>
+            </a:avLst>
+          </a:prstGeom>
+          <a:solidFill>
+            <a:schemeClr val="bg1"/>
+          </a:solidFill>
+          <a:ln>
+            <a:solidFill>
+              <a:schemeClr val="tx1"/>
+            </a:solidFill>
+          </a:ln>
+          <a:effectLst/>
+        </p:spPr>
+        <p:style>
+          <a:lnRef idx="0">
+            <a:schemeClr val="accent4"/>
+          </a:lnRef>
+          <a:fillRef idx="3">
+            <a:schemeClr val="accent4"/>
+          </a:fillRef>
+          <a:effectRef idx="3">
+            <a:schemeClr val="accent4"/>
+          </a:effectRef>
+          <a:fontRef idx="minor">
+            <a:schemeClr val="lt1"/>
+          </a:fontRef>
+        </p:style>
+        <p:txBody>
+          <a:bodyPr rtlCol="1" anchor="ctr"/>
+          <a:lstStyle/>
+          <a:p>
+            <a:pPr algn="ctr" rtl="0">
+              <a:defRPr/>
+            </a:pPr>
+            <a:r>
+              <a:rPr lang="en-US" sz="1200" b="1">
+                <a:solidFill>
+                  <a:schemeClr val="tx1"/>
+                </a:solidFill>
+                <a:latin typeface="Segoe UI" panose="020B0502040204020203" pitchFamily="34" charset="0"/>
+                <a:cs typeface="Segoe UI" panose="020B0502040204020203" pitchFamily="34" charset="0"/>
+              </a:rPr>
+              <a:t>Groups</a:t>
+            </a:r>
+            <a:endParaRPr sz="1000">
+              <a:solidFill>
+                <a:schemeClr val="tx1"/>
+              </a:solidFill>
+              <a:latin typeface="Segoe UI" panose="020B0502040204020203" pitchFamily="34" charset="0"/>
+              <a:cs typeface="Segoe UI" panose="020B0502040204020203" pitchFamily="34" charset="0"/>
+            </a:endParaRPr>
+          </a:p>
+        </p:txBody>
+      </p:sp>
+      <p:sp>
+        <p:nvSpPr>
+          <p:cNvPr id="7" name="Rectangle: Rounded Corners 44">
+            <a:extLst>
+              <a:ext uri="{FF2B5EF4-FFF2-40B4-BE49-F238E27FC236}">
+                <a16:creationId xmlns:a16="http://schemas.microsoft.com/office/drawing/2014/main" id="{5DD61A54-308D-305B-4AF6-A359BB1D8E47}"/>
+              </a:ext>
+            </a:extLst>
+          </p:cNvPr>
+          <p:cNvSpPr/>
+          <p:nvPr/>
+        </p:nvSpPr>
+        <p:spPr bwMode="auto">
+          <a:xfrm>
+            <a:off x="3094475" y="4187842"/>
+            <a:ext cx="846257" cy="251020"/>
+          </a:xfrm>
+          <a:prstGeom prst="roundRect">
+            <a:avLst>
+              <a:gd name="adj" fmla="val 9941"/>
+            </a:avLst>
+          </a:prstGeom>
+          <a:solidFill>
+            <a:schemeClr val="bg1"/>
+          </a:solidFill>
+          <a:ln>
+            <a:solidFill>
+              <a:schemeClr val="tx1"/>
+            </a:solidFill>
+          </a:ln>
+          <a:effectLst/>
+        </p:spPr>
+        <p:style>
+          <a:lnRef idx="0">
+            <a:schemeClr val="accent4"/>
+          </a:lnRef>
+          <a:fillRef idx="3">
+            <a:schemeClr val="accent4"/>
+          </a:fillRef>
+          <a:effectRef idx="3">
+            <a:schemeClr val="accent4"/>
+          </a:effectRef>
+          <a:fontRef idx="minor">
+            <a:schemeClr val="lt1"/>
+          </a:fontRef>
+        </p:style>
+        <p:txBody>
+          <a:bodyPr rtlCol="1" anchor="ctr"/>
+          <a:lstStyle/>
+          <a:p>
+            <a:pPr algn="ctr" rtl="0">
+              <a:defRPr/>
+            </a:pPr>
+            <a:r>
+              <a:rPr lang="en-US" sz="1200" b="1">
+                <a:solidFill>
+                  <a:schemeClr val="tx1"/>
+                </a:solidFill>
+                <a:latin typeface="Segoe UI" panose="020B0502040204020203" pitchFamily="34" charset="0"/>
+                <a:cs typeface="Segoe UI" panose="020B0502040204020203" pitchFamily="34" charset="0"/>
+              </a:rPr>
+              <a:t>Students</a:t>
+            </a:r>
+            <a:endParaRPr sz="1000">
+              <a:solidFill>
+                <a:schemeClr val="tx1"/>
+              </a:solidFill>
+              <a:latin typeface="Segoe UI" panose="020B0502040204020203" pitchFamily="34" charset="0"/>
+              <a:cs typeface="Segoe UI" panose="020B0502040204020203" pitchFamily="34" charset="0"/>
+            </a:endParaRPr>
+          </a:p>
+        </p:txBody>
+      </p:sp>
+      <p:sp>
+        <p:nvSpPr>
+          <p:cNvPr id="8" name="Rectangle: Rounded Corners 44">
+            <a:extLst>
+              <a:ext uri="{FF2B5EF4-FFF2-40B4-BE49-F238E27FC236}">
+                <a16:creationId xmlns:a16="http://schemas.microsoft.com/office/drawing/2014/main" id="{3C9CC079-778B-5E3A-CF5B-987BDA784E1A}"/>
+              </a:ext>
+            </a:extLst>
+          </p:cNvPr>
+          <p:cNvSpPr/>
+          <p:nvPr/>
+        </p:nvSpPr>
+        <p:spPr bwMode="auto">
+          <a:xfrm>
+            <a:off x="5088398" y="1922713"/>
+            <a:ext cx="1152128" cy="249732"/>
+          </a:xfrm>
+          <a:prstGeom prst="roundRect">
+            <a:avLst>
+              <a:gd name="adj" fmla="val 9941"/>
+            </a:avLst>
+          </a:prstGeom>
+          <a:solidFill>
+            <a:schemeClr val="bg1"/>
+          </a:solidFill>
+          <a:ln>
+            <a:solidFill>
+              <a:schemeClr val="tx1"/>
+            </a:solidFill>
+          </a:ln>
+          <a:effectLst/>
+        </p:spPr>
+        <p:style>
+          <a:lnRef idx="0">
+            <a:schemeClr val="accent4"/>
+          </a:lnRef>
+          <a:fillRef idx="3">
+            <a:schemeClr val="accent4"/>
+          </a:fillRef>
+          <a:effectRef idx="3">
+            <a:schemeClr val="accent4"/>
+          </a:effectRef>
+          <a:fontRef idx="minor">
+            <a:schemeClr val="lt1"/>
+          </a:fontRef>
+        </p:style>
+        <p:txBody>
+          <a:bodyPr rtlCol="1" anchor="ctr"/>
+          <a:lstStyle/>
+          <a:p>
+            <a:pPr algn="ctr" rtl="0">
+              <a:defRPr/>
+            </a:pPr>
+            <a:r>
+              <a:rPr lang="en-US" sz="1200" b="1">
+                <a:solidFill>
+                  <a:schemeClr val="tx1"/>
+                </a:solidFill>
+                <a:latin typeface="Segoe UI" panose="020B0502040204020203" pitchFamily="34" charset="0"/>
+                <a:cs typeface="Segoe UI" panose="020B0502040204020203" pitchFamily="34" charset="0"/>
+              </a:rPr>
+              <a:t>CourseTopics</a:t>
+            </a:r>
+            <a:endParaRPr sz="1000">
+              <a:solidFill>
+                <a:schemeClr val="tx1"/>
+              </a:solidFill>
+              <a:latin typeface="Segoe UI" panose="020B0502040204020203" pitchFamily="34" charset="0"/>
+              <a:cs typeface="Segoe UI" panose="020B0502040204020203" pitchFamily="34" charset="0"/>
+            </a:endParaRPr>
+          </a:p>
+        </p:txBody>
+      </p:sp>
+      <p:sp>
+        <p:nvSpPr>
+          <p:cNvPr id="9" name="Rectangle: Rounded Corners 44">
+            <a:extLst>
+              <a:ext uri="{FF2B5EF4-FFF2-40B4-BE49-F238E27FC236}">
+                <a16:creationId xmlns:a16="http://schemas.microsoft.com/office/drawing/2014/main" id="{167AA020-0F3E-9A3E-EF3B-6C9468EC9889}"/>
+              </a:ext>
+            </a:extLst>
+          </p:cNvPr>
+          <p:cNvSpPr/>
+          <p:nvPr/>
+        </p:nvSpPr>
+        <p:spPr bwMode="auto">
+          <a:xfrm>
+            <a:off x="5737038" y="772296"/>
+            <a:ext cx="1080120" cy="432048"/>
+          </a:xfrm>
+          <a:prstGeom prst="roundRect">
+            <a:avLst>
+              <a:gd name="adj" fmla="val 9941"/>
+            </a:avLst>
+          </a:prstGeom>
+          <a:solidFill>
+            <a:schemeClr val="bg1"/>
+          </a:solidFill>
+          <a:ln>
+            <a:solidFill>
+              <a:schemeClr val="tx1"/>
+            </a:solidFill>
+          </a:ln>
+          <a:effectLst/>
+        </p:spPr>
+        <p:style>
+          <a:lnRef idx="0">
+            <a:schemeClr val="accent4"/>
+          </a:lnRef>
+          <a:fillRef idx="3">
+            <a:schemeClr val="accent4"/>
+          </a:fillRef>
+          <a:effectRef idx="3">
+            <a:schemeClr val="accent4"/>
+          </a:effectRef>
+          <a:fontRef idx="minor">
+            <a:schemeClr val="lt1"/>
+          </a:fontRef>
+        </p:style>
+        <p:txBody>
+          <a:bodyPr rtlCol="1" anchor="ctr"/>
+          <a:lstStyle/>
+          <a:p>
+            <a:pPr algn="ctr" rtl="0">
+              <a:defRPr/>
+            </a:pPr>
+            <a:r>
+              <a:rPr lang="en-US" sz="1200" b="1">
+                <a:solidFill>
+                  <a:schemeClr val="tx1"/>
+                </a:solidFill>
+                <a:latin typeface="Segoe UI" panose="020B0502040204020203" pitchFamily="34" charset="0"/>
+                <a:cs typeface="Segoe UI" panose="020B0502040204020203" pitchFamily="34" charset="0"/>
+              </a:rPr>
+              <a:t>Tests</a:t>
+            </a:r>
+            <a:endParaRPr sz="1000">
+              <a:solidFill>
+                <a:schemeClr val="tx1"/>
+              </a:solidFill>
+              <a:latin typeface="Segoe UI" panose="020B0502040204020203" pitchFamily="34" charset="0"/>
+              <a:cs typeface="Segoe UI" panose="020B0502040204020203" pitchFamily="34" charset="0"/>
+            </a:endParaRPr>
+          </a:p>
+        </p:txBody>
+      </p:sp>
+      <p:sp>
+        <p:nvSpPr>
+          <p:cNvPr id="10" name="Rectangle: Rounded Corners 44">
+            <a:extLst>
+              <a:ext uri="{FF2B5EF4-FFF2-40B4-BE49-F238E27FC236}">
+                <a16:creationId xmlns:a16="http://schemas.microsoft.com/office/drawing/2014/main" id="{1DED26CF-5451-BA19-F39D-73B62E14E2D5}"/>
+              </a:ext>
+            </a:extLst>
+          </p:cNvPr>
+          <p:cNvSpPr/>
+          <p:nvPr/>
+        </p:nvSpPr>
+        <p:spPr bwMode="auto">
+          <a:xfrm>
+            <a:off x="6085300" y="1239690"/>
+            <a:ext cx="1080120" cy="237855"/>
+          </a:xfrm>
+          <a:prstGeom prst="roundRect">
+            <a:avLst>
+              <a:gd name="adj" fmla="val 9941"/>
+            </a:avLst>
+          </a:prstGeom>
+          <a:solidFill>
+            <a:schemeClr val="bg1"/>
+          </a:solidFill>
+          <a:ln>
+            <a:solidFill>
+              <a:schemeClr val="tx1"/>
+            </a:solidFill>
+          </a:ln>
+          <a:effectLst/>
+        </p:spPr>
+        <p:style>
+          <a:lnRef idx="0">
+            <a:schemeClr val="accent4"/>
+          </a:lnRef>
+          <a:fillRef idx="3">
+            <a:schemeClr val="accent4"/>
+          </a:fillRef>
+          <a:effectRef idx="3">
+            <a:schemeClr val="accent4"/>
+          </a:effectRef>
+          <a:fontRef idx="minor">
+            <a:schemeClr val="lt1"/>
+          </a:fontRef>
+        </p:style>
+        <p:txBody>
+          <a:bodyPr rtlCol="1" anchor="ctr"/>
+          <a:lstStyle/>
+          <a:p>
+            <a:pPr algn="ctr" rtl="0">
+              <a:defRPr/>
+            </a:pPr>
+            <a:r>
+              <a:rPr lang="en-US" sz="1200" b="1">
+                <a:solidFill>
+                  <a:schemeClr val="tx1"/>
+                </a:solidFill>
+                <a:latin typeface="Segoe UI" panose="020B0502040204020203" pitchFamily="34" charset="0"/>
+                <a:cs typeface="Segoe UI" panose="020B0502040204020203" pitchFamily="34" charset="0"/>
+              </a:rPr>
+              <a:t>TestOptions</a:t>
+            </a:r>
+            <a:endParaRPr sz="1000">
+              <a:solidFill>
+                <a:schemeClr val="tx1"/>
+              </a:solidFill>
+              <a:latin typeface="Segoe UI" panose="020B0502040204020203" pitchFamily="34" charset="0"/>
+              <a:cs typeface="Segoe UI" panose="020B0502040204020203" pitchFamily="34" charset="0"/>
+            </a:endParaRPr>
+          </a:p>
+        </p:txBody>
+      </p:sp>
+      <p:sp>
+        <p:nvSpPr>
+          <p:cNvPr id="11" name="Rectangle: Rounded Corners 44">
+            <a:extLst>
+              <a:ext uri="{FF2B5EF4-FFF2-40B4-BE49-F238E27FC236}">
+                <a16:creationId xmlns:a16="http://schemas.microsoft.com/office/drawing/2014/main" id="{72B2E0F7-02EE-CFE0-5CAA-511591BECE16}"/>
+              </a:ext>
+            </a:extLst>
+          </p:cNvPr>
+          <p:cNvSpPr/>
+          <p:nvPr/>
+        </p:nvSpPr>
+        <p:spPr bwMode="auto">
+          <a:xfrm>
+            <a:off x="5737038" y="3039132"/>
+            <a:ext cx="1080120" cy="432048"/>
+          </a:xfrm>
+          <a:prstGeom prst="roundRect">
+            <a:avLst>
+              <a:gd name="adj" fmla="val 9941"/>
+            </a:avLst>
+          </a:prstGeom>
+          <a:solidFill>
+            <a:schemeClr val="bg1"/>
+          </a:solidFill>
+          <a:ln>
+            <a:solidFill>
+              <a:schemeClr val="tx1"/>
+            </a:solidFill>
+          </a:ln>
+          <a:effectLst/>
+        </p:spPr>
+        <p:style>
+          <a:lnRef idx="0">
+            <a:schemeClr val="accent4"/>
+          </a:lnRef>
+          <a:fillRef idx="3">
+            <a:schemeClr val="accent4"/>
+          </a:fillRef>
+          <a:effectRef idx="3">
+            <a:schemeClr val="accent4"/>
+          </a:effectRef>
+          <a:fontRef idx="minor">
+            <a:schemeClr val="lt1"/>
+          </a:fontRef>
+        </p:style>
+        <p:txBody>
+          <a:bodyPr rtlCol="1" anchor="ctr"/>
+          <a:lstStyle/>
+          <a:p>
+            <a:pPr algn="ctr" rtl="0">
+              <a:defRPr/>
+            </a:pPr>
+            <a:r>
+              <a:rPr lang="en-US" sz="1200" b="1">
+                <a:solidFill>
+                  <a:schemeClr val="tx1"/>
+                </a:solidFill>
+                <a:latin typeface="Segoe UI" panose="020B0502040204020203" pitchFamily="34" charset="0"/>
+                <a:cs typeface="Segoe UI" panose="020B0502040204020203" pitchFamily="34" charset="0"/>
+              </a:rPr>
+              <a:t>Exams</a:t>
+            </a:r>
+            <a:endParaRPr sz="1000">
+              <a:solidFill>
+                <a:schemeClr val="tx1"/>
+              </a:solidFill>
+              <a:latin typeface="Segoe UI" panose="020B0502040204020203" pitchFamily="34" charset="0"/>
+              <a:cs typeface="Segoe UI" panose="020B0502040204020203" pitchFamily="34" charset="0"/>
+            </a:endParaRPr>
+          </a:p>
+        </p:txBody>
+      </p:sp>
+      <p:sp>
+        <p:nvSpPr>
+          <p:cNvPr id="12" name="Rectangle: Rounded Corners 44">
+            <a:extLst>
+              <a:ext uri="{FF2B5EF4-FFF2-40B4-BE49-F238E27FC236}">
+                <a16:creationId xmlns:a16="http://schemas.microsoft.com/office/drawing/2014/main" id="{A4171152-B881-B5FF-A039-FEE2BDD4BFD4}"/>
+              </a:ext>
+            </a:extLst>
+          </p:cNvPr>
+          <p:cNvSpPr/>
+          <p:nvPr/>
+        </p:nvSpPr>
+        <p:spPr bwMode="auto">
+          <a:xfrm>
+            <a:off x="6586705" y="3390208"/>
+            <a:ext cx="1800201" cy="237855"/>
+          </a:xfrm>
+          <a:prstGeom prst="roundRect">
+            <a:avLst>
+              <a:gd name="adj" fmla="val 9941"/>
+            </a:avLst>
+          </a:prstGeom>
+          <a:solidFill>
+            <a:schemeClr val="bg1"/>
+          </a:solidFill>
+          <a:ln>
+            <a:solidFill>
+              <a:schemeClr val="tx1"/>
+            </a:solidFill>
+          </a:ln>
+          <a:effectLst/>
+        </p:spPr>
+        <p:style>
+          <a:lnRef idx="0">
+            <a:schemeClr val="accent4"/>
+          </a:lnRef>
+          <a:fillRef idx="3">
+            <a:schemeClr val="accent4"/>
+          </a:fillRef>
+          <a:effectRef idx="3">
+            <a:schemeClr val="accent4"/>
+          </a:effectRef>
+          <a:fontRef idx="minor">
+            <a:schemeClr val="lt1"/>
+          </a:fontRef>
+        </p:style>
+        <p:txBody>
+          <a:bodyPr rtlCol="1" anchor="ctr"/>
+          <a:lstStyle/>
+          <a:p>
+            <a:pPr algn="ctr" rtl="0">
+              <a:defRPr/>
+            </a:pPr>
+            <a:r>
+              <a:rPr lang="en-US" sz="1200" b="1">
+                <a:solidFill>
+                  <a:schemeClr val="tx1"/>
+                </a:solidFill>
+                <a:latin typeface="Segoe UI" panose="020B0502040204020203" pitchFamily="34" charset="0"/>
+                <a:cs typeface="Segoe UI" panose="020B0502040204020203" pitchFamily="34" charset="0"/>
+              </a:rPr>
+              <a:t>ExamCompositions</a:t>
+            </a:r>
+            <a:endParaRPr sz="1000">
+              <a:solidFill>
+                <a:schemeClr val="tx1"/>
+              </a:solidFill>
+              <a:latin typeface="Segoe UI" panose="020B0502040204020203" pitchFamily="34" charset="0"/>
+              <a:cs typeface="Segoe UI" panose="020B0502040204020203" pitchFamily="34" charset="0"/>
+            </a:endParaRPr>
+          </a:p>
+        </p:txBody>
+      </p:sp>
+      <p:sp>
+        <p:nvSpPr>
+          <p:cNvPr id="13" name="Rectangle: Rounded Corners 44">
+            <a:extLst>
+              <a:ext uri="{FF2B5EF4-FFF2-40B4-BE49-F238E27FC236}">
+                <a16:creationId xmlns:a16="http://schemas.microsoft.com/office/drawing/2014/main" id="{43435041-2AA6-8C1F-57D0-9D64337B2BD4}"/>
+              </a:ext>
+            </a:extLst>
+          </p:cNvPr>
+          <p:cNvSpPr/>
+          <p:nvPr/>
+        </p:nvSpPr>
+        <p:spPr bwMode="auto">
+          <a:xfrm>
+            <a:off x="7033183" y="1832695"/>
+            <a:ext cx="1152128" cy="432048"/>
+          </a:xfrm>
+          <a:prstGeom prst="roundRect">
+            <a:avLst>
+              <a:gd name="adj" fmla="val 9941"/>
+            </a:avLst>
+          </a:prstGeom>
+          <a:solidFill>
+            <a:schemeClr val="bg1"/>
+          </a:solidFill>
+          <a:ln>
+            <a:solidFill>
+              <a:schemeClr val="tx1"/>
+            </a:solidFill>
+          </a:ln>
+          <a:effectLst/>
+        </p:spPr>
+        <p:style>
+          <a:lnRef idx="0">
+            <a:schemeClr val="accent4"/>
+          </a:lnRef>
+          <a:fillRef idx="3">
+            <a:schemeClr val="accent4"/>
+          </a:fillRef>
+          <a:effectRef idx="3">
+            <a:schemeClr val="accent4"/>
+          </a:effectRef>
+          <a:fontRef idx="minor">
+            <a:schemeClr val="lt1"/>
+          </a:fontRef>
+        </p:style>
+        <p:txBody>
+          <a:bodyPr rtlCol="1" anchor="ctr"/>
+          <a:lstStyle/>
+          <a:p>
+            <a:pPr algn="ctr" rtl="0">
+              <a:defRPr/>
+            </a:pPr>
+            <a:r>
+              <a:rPr lang="en-US" sz="1200" b="1">
+                <a:solidFill>
+                  <a:schemeClr val="tx1"/>
+                </a:solidFill>
+                <a:latin typeface="Segoe UI" panose="020B0502040204020203" pitchFamily="34" charset="0"/>
+                <a:cs typeface="Segoe UI" panose="020B0502040204020203" pitchFamily="34" charset="0"/>
+              </a:rPr>
+              <a:t>ExamTests</a:t>
+            </a:r>
+            <a:endParaRPr sz="1000">
+              <a:solidFill>
+                <a:schemeClr val="tx1"/>
+              </a:solidFill>
+              <a:latin typeface="Segoe UI" panose="020B0502040204020203" pitchFamily="34" charset="0"/>
+              <a:cs typeface="Segoe UI" panose="020B0502040204020203" pitchFamily="34" charset="0"/>
+            </a:endParaRPr>
+          </a:p>
+        </p:txBody>
+      </p:sp>
+      <p:sp>
+        <p:nvSpPr>
+          <p:cNvPr id="14" name="Rectangle: Rounded Corners 44">
+            <a:extLst>
+              <a:ext uri="{FF2B5EF4-FFF2-40B4-BE49-F238E27FC236}">
+                <a16:creationId xmlns:a16="http://schemas.microsoft.com/office/drawing/2014/main" id="{E3D226E7-6D9C-2AEB-87F0-BE05FB5D9FEF}"/>
+              </a:ext>
+            </a:extLst>
+          </p:cNvPr>
+          <p:cNvSpPr/>
+          <p:nvPr/>
+        </p:nvSpPr>
+        <p:spPr bwMode="auto">
+          <a:xfrm>
+            <a:off x="8257318" y="1832695"/>
+            <a:ext cx="1584176" cy="432048"/>
+          </a:xfrm>
+          <a:prstGeom prst="roundRect">
+            <a:avLst>
+              <a:gd name="adj" fmla="val 9941"/>
+            </a:avLst>
+          </a:prstGeom>
+          <a:solidFill>
+            <a:schemeClr val="bg1"/>
+          </a:solidFill>
+          <a:ln>
+            <a:solidFill>
+              <a:schemeClr val="tx1"/>
+            </a:solidFill>
+          </a:ln>
+          <a:effectLst/>
+        </p:spPr>
+        <p:style>
+          <a:lnRef idx="0">
+            <a:schemeClr val="accent4"/>
+          </a:lnRef>
+          <a:fillRef idx="3">
+            <a:schemeClr val="accent4"/>
+          </a:fillRef>
+          <a:effectRef idx="3">
+            <a:schemeClr val="accent4"/>
+          </a:effectRef>
+          <a:fontRef idx="minor">
+            <a:schemeClr val="lt1"/>
+          </a:fontRef>
+        </p:style>
+        <p:txBody>
+          <a:bodyPr rtlCol="1" anchor="ctr"/>
+          <a:lstStyle/>
+          <a:p>
+            <a:pPr algn="ctr" rtl="0">
+              <a:defRPr/>
+            </a:pPr>
+            <a:r>
+              <a:rPr lang="en-US" sz="1200" b="1">
+                <a:solidFill>
+                  <a:schemeClr val="tx1"/>
+                </a:solidFill>
+                <a:latin typeface="Segoe UI" panose="020B0502040204020203" pitchFamily="34" charset="0"/>
+                <a:cs typeface="Segoe UI" panose="020B0502040204020203" pitchFamily="34" charset="0"/>
+              </a:rPr>
+              <a:t>StudentExamTests</a:t>
+            </a:r>
+            <a:endParaRPr sz="1000">
+              <a:solidFill>
+                <a:schemeClr val="tx1"/>
+              </a:solidFill>
+              <a:latin typeface="Segoe UI" panose="020B0502040204020203" pitchFamily="34" charset="0"/>
+              <a:cs typeface="Segoe UI" panose="020B0502040204020203" pitchFamily="34" charset="0"/>
+            </a:endParaRPr>
+          </a:p>
+        </p:txBody>
+      </p:sp>
+      <p:sp>
+        <p:nvSpPr>
+          <p:cNvPr id="15" name="Rectangle: Rounded Corners 44">
+            <a:extLst>
+              <a:ext uri="{FF2B5EF4-FFF2-40B4-BE49-F238E27FC236}">
+                <a16:creationId xmlns:a16="http://schemas.microsoft.com/office/drawing/2014/main" id="{DFD69A0F-29E8-6801-A053-B44A60CDFB1E}"/>
+              </a:ext>
+            </a:extLst>
+          </p:cNvPr>
+          <p:cNvSpPr/>
+          <p:nvPr/>
+        </p:nvSpPr>
+        <p:spPr bwMode="auto">
+          <a:xfrm>
+            <a:off x="4692922" y="5539446"/>
+            <a:ext cx="1584176" cy="432048"/>
+          </a:xfrm>
+          <a:prstGeom prst="roundRect">
+            <a:avLst>
+              <a:gd name="adj" fmla="val 9941"/>
+            </a:avLst>
+          </a:prstGeom>
+          <a:solidFill>
+            <a:schemeClr val="bg1"/>
+          </a:solidFill>
+          <a:ln>
+            <a:solidFill>
+              <a:schemeClr val="tx1"/>
+            </a:solidFill>
+          </a:ln>
+          <a:effectLst/>
+        </p:spPr>
+        <p:style>
+          <a:lnRef idx="0">
+            <a:schemeClr val="accent4"/>
+          </a:lnRef>
+          <a:fillRef idx="3">
+            <a:schemeClr val="accent4"/>
+          </a:fillRef>
+          <a:effectRef idx="3">
+            <a:schemeClr val="accent4"/>
+          </a:effectRef>
+          <a:fontRef idx="minor">
+            <a:schemeClr val="lt1"/>
+          </a:fontRef>
+        </p:style>
+        <p:txBody>
+          <a:bodyPr rtlCol="1" anchor="ctr"/>
+          <a:lstStyle/>
+          <a:p>
+            <a:pPr algn="ctr" rtl="0">
+              <a:defRPr/>
+            </a:pPr>
+            <a:r>
+              <a:rPr lang="en-US" sz="1200" b="1">
+                <a:solidFill>
+                  <a:schemeClr val="tx1"/>
+                </a:solidFill>
+                <a:latin typeface="Segoe UI" panose="020B0502040204020203" pitchFamily="34" charset="0"/>
+                <a:cs typeface="Segoe UI" panose="020B0502040204020203" pitchFamily="34" charset="0"/>
+              </a:rPr>
+              <a:t>StudentExams</a:t>
+            </a:r>
+            <a:endParaRPr sz="1000">
+              <a:solidFill>
+                <a:schemeClr val="tx1"/>
+              </a:solidFill>
+              <a:latin typeface="Segoe UI" panose="020B0502040204020203" pitchFamily="34" charset="0"/>
+              <a:cs typeface="Segoe UI" panose="020B0502040204020203" pitchFamily="34" charset="0"/>
+            </a:endParaRPr>
+          </a:p>
+        </p:txBody>
+      </p:sp>
+      <p:sp>
+        <p:nvSpPr>
+          <p:cNvPr id="16" name="Rectangle: Rounded Corners 44">
+            <a:extLst>
+              <a:ext uri="{FF2B5EF4-FFF2-40B4-BE49-F238E27FC236}">
+                <a16:creationId xmlns:a16="http://schemas.microsoft.com/office/drawing/2014/main" id="{F3BE2F15-7F03-2203-5767-CE410C3B0EBA}"/>
+              </a:ext>
+            </a:extLst>
+          </p:cNvPr>
+          <p:cNvSpPr/>
+          <p:nvPr/>
+        </p:nvSpPr>
+        <p:spPr bwMode="auto">
+          <a:xfrm>
+            <a:off x="277887" y="2723823"/>
+            <a:ext cx="1440160" cy="432048"/>
+          </a:xfrm>
+          <a:prstGeom prst="roundRect">
+            <a:avLst>
+              <a:gd name="adj" fmla="val 9941"/>
+            </a:avLst>
+          </a:prstGeom>
+          <a:solidFill>
+            <a:schemeClr val="bg1"/>
+          </a:solidFill>
+          <a:ln>
+            <a:solidFill>
+              <a:schemeClr val="tx1"/>
+            </a:solidFill>
+          </a:ln>
+          <a:effectLst/>
+        </p:spPr>
+        <p:style>
+          <a:lnRef idx="0">
+            <a:schemeClr val="accent4"/>
+          </a:lnRef>
+          <a:fillRef idx="3">
+            <a:schemeClr val="accent4"/>
+          </a:fillRef>
+          <a:effectRef idx="3">
+            <a:schemeClr val="accent4"/>
+          </a:effectRef>
+          <a:fontRef idx="minor">
+            <a:schemeClr val="lt1"/>
+          </a:fontRef>
+        </p:style>
+        <p:txBody>
+          <a:bodyPr rtlCol="1" anchor="ctr"/>
+          <a:lstStyle/>
+          <a:p>
+            <a:pPr algn="ctr" rtl="0">
+              <a:defRPr/>
+            </a:pPr>
+            <a:r>
+              <a:rPr lang="en-US" sz="1200" b="1">
+                <a:solidFill>
+                  <a:schemeClr val="tx1"/>
+                </a:solidFill>
+                <a:latin typeface="Segoe UI" panose="020B0502040204020203" pitchFamily="34" charset="0"/>
+                <a:cs typeface="Segoe UI" panose="020B0502040204020203" pitchFamily="34" charset="0"/>
+              </a:rPr>
+              <a:t>StudentCourses</a:t>
+            </a:r>
+            <a:endParaRPr sz="1000">
+              <a:solidFill>
+                <a:schemeClr val="tx1"/>
+              </a:solidFill>
+              <a:latin typeface="Segoe UI" panose="020B0502040204020203" pitchFamily="34" charset="0"/>
+              <a:cs typeface="Segoe UI" panose="020B0502040204020203" pitchFamily="34" charset="0"/>
+            </a:endParaRPr>
+          </a:p>
+        </p:txBody>
+      </p:sp>
+      <p:sp>
+        <p:nvSpPr>
+          <p:cNvPr id="17" name="Rectangle: Rounded Corners 44">
+            <a:extLst>
+              <a:ext uri="{FF2B5EF4-FFF2-40B4-BE49-F238E27FC236}">
+                <a16:creationId xmlns:a16="http://schemas.microsoft.com/office/drawing/2014/main" id="{9B723CD1-870B-F1D9-904E-BB51CFF4BD3E}"/>
+              </a:ext>
+            </a:extLst>
+          </p:cNvPr>
+          <p:cNvSpPr/>
+          <p:nvPr/>
+        </p:nvSpPr>
+        <p:spPr bwMode="auto">
+          <a:xfrm>
+            <a:off x="358943" y="1844824"/>
+            <a:ext cx="1713737" cy="432048"/>
+          </a:xfrm>
+          <a:prstGeom prst="roundRect">
+            <a:avLst>
+              <a:gd name="adj" fmla="val 9941"/>
+            </a:avLst>
+          </a:prstGeom>
+          <a:solidFill>
+            <a:schemeClr val="bg1"/>
+          </a:solidFill>
+          <a:ln>
+            <a:solidFill>
+              <a:schemeClr val="tx1"/>
+            </a:solidFill>
+          </a:ln>
+          <a:effectLst/>
+        </p:spPr>
+        <p:style>
+          <a:lnRef idx="0">
+            <a:schemeClr val="accent4"/>
+          </a:lnRef>
+          <a:fillRef idx="3">
+            <a:schemeClr val="accent4"/>
+          </a:fillRef>
+          <a:effectRef idx="3">
+            <a:schemeClr val="accent4"/>
+          </a:effectRef>
+          <a:fontRef idx="minor">
+            <a:schemeClr val="lt1"/>
+          </a:fontRef>
+        </p:style>
+        <p:txBody>
+          <a:bodyPr rtlCol="1" anchor="ctr"/>
+          <a:lstStyle/>
+          <a:p>
+            <a:pPr algn="ctr" rtl="0">
+              <a:defRPr/>
+            </a:pPr>
+            <a:r>
+              <a:rPr lang="en-US" sz="1200" b="1">
+                <a:solidFill>
+                  <a:schemeClr val="tx1"/>
+                </a:solidFill>
+                <a:latin typeface="Segoe UI" panose="020B0502040204020203" pitchFamily="34" charset="0"/>
+                <a:cs typeface="Segoe UI" panose="020B0502040204020203" pitchFamily="34" charset="0"/>
+              </a:rPr>
+              <a:t>StudentCourseTests</a:t>
+            </a:r>
+            <a:endParaRPr sz="1000">
+              <a:solidFill>
+                <a:schemeClr val="tx1"/>
+              </a:solidFill>
+              <a:latin typeface="Segoe UI" panose="020B0502040204020203" pitchFamily="34" charset="0"/>
+              <a:cs typeface="Segoe UI" panose="020B0502040204020203" pitchFamily="34" charset="0"/>
+            </a:endParaRPr>
+          </a:p>
+        </p:txBody>
+      </p:sp>
+      <p:sp>
+        <p:nvSpPr>
           <p:cNvPr id="73" name="Freeform: Shape 72">
             <a:extLst>
               <a:ext uri="{FF2B5EF4-FFF2-40B4-BE49-F238E27FC236}">
-                <a16:creationId xmlns:a16="http://schemas.microsoft.com/office/drawing/2014/main" id="{514EF010-6938-3C0E-341D-9EE998AD6FD7}"/>
+                <a16:creationId xmlns:a16="http://schemas.microsoft.com/office/drawing/2014/main" id="{A6080E5C-D8C9-9E8C-02D1-E99EC371D685}"/>
               </a:ext>
             </a:extLst>
           </p:cNvPr>
@@ -9647,7 +12127,7 @@
           <p:cNvPr id="74" name="Freeform: Shape 73">
             <a:extLst>
               <a:ext uri="{FF2B5EF4-FFF2-40B4-BE49-F238E27FC236}">
-                <a16:creationId xmlns:a16="http://schemas.microsoft.com/office/drawing/2014/main" id="{253D40F2-248D-C49B-596D-4E0C4AE172E3}"/>
+                <a16:creationId xmlns:a16="http://schemas.microsoft.com/office/drawing/2014/main" id="{A7024351-485F-424D-7291-C7F93BFABC31}"/>
               </a:ext>
             </a:extLst>
           </p:cNvPr>
@@ -9732,7 +12212,7 @@
           <p:cNvPr id="77" name="Freeform: Shape 76">
             <a:extLst>
               <a:ext uri="{FF2B5EF4-FFF2-40B4-BE49-F238E27FC236}">
-                <a16:creationId xmlns:a16="http://schemas.microsoft.com/office/drawing/2014/main" id="{C7E3C7A9-90D4-DC90-8651-67223AFDE4C3}"/>
+                <a16:creationId xmlns:a16="http://schemas.microsoft.com/office/drawing/2014/main" id="{333EBA63-8C63-96D9-5C3E-09A8CE1A6809}"/>
               </a:ext>
             </a:extLst>
           </p:cNvPr>
@@ -9817,7 +12297,7 @@
           <p:cNvPr id="78" name="Freeform: Shape 77">
             <a:extLst>
               <a:ext uri="{FF2B5EF4-FFF2-40B4-BE49-F238E27FC236}">
-                <a16:creationId xmlns:a16="http://schemas.microsoft.com/office/drawing/2014/main" id="{79C87FAB-49CC-4EE8-8467-65D95E3714B5}"/>
+                <a16:creationId xmlns:a16="http://schemas.microsoft.com/office/drawing/2014/main" id="{4AD03AE6-9C63-CE38-05F0-8EC8D9FF7530}"/>
               </a:ext>
             </a:extLst>
           </p:cNvPr>
@@ -9912,7 +12392,7 @@
           <p:cNvPr id="80" name="Freeform: Shape 79">
             <a:extLst>
               <a:ext uri="{FF2B5EF4-FFF2-40B4-BE49-F238E27FC236}">
-                <a16:creationId xmlns:a16="http://schemas.microsoft.com/office/drawing/2014/main" id="{50D331A2-D0CF-213F-4491-652B37D1055D}"/>
+                <a16:creationId xmlns:a16="http://schemas.microsoft.com/office/drawing/2014/main" id="{D11D042B-6E34-C7D3-79E9-5508D4F12DA8}"/>
               </a:ext>
             </a:extLst>
           </p:cNvPr>
@@ -9997,7 +12477,7 @@
           <p:cNvPr id="81" name="Freeform: Shape 80">
             <a:extLst>
               <a:ext uri="{FF2B5EF4-FFF2-40B4-BE49-F238E27FC236}">
-                <a16:creationId xmlns:a16="http://schemas.microsoft.com/office/drawing/2014/main" id="{6DF96DEE-DFCA-3749-6990-805281444A84}"/>
+                <a16:creationId xmlns:a16="http://schemas.microsoft.com/office/drawing/2014/main" id="{301641C3-6585-0970-3518-761892F8F480}"/>
               </a:ext>
             </a:extLst>
           </p:cNvPr>
@@ -10082,7 +12562,7 @@
           <p:cNvPr id="82" name="Freeform: Shape 81">
             <a:extLst>
               <a:ext uri="{FF2B5EF4-FFF2-40B4-BE49-F238E27FC236}">
-                <a16:creationId xmlns:a16="http://schemas.microsoft.com/office/drawing/2014/main" id="{E6EC950A-D2FD-4B81-2960-0CD32E90850D}"/>
+                <a16:creationId xmlns:a16="http://schemas.microsoft.com/office/drawing/2014/main" id="{D9333389-94BF-6673-1033-075FF5B01F23}"/>
               </a:ext>
             </a:extLst>
           </p:cNvPr>
@@ -10177,7 +12657,7 @@
           <p:cNvPr id="83" name="Freeform: Shape 82">
             <a:extLst>
               <a:ext uri="{FF2B5EF4-FFF2-40B4-BE49-F238E27FC236}">
-                <a16:creationId xmlns:a16="http://schemas.microsoft.com/office/drawing/2014/main" id="{4882DD05-9430-2BA5-23ED-80FF95F13443}"/>
+                <a16:creationId xmlns:a16="http://schemas.microsoft.com/office/drawing/2014/main" id="{DA18C47A-3E61-BC73-F2AE-CB016FC4A557}"/>
               </a:ext>
             </a:extLst>
           </p:cNvPr>
@@ -10262,7 +12742,7 @@
           <p:cNvPr id="85" name="Freeform: Shape 84">
             <a:extLst>
               <a:ext uri="{FF2B5EF4-FFF2-40B4-BE49-F238E27FC236}">
-                <a16:creationId xmlns:a16="http://schemas.microsoft.com/office/drawing/2014/main" id="{C8FD1387-B4E9-3F30-94DF-2D6012FDF22D}"/>
+                <a16:creationId xmlns:a16="http://schemas.microsoft.com/office/drawing/2014/main" id="{BCFF6109-C876-60F7-A34F-57BCE4A0300F}"/>
               </a:ext>
             </a:extLst>
           </p:cNvPr>
@@ -10357,7 +12837,7 @@
           <p:cNvPr id="86" name="Freeform: Shape 85">
             <a:extLst>
               <a:ext uri="{FF2B5EF4-FFF2-40B4-BE49-F238E27FC236}">
-                <a16:creationId xmlns:a16="http://schemas.microsoft.com/office/drawing/2014/main" id="{202F33A5-5051-3C5A-BD19-F10D186B9A5E}"/>
+                <a16:creationId xmlns:a16="http://schemas.microsoft.com/office/drawing/2014/main" id="{34A8D625-56CF-A678-F747-6AFC24CD5093}"/>
               </a:ext>
             </a:extLst>
           </p:cNvPr>
@@ -10442,7 +12922,7 @@
           <p:cNvPr id="2" name="Rectangle: Rounded Corners 1">
             <a:extLst>
               <a:ext uri="{FF2B5EF4-FFF2-40B4-BE49-F238E27FC236}">
-                <a16:creationId xmlns:a16="http://schemas.microsoft.com/office/drawing/2014/main" id="{8329DAE4-DB41-AE5D-2417-8AC4E763DAA2}"/>
+                <a16:creationId xmlns:a16="http://schemas.microsoft.com/office/drawing/2014/main" id="{8CB69B02-422A-FBEC-9AC6-5263E8C1FD0B}"/>
               </a:ext>
             </a:extLst>
           </p:cNvPr>
@@ -10501,7 +12981,7 @@
           <p:cNvPr id="3" name="Rectangle: Rounded Corners 2">
             <a:extLst>
               <a:ext uri="{FF2B5EF4-FFF2-40B4-BE49-F238E27FC236}">
-                <a16:creationId xmlns:a16="http://schemas.microsoft.com/office/drawing/2014/main" id="{6C6E5A19-E85E-77F7-057B-7B3341F86A4F}"/>
+                <a16:creationId xmlns:a16="http://schemas.microsoft.com/office/drawing/2014/main" id="{7C39DA48-DBE3-984F-39EE-894EE925454B}"/>
               </a:ext>
             </a:extLst>
           </p:cNvPr>
@@ -10560,7 +13040,7 @@
           <p:cNvPr id="18" name="Rectangle: Rounded Corners 17">
             <a:extLst>
               <a:ext uri="{FF2B5EF4-FFF2-40B4-BE49-F238E27FC236}">
-                <a16:creationId xmlns:a16="http://schemas.microsoft.com/office/drawing/2014/main" id="{2E823AB6-0A51-32D0-C7BA-2E155E6C4A95}"/>
+                <a16:creationId xmlns:a16="http://schemas.microsoft.com/office/drawing/2014/main" id="{D84A854A-FBCC-4457-2B96-8A299F1C6F46}"/>
               </a:ext>
             </a:extLst>
           </p:cNvPr>
@@ -10619,7 +13099,7 @@
           <p:cNvPr id="19" name="Rectangle: Rounded Corners 18">
             <a:extLst>
               <a:ext uri="{FF2B5EF4-FFF2-40B4-BE49-F238E27FC236}">
-                <a16:creationId xmlns:a16="http://schemas.microsoft.com/office/drawing/2014/main" id="{80506A92-C627-2D82-BCD4-0E2E9C9E2A93}"/>
+                <a16:creationId xmlns:a16="http://schemas.microsoft.com/office/drawing/2014/main" id="{3174BE1D-EE52-CC6D-06D2-CBC5072183EF}"/>
               </a:ext>
             </a:extLst>
           </p:cNvPr>
@@ -10678,7 +13158,7 @@
           <p:cNvPr id="20" name="Rectangle: Rounded Corners 19">
             <a:extLst>
               <a:ext uri="{FF2B5EF4-FFF2-40B4-BE49-F238E27FC236}">
-                <a16:creationId xmlns:a16="http://schemas.microsoft.com/office/drawing/2014/main" id="{C6141F14-86F4-09B7-F9BC-DD3DFB3C5568}"/>
+                <a16:creationId xmlns:a16="http://schemas.microsoft.com/office/drawing/2014/main" id="{450BF565-2419-95FE-1EAF-D5FCC7AAC74E}"/>
               </a:ext>
             </a:extLst>
           </p:cNvPr>
@@ -10737,7 +13217,7 @@
           <p:cNvPr id="21" name="Rectangle: Rounded Corners 20">
             <a:extLst>
               <a:ext uri="{FF2B5EF4-FFF2-40B4-BE49-F238E27FC236}">
-                <a16:creationId xmlns:a16="http://schemas.microsoft.com/office/drawing/2014/main" id="{604AC010-6D83-33EC-62E6-3D3628888634}"/>
+                <a16:creationId xmlns:a16="http://schemas.microsoft.com/office/drawing/2014/main" id="{5E29A3FE-25D3-F9C6-ED15-003AD022653B}"/>
               </a:ext>
             </a:extLst>
           </p:cNvPr>
@@ -10796,7 +13276,7 @@
           <p:cNvPr id="22" name="Rectangle: Rounded Corners 21">
             <a:extLst>
               <a:ext uri="{FF2B5EF4-FFF2-40B4-BE49-F238E27FC236}">
-                <a16:creationId xmlns:a16="http://schemas.microsoft.com/office/drawing/2014/main" id="{66218F53-4E7E-7846-3A64-AEA25DC1DA78}"/>
+                <a16:creationId xmlns:a16="http://schemas.microsoft.com/office/drawing/2014/main" id="{CC7BDD06-6A8D-3E52-307D-64782A79A56E}"/>
               </a:ext>
             </a:extLst>
           </p:cNvPr>
@@ -10855,7 +13335,7 @@
           <p:cNvPr id="23" name="Rectangle: Rounded Corners 22">
             <a:extLst>
               <a:ext uri="{FF2B5EF4-FFF2-40B4-BE49-F238E27FC236}">
-                <a16:creationId xmlns:a16="http://schemas.microsoft.com/office/drawing/2014/main" id="{F71CBD1C-529C-95A9-CD00-77CFBEDE60FB}"/>
+                <a16:creationId xmlns:a16="http://schemas.microsoft.com/office/drawing/2014/main" id="{F160EC1B-4B71-E273-C714-99BBE9238054}"/>
               </a:ext>
             </a:extLst>
           </p:cNvPr>
@@ -10914,7 +13394,7 @@
           <p:cNvPr id="24" name="Rectangle: Rounded Corners 23">
             <a:extLst>
               <a:ext uri="{FF2B5EF4-FFF2-40B4-BE49-F238E27FC236}">
-                <a16:creationId xmlns:a16="http://schemas.microsoft.com/office/drawing/2014/main" id="{9B31348A-FBF9-A1ED-AC2F-6CA801913EB2}"/>
+                <a16:creationId xmlns:a16="http://schemas.microsoft.com/office/drawing/2014/main" id="{9B9F0621-F3B6-1F74-3844-3A7D99E6126C}"/>
               </a:ext>
             </a:extLst>
           </p:cNvPr>
@@ -10973,7 +13453,7 @@
           <p:cNvPr id="25" name="Rectangle: Rounded Corners 24">
             <a:extLst>
               <a:ext uri="{FF2B5EF4-FFF2-40B4-BE49-F238E27FC236}">
-                <a16:creationId xmlns:a16="http://schemas.microsoft.com/office/drawing/2014/main" id="{191D76E8-7214-17C6-F9ED-7155246EDE04}"/>
+                <a16:creationId xmlns:a16="http://schemas.microsoft.com/office/drawing/2014/main" id="{6C356503-0BFB-C229-B47B-4B613AF78ED2}"/>
               </a:ext>
             </a:extLst>
           </p:cNvPr>
@@ -11032,7 +13512,7 @@
           <p:cNvPr id="26" name="Rectangle: Rounded Corners 25">
             <a:extLst>
               <a:ext uri="{FF2B5EF4-FFF2-40B4-BE49-F238E27FC236}">
-                <a16:creationId xmlns:a16="http://schemas.microsoft.com/office/drawing/2014/main" id="{CA4A9FD8-959B-38C0-1D77-3997B806CA72}"/>
+                <a16:creationId xmlns:a16="http://schemas.microsoft.com/office/drawing/2014/main" id="{866DE8E9-07D3-9A65-ED1F-2054192C11EE}"/>
               </a:ext>
             </a:extLst>
           </p:cNvPr>
@@ -11091,7 +13571,7 @@
           <p:cNvPr id="27" name="Rectangle: Rounded Corners 26">
             <a:extLst>
               <a:ext uri="{FF2B5EF4-FFF2-40B4-BE49-F238E27FC236}">
-                <a16:creationId xmlns:a16="http://schemas.microsoft.com/office/drawing/2014/main" id="{9635EA43-F3DB-E2F8-479F-52C5BE0D6683}"/>
+                <a16:creationId xmlns:a16="http://schemas.microsoft.com/office/drawing/2014/main" id="{4A2ED031-2B85-82EA-45FA-7DB097327E86}"/>
               </a:ext>
             </a:extLst>
           </p:cNvPr>
@@ -11150,7 +13630,7 @@
           <p:cNvPr id="28" name="Rectangle: Rounded Corners 27">
             <a:extLst>
               <a:ext uri="{FF2B5EF4-FFF2-40B4-BE49-F238E27FC236}">
-                <a16:creationId xmlns:a16="http://schemas.microsoft.com/office/drawing/2014/main" id="{E4EF6A6F-25B6-33A8-027B-D62A4D82E484}"/>
+                <a16:creationId xmlns:a16="http://schemas.microsoft.com/office/drawing/2014/main" id="{5F6308A9-AD85-EA40-0941-ED22A9F5DC51}"/>
               </a:ext>
             </a:extLst>
           </p:cNvPr>
@@ -11209,7 +13689,7 @@
           <p:cNvPr id="29" name="Rectangle: Rounded Corners 28">
             <a:extLst>
               <a:ext uri="{FF2B5EF4-FFF2-40B4-BE49-F238E27FC236}">
-                <a16:creationId xmlns:a16="http://schemas.microsoft.com/office/drawing/2014/main" id="{D9D7D786-C6AB-16AF-9442-77A87021CC54}"/>
+                <a16:creationId xmlns:a16="http://schemas.microsoft.com/office/drawing/2014/main" id="{CA4B78C6-C6E9-967A-826D-EC84D87E8D3D}"/>
               </a:ext>
             </a:extLst>
           </p:cNvPr>
@@ -11268,7 +13748,7 @@
           <p:cNvPr id="31" name="Freeform: Shape 30">
             <a:extLst>
               <a:ext uri="{FF2B5EF4-FFF2-40B4-BE49-F238E27FC236}">
-                <a16:creationId xmlns:a16="http://schemas.microsoft.com/office/drawing/2014/main" id="{A4F46B05-C1D6-F158-8E80-E93D71D2B353}"/>
+                <a16:creationId xmlns:a16="http://schemas.microsoft.com/office/drawing/2014/main" id="{8FECC264-7954-CE3C-C672-3EF591A99DAF}"/>
               </a:ext>
             </a:extLst>
           </p:cNvPr>
@@ -11353,7 +13833,7 @@
           <p:cNvPr id="32" name="Freeform: Shape 31">
             <a:extLst>
               <a:ext uri="{FF2B5EF4-FFF2-40B4-BE49-F238E27FC236}">
-                <a16:creationId xmlns:a16="http://schemas.microsoft.com/office/drawing/2014/main" id="{3DD5523E-B334-F32F-3F68-3790949AB52A}"/>
+                <a16:creationId xmlns:a16="http://schemas.microsoft.com/office/drawing/2014/main" id="{B4CBD4E0-877A-0244-8CDC-3908FCC7F4A8}"/>
               </a:ext>
             </a:extLst>
           </p:cNvPr>
@@ -11438,7 +13918,7 @@
           <p:cNvPr id="33" name="Freeform: Shape 32">
             <a:extLst>
               <a:ext uri="{FF2B5EF4-FFF2-40B4-BE49-F238E27FC236}">
-                <a16:creationId xmlns:a16="http://schemas.microsoft.com/office/drawing/2014/main" id="{E988DA9B-B721-6C1E-CD14-B3ABEDC9F985}"/>
+                <a16:creationId xmlns:a16="http://schemas.microsoft.com/office/drawing/2014/main" id="{38DF2BF3-34F1-912B-3C3C-8125695C8301}"/>
               </a:ext>
             </a:extLst>
           </p:cNvPr>
@@ -11523,7 +14003,7 @@
           <p:cNvPr id="34" name="Freeform: Shape 33">
             <a:extLst>
               <a:ext uri="{FF2B5EF4-FFF2-40B4-BE49-F238E27FC236}">
-                <a16:creationId xmlns:a16="http://schemas.microsoft.com/office/drawing/2014/main" id="{89CABFBC-96D5-F197-4F1B-A3122FDC0E82}"/>
+                <a16:creationId xmlns:a16="http://schemas.microsoft.com/office/drawing/2014/main" id="{57DB4B19-ACBC-9BB8-BE08-B7521EA47E64}"/>
               </a:ext>
             </a:extLst>
           </p:cNvPr>
@@ -11606,7 +14086,7 @@
     </p:spTree>
     <p:extLst>
       <p:ext uri="{BB962C8B-B14F-4D97-AF65-F5344CB8AC3E}">
-        <p14:creationId xmlns:p14="http://schemas.microsoft.com/office/powerpoint/2010/main" val="2004589811"/>
+        <p14:creationId xmlns:p14="http://schemas.microsoft.com/office/powerpoint/2010/main" val="1709526180"/>
       </p:ext>
     </p:extLst>
   </p:cSld>
@@ -11616,7 +14096,7 @@
 </p:sld>
 </file>
 
-<file path=ppt/slides/slide3.xml><?xml version="1.0" encoding="utf-8"?>
+<file path=ppt/slides/slide4.xml><?xml version="1.0" encoding="utf-8"?>
 <p:sld xmlns:a="http://schemas.openxmlformats.org/drawingml/2006/main" xmlns:r="http://schemas.openxmlformats.org/officeDocument/2006/relationships" xmlns:p="http://schemas.openxmlformats.org/presentationml/2006/main">
   <p:cSld>
     <p:spTree>
@@ -13171,7 +15651,7 @@
 </p:sld>
 </file>
 
-<file path=ppt/slides/slide4.xml><?xml version="1.0" encoding="utf-8"?>
+<file path=ppt/slides/slide5.xml><?xml version="1.0" encoding="utf-8"?>
 <p:sld xmlns:a="http://schemas.openxmlformats.org/drawingml/2006/main" xmlns:r="http://schemas.openxmlformats.org/officeDocument/2006/relationships" xmlns:p="http://schemas.openxmlformats.org/presentationml/2006/main">
   <p:cSld>
     <p:spTree>

</xml_diff>

<commit_message>
-Backend done for: 16 (messages), 17(studentMessages)
</commit_message>
<xml_diff>
--- a/ExaminerB/.appCatalog/ExaminerB notes 1404.pptx
+++ b/ExaminerB/.appCatalog/ExaminerB notes 1404.pptx
@@ -282,7 +282,7 @@
             </a:pPr>
             <a:fld id="{BCC18F51-09EC-435C-A3BA-64A766E099C0}" type="datetimeFigureOut">
               <a:rPr lang="fa-IR"/>
-              <a:t>27/06/1447</a:t>
+              <a:t>28/06/1447</a:t>
             </a:fld>
             <a:endParaRPr/>
           </a:p>
@@ -461,7 +461,7 @@
             </a:pPr>
             <a:fld id="{BCC18F51-09EC-435C-A3BA-64A766E099C0}" type="datetimeFigureOut">
               <a:rPr lang="fa-IR"/>
-              <a:t>27/06/1447</a:t>
+              <a:t>28/06/1447</a:t>
             </a:fld>
             <a:endParaRPr/>
           </a:p>
@@ -650,7 +650,7 @@
             </a:pPr>
             <a:fld id="{BCC18F51-09EC-435C-A3BA-64A766E099C0}" type="datetimeFigureOut">
               <a:rPr lang="fa-IR"/>
-              <a:t>27/06/1447</a:t>
+              <a:t>28/06/1447</a:t>
             </a:fld>
             <a:endParaRPr/>
           </a:p>
@@ -829,7 +829,7 @@
             </a:pPr>
             <a:fld id="{BCC18F51-09EC-435C-A3BA-64A766E099C0}" type="datetimeFigureOut">
               <a:rPr lang="fa-IR"/>
-              <a:t>27/06/1447</a:t>
+              <a:t>28/06/1447</a:t>
             </a:fld>
             <a:endParaRPr/>
           </a:p>
@@ -1081,7 +1081,7 @@
             </a:pPr>
             <a:fld id="{BCC18F51-09EC-435C-A3BA-64A766E099C0}" type="datetimeFigureOut">
               <a:rPr lang="fa-IR"/>
-              <a:t>27/06/1447</a:t>
+              <a:t>28/06/1447</a:t>
             </a:fld>
             <a:endParaRPr/>
           </a:p>
@@ -1326,7 +1326,7 @@
             </a:pPr>
             <a:fld id="{BCC18F51-09EC-435C-A3BA-64A766E099C0}" type="datetimeFigureOut">
               <a:rPr lang="fa-IR"/>
-              <a:t>27/06/1447</a:t>
+              <a:t>28/06/1447</a:t>
             </a:fld>
             <a:endParaRPr/>
           </a:p>
@@ -1708,7 +1708,7 @@
             </a:pPr>
             <a:fld id="{BCC18F51-09EC-435C-A3BA-64A766E099C0}" type="datetimeFigureOut">
               <a:rPr lang="fa-IR"/>
-              <a:t>27/06/1447</a:t>
+              <a:t>28/06/1447</a:t>
             </a:fld>
             <a:endParaRPr/>
           </a:p>
@@ -1831,7 +1831,7 @@
             </a:pPr>
             <a:fld id="{BCC18F51-09EC-435C-A3BA-64A766E099C0}" type="datetimeFigureOut">
               <a:rPr lang="fa-IR"/>
-              <a:t>27/06/1447</a:t>
+              <a:t>28/06/1447</a:t>
             </a:fld>
             <a:endParaRPr/>
           </a:p>
@@ -1930,7 +1930,7 @@
             </a:pPr>
             <a:fld id="{BCC18F51-09EC-435C-A3BA-64A766E099C0}" type="datetimeFigureOut">
               <a:rPr lang="fa-IR"/>
-              <a:t>27/06/1447</a:t>
+              <a:t>28/06/1447</a:t>
             </a:fld>
             <a:endParaRPr/>
           </a:p>
@@ -2217,7 +2217,7 @@
             </a:pPr>
             <a:fld id="{BCC18F51-09EC-435C-A3BA-64A766E099C0}" type="datetimeFigureOut">
               <a:rPr lang="fa-IR"/>
-              <a:t>27/06/1447</a:t>
+              <a:t>28/06/1447</a:t>
             </a:fld>
             <a:endParaRPr/>
           </a:p>
@@ -2481,7 +2481,7 @@
             </a:pPr>
             <a:fld id="{BCC18F51-09EC-435C-A3BA-64A766E099C0}" type="datetimeFigureOut">
               <a:rPr lang="fa-IR"/>
-              <a:t>27/06/1447</a:t>
+              <a:t>28/06/1447</a:t>
             </a:fld>
             <a:endParaRPr/>
           </a:p>
@@ -2703,7 +2703,7 @@
             </a:pPr>
             <a:fld id="{BCC18F51-09EC-435C-A3BA-64A766E099C0}" type="datetimeFigureOut">
               <a:rPr lang="fa-IR"/>
-              <a:t>27/06/1447</a:t>
+              <a:t>28/06/1447</a:t>
             </a:fld>
             <a:endParaRPr/>
           </a:p>
@@ -8282,7 +8282,7 @@
                 <a:latin typeface="Segoe UI" panose="020B0502040204020203" pitchFamily="34" charset="0"/>
                 <a:cs typeface="Segoe UI" panose="020B0502040204020203" pitchFamily="34" charset="0"/>
               </a:rPr>
-              <a:t>Message</a:t>
+              <a:t>StudentMessage</a:t>
             </a:r>
             <a:r>
               <a:rPr lang="en-US" sz="1000">
@@ -8375,12 +8375,12 @@
           </a:xfrm>
           <a:prstGeom prst="borderCallout2">
             <a:avLst>
-              <a:gd name="adj1" fmla="val -1181"/>
-              <a:gd name="adj2" fmla="val 95055"/>
-              <a:gd name="adj3" fmla="val -19311"/>
-              <a:gd name="adj4" fmla="val 95265"/>
-              <a:gd name="adj5" fmla="val -22280"/>
-              <a:gd name="adj6" fmla="val 84748"/>
+              <a:gd name="adj1" fmla="val 22076"/>
+              <a:gd name="adj2" fmla="val 101033"/>
+              <a:gd name="adj3" fmla="val 10013"/>
+              <a:gd name="adj4" fmla="val 107886"/>
+              <a:gd name="adj5" fmla="val -16213"/>
+              <a:gd name="adj6" fmla="val 104012"/>
             </a:avLst>
           </a:prstGeom>
           <a:noFill/>

</xml_diff>

<commit_message>
-notes: create new note, and delete
</commit_message>
<xml_diff>
--- a/ExaminerB/.appCatalog/ExaminerB notes 1404.pptx
+++ b/ExaminerB/.appCatalog/ExaminerB notes 1404.pptx
@@ -278,7 +278,7 @@
             </a:pPr>
             <a:fld id="{BCC18F51-09EC-435C-A3BA-64A766E099C0}" type="datetimeFigureOut">
               <a:rPr lang="fa-IR"/>
-              <a:t>16/07/1447</a:t>
+              <a:t>17/07/1447</a:t>
             </a:fld>
             <a:endParaRPr/>
           </a:p>
@@ -457,7 +457,7 @@
             </a:pPr>
             <a:fld id="{BCC18F51-09EC-435C-A3BA-64A766E099C0}" type="datetimeFigureOut">
               <a:rPr lang="fa-IR"/>
-              <a:t>16/07/1447</a:t>
+              <a:t>17/07/1447</a:t>
             </a:fld>
             <a:endParaRPr/>
           </a:p>
@@ -646,7 +646,7 @@
             </a:pPr>
             <a:fld id="{BCC18F51-09EC-435C-A3BA-64A766E099C0}" type="datetimeFigureOut">
               <a:rPr lang="fa-IR"/>
-              <a:t>16/07/1447</a:t>
+              <a:t>17/07/1447</a:t>
             </a:fld>
             <a:endParaRPr/>
           </a:p>
@@ -825,7 +825,7 @@
             </a:pPr>
             <a:fld id="{BCC18F51-09EC-435C-A3BA-64A766E099C0}" type="datetimeFigureOut">
               <a:rPr lang="fa-IR"/>
-              <a:t>16/07/1447</a:t>
+              <a:t>17/07/1447</a:t>
             </a:fld>
             <a:endParaRPr/>
           </a:p>
@@ -1077,7 +1077,7 @@
             </a:pPr>
             <a:fld id="{BCC18F51-09EC-435C-A3BA-64A766E099C0}" type="datetimeFigureOut">
               <a:rPr lang="fa-IR"/>
-              <a:t>16/07/1447</a:t>
+              <a:t>17/07/1447</a:t>
             </a:fld>
             <a:endParaRPr/>
           </a:p>
@@ -1322,7 +1322,7 @@
             </a:pPr>
             <a:fld id="{BCC18F51-09EC-435C-A3BA-64A766E099C0}" type="datetimeFigureOut">
               <a:rPr lang="fa-IR"/>
-              <a:t>16/07/1447</a:t>
+              <a:t>17/07/1447</a:t>
             </a:fld>
             <a:endParaRPr/>
           </a:p>
@@ -1704,7 +1704,7 @@
             </a:pPr>
             <a:fld id="{BCC18F51-09EC-435C-A3BA-64A766E099C0}" type="datetimeFigureOut">
               <a:rPr lang="fa-IR"/>
-              <a:t>16/07/1447</a:t>
+              <a:t>17/07/1447</a:t>
             </a:fld>
             <a:endParaRPr/>
           </a:p>
@@ -1827,7 +1827,7 @@
             </a:pPr>
             <a:fld id="{BCC18F51-09EC-435C-A3BA-64A766E099C0}" type="datetimeFigureOut">
               <a:rPr lang="fa-IR"/>
-              <a:t>16/07/1447</a:t>
+              <a:t>17/07/1447</a:t>
             </a:fld>
             <a:endParaRPr/>
           </a:p>
@@ -1926,7 +1926,7 @@
             </a:pPr>
             <a:fld id="{BCC18F51-09EC-435C-A3BA-64A766E099C0}" type="datetimeFigureOut">
               <a:rPr lang="fa-IR"/>
-              <a:t>16/07/1447</a:t>
+              <a:t>17/07/1447</a:t>
             </a:fld>
             <a:endParaRPr/>
           </a:p>
@@ -2213,7 +2213,7 @@
             </a:pPr>
             <a:fld id="{BCC18F51-09EC-435C-A3BA-64A766E099C0}" type="datetimeFigureOut">
               <a:rPr lang="fa-IR"/>
-              <a:t>16/07/1447</a:t>
+              <a:t>17/07/1447</a:t>
             </a:fld>
             <a:endParaRPr/>
           </a:p>
@@ -2477,7 +2477,7 @@
             </a:pPr>
             <a:fld id="{BCC18F51-09EC-435C-A3BA-64A766E099C0}" type="datetimeFigureOut">
               <a:rPr lang="fa-IR"/>
-              <a:t>16/07/1447</a:t>
+              <a:t>17/07/1447</a:t>
             </a:fld>
             <a:endParaRPr/>
           </a:p>
@@ -2699,7 +2699,7 @@
             </a:pPr>
             <a:fld id="{BCC18F51-09EC-435C-A3BA-64A766E099C0}" type="datetimeFigureOut">
               <a:rPr lang="fa-IR"/>
-              <a:t>16/07/1447</a:t>
+              <a:t>17/07/1447</a:t>
             </a:fld>
             <a:endParaRPr/>
           </a:p>
@@ -4156,7 +4156,7 @@
                 <a:ea typeface="Calibri" panose="020F0502020204030204" pitchFamily="34" charset="0"/>
                 <a:cs typeface="Calibri Light" panose="020F0302020204030204" pitchFamily="34" charset="0"/>
               </a:rPr>
-              <a:t>1 </a:t>
+              <a:t>1:</a:t>
             </a:r>
             <a:r>
               <a:rPr lang="en-US" sz="800" kern="100">
@@ -4183,7 +4183,7 @@
                 <a:ea typeface="Calibri" panose="020F0502020204030204" pitchFamily="34" charset="0"/>
                 <a:cs typeface="Calibri Light" panose="020F0302020204030204" pitchFamily="34" charset="0"/>
               </a:rPr>
-              <a:t>2 isAnswer</a:t>
+              <a:t>2:isAns</a:t>
             </a:r>
           </a:p>
         </p:txBody>
@@ -4573,7 +4573,7 @@
                 <a:latin typeface="Segoe UI" panose="020B0502040204020203" pitchFamily="34" charset="0"/>
                 <a:cs typeface="Segoe UI" panose="020B0502040204020203" pitchFamily="34" charset="0"/>
               </a:rPr>
-              <a:t>1  active</a:t>
+              <a:t>1:act 2:pass</a:t>
             </a:r>
           </a:p>
           <a:p>
@@ -4588,7 +4588,7 @@
                 <a:latin typeface="Segoe UI" panose="020B0502040204020203" pitchFamily="34" charset="0"/>
                 <a:cs typeface="Segoe UI" panose="020B0502040204020203" pitchFamily="34" charset="0"/>
               </a:rPr>
-              <a:t>2  pass</a:t>
+              <a:t>4,8,16,32: x </a:t>
             </a:r>
           </a:p>
           <a:p>
@@ -4603,22 +4603,7 @@
                 <a:latin typeface="Segoe UI" panose="020B0502040204020203" pitchFamily="34" charset="0"/>
                 <a:cs typeface="Segoe UI" panose="020B0502040204020203" pitchFamily="34" charset="0"/>
               </a:rPr>
-              <a:t>4, 8, 16, 32 - </a:t>
-            </a:r>
-          </a:p>
-          <a:p>
-            <a:pPr marL="177800" rtl="0">
-              <a:defRPr/>
-            </a:pPr>
-            <a:r>
-              <a:rPr lang="en-US" sz="800">
-                <a:solidFill>
-                  <a:srgbClr val="C00000"/>
-                </a:solidFill>
-                <a:latin typeface="Segoe UI" panose="020B0502040204020203" pitchFamily="34" charset="0"/>
-                <a:cs typeface="Segoe UI" panose="020B0502040204020203" pitchFamily="34" charset="0"/>
-              </a:rPr>
-              <a:t>64 IsSelected</a:t>
+              <a:t>64:selected</a:t>
             </a:r>
           </a:p>
         </p:txBody>
@@ -5129,7 +5114,7 @@
                 <a:latin typeface="Segoe UI" panose="020B0502040204020203" pitchFamily="34" charset="0"/>
                 <a:cs typeface="Segoe UI" panose="020B0502040204020203" pitchFamily="34" charset="0"/>
               </a:rPr>
-              <a:t>1 active</a:t>
+              <a:t>1:act</a:t>
             </a:r>
           </a:p>
         </p:txBody>
@@ -5533,7 +5518,7 @@
                 <a:latin typeface="Segoe UI" panose="020B0502040204020203" pitchFamily="34" charset="0"/>
                 <a:cs typeface="Segoe UI" panose="020B0502040204020203" pitchFamily="34" charset="0"/>
               </a:rPr>
-              <a:t>1 active, 2 training</a:t>
+              <a:t>1:act 2:training</a:t>
             </a:r>
           </a:p>
         </p:txBody>
@@ -5689,7 +5674,7 @@
         </p:nvSpPr>
         <p:spPr bwMode="auto">
           <a:xfrm>
-            <a:off x="4019229" y="1268760"/>
+            <a:off x="4019229" y="1317752"/>
             <a:ext cx="1887185" cy="1542865"/>
           </a:xfrm>
           <a:prstGeom prst="roundRect">
@@ -6078,7 +6063,7 @@
                 <a:latin typeface="Segoe UI" panose="020B0502040204020203" pitchFamily="34" charset="0"/>
                 <a:cs typeface="Segoe UI" panose="020B0502040204020203" pitchFamily="34" charset="0"/>
               </a:rPr>
-              <a:t>{active, Strt, Fin, review}</a:t>
+              <a:t>1:act 2:st, 4:fin, 8:rev</a:t>
             </a:r>
           </a:p>
           <a:p>
@@ -6122,7 +6107,7 @@
         </p:nvSpPr>
         <p:spPr bwMode="auto">
           <a:xfrm>
-            <a:off x="5575436" y="1196752"/>
+            <a:off x="5575436" y="1245744"/>
             <a:ext cx="1449104" cy="1751208"/>
           </a:xfrm>
           <a:prstGeom prst="roundRect">
@@ -6320,44 +6305,34 @@
                   <a:srgbClr val="C00000"/>
                 </a:solidFill>
                 <a:effectLst/>
-                <a:latin typeface="Consolas" panose="020B0609020204030204" pitchFamily="49" charset="0"/>
+                <a:latin typeface="Segoe UI" panose="020B0502040204020203" pitchFamily="34" charset="0"/>
                 <a:ea typeface="Calibri" panose="020F0502020204030204" pitchFamily="34" charset="0"/>
-                <a:cs typeface="Calibri Light" panose="020F0302020204030204" pitchFamily="34" charset="0"/>
-              </a:rPr>
-              <a:t>1 active</a:t>
-            </a:r>
-          </a:p>
-          <a:p>
-            <a:pPr rtl="0">
-              <a:buNone/>
-            </a:pPr>
+                <a:cs typeface="Segoe UI" panose="020B0502040204020203" pitchFamily="34" charset="0"/>
+              </a:rPr>
+              <a:t>1:act </a:t>
+            </a:r>
             <a:r>
               <a:rPr lang="en-US" sz="800" kern="100">
                 <a:solidFill>
                   <a:srgbClr val="C00000"/>
                 </a:solidFill>
-                <a:latin typeface="Consolas" panose="020B0609020204030204" pitchFamily="49" charset="0"/>
+                <a:latin typeface="Segoe UI" panose="020B0502040204020203" pitchFamily="34" charset="0"/>
                 <a:ea typeface="Calibri" panose="020F0502020204030204" pitchFamily="34" charset="0"/>
-                <a:cs typeface="Calibri Light" panose="020F0302020204030204" pitchFamily="34" charset="0"/>
-              </a:rPr>
-              <a:t>2 retry</a:t>
-            </a:r>
-          </a:p>
-          <a:p>
-            <a:pPr rtl="0">
-              <a:buNone/>
-            </a:pPr>
+                <a:cs typeface="Segoe UI" panose="020B0502040204020203" pitchFamily="34" charset="0"/>
+              </a:rPr>
+              <a:t>2:retry </a:t>
+            </a:r>
             <a:r>
               <a:rPr lang="en-US" sz="800" kern="100">
                 <a:solidFill>
                   <a:srgbClr val="C00000"/>
                 </a:solidFill>
                 <a:effectLst/>
-                <a:latin typeface="Consolas" panose="020B0609020204030204" pitchFamily="49" charset="0"/>
+                <a:latin typeface="Segoe UI" panose="020B0502040204020203" pitchFamily="34" charset="0"/>
                 <a:ea typeface="Calibri" panose="020F0502020204030204" pitchFamily="34" charset="0"/>
-                <a:cs typeface="Calibri Light" panose="020F0302020204030204" pitchFamily="34" charset="0"/>
-              </a:rPr>
-              <a:t>4 review</a:t>
+                <a:cs typeface="Segoe UI" panose="020B0502040204020203" pitchFamily="34" charset="0"/>
+              </a:rPr>
+              <a:t>4rev</a:t>
             </a:r>
           </a:p>
         </p:txBody>
@@ -6562,7 +6537,7 @@
         </p:nvSpPr>
         <p:spPr bwMode="auto">
           <a:xfrm>
-            <a:off x="6892673" y="1349238"/>
+            <a:off x="6892673" y="1398230"/>
             <a:ext cx="2155587" cy="1314600"/>
           </a:xfrm>
           <a:prstGeom prst="roundRect">

</xml_diff>

<commit_message>
-Edit / Rename Group in T_Student
</commit_message>
<xml_diff>
--- a/ExaminerB/.appCatalog/ExaminerB notes 1404.pptx
+++ b/ExaminerB/.appCatalog/ExaminerB notes 1404.pptx
@@ -5,10 +5,11 @@
     <p:sldMasterId id="2147483648" r:id="rId1"/>
   </p:sldMasterIdLst>
   <p:notesMasterIdLst>
-    <p:notesMasterId r:id="rId3"/>
+    <p:notesMasterId r:id="rId4"/>
   </p:notesMasterIdLst>
   <p:sldIdLst>
     <p:sldId id="262" r:id="rId2"/>
+    <p:sldId id="263" r:id="rId3"/>
   </p:sldIdLst>
   <p:sldSz cx="9906000" cy="6858000" type="A4"/>
   <p:notesSz cx="6858000" cy="9144000"/>
@@ -278,7 +279,7 @@
             </a:pPr>
             <a:fld id="{BCC18F51-09EC-435C-A3BA-64A766E099C0}" type="datetimeFigureOut">
               <a:rPr lang="fa-IR"/>
-              <a:t>19/07/1447</a:t>
+              <a:t>25/07/1447</a:t>
             </a:fld>
             <a:endParaRPr/>
           </a:p>
@@ -457,7 +458,7 @@
             </a:pPr>
             <a:fld id="{BCC18F51-09EC-435C-A3BA-64A766E099C0}" type="datetimeFigureOut">
               <a:rPr lang="fa-IR"/>
-              <a:t>19/07/1447</a:t>
+              <a:t>25/07/1447</a:t>
             </a:fld>
             <a:endParaRPr/>
           </a:p>
@@ -646,7 +647,7 @@
             </a:pPr>
             <a:fld id="{BCC18F51-09EC-435C-A3BA-64A766E099C0}" type="datetimeFigureOut">
               <a:rPr lang="fa-IR"/>
-              <a:t>19/07/1447</a:t>
+              <a:t>25/07/1447</a:t>
             </a:fld>
             <a:endParaRPr/>
           </a:p>
@@ -825,7 +826,7 @@
             </a:pPr>
             <a:fld id="{BCC18F51-09EC-435C-A3BA-64A766E099C0}" type="datetimeFigureOut">
               <a:rPr lang="fa-IR"/>
-              <a:t>19/07/1447</a:t>
+              <a:t>25/07/1447</a:t>
             </a:fld>
             <a:endParaRPr/>
           </a:p>
@@ -1077,7 +1078,7 @@
             </a:pPr>
             <a:fld id="{BCC18F51-09EC-435C-A3BA-64A766E099C0}" type="datetimeFigureOut">
               <a:rPr lang="fa-IR"/>
-              <a:t>19/07/1447</a:t>
+              <a:t>25/07/1447</a:t>
             </a:fld>
             <a:endParaRPr/>
           </a:p>
@@ -1322,7 +1323,7 @@
             </a:pPr>
             <a:fld id="{BCC18F51-09EC-435C-A3BA-64A766E099C0}" type="datetimeFigureOut">
               <a:rPr lang="fa-IR"/>
-              <a:t>19/07/1447</a:t>
+              <a:t>25/07/1447</a:t>
             </a:fld>
             <a:endParaRPr/>
           </a:p>
@@ -1704,7 +1705,7 @@
             </a:pPr>
             <a:fld id="{BCC18F51-09EC-435C-A3BA-64A766E099C0}" type="datetimeFigureOut">
               <a:rPr lang="fa-IR"/>
-              <a:t>19/07/1447</a:t>
+              <a:t>25/07/1447</a:t>
             </a:fld>
             <a:endParaRPr/>
           </a:p>
@@ -1827,7 +1828,7 @@
             </a:pPr>
             <a:fld id="{BCC18F51-09EC-435C-A3BA-64A766E099C0}" type="datetimeFigureOut">
               <a:rPr lang="fa-IR"/>
-              <a:t>19/07/1447</a:t>
+              <a:t>25/07/1447</a:t>
             </a:fld>
             <a:endParaRPr/>
           </a:p>
@@ -1926,7 +1927,7 @@
             </a:pPr>
             <a:fld id="{BCC18F51-09EC-435C-A3BA-64A766E099C0}" type="datetimeFigureOut">
               <a:rPr lang="fa-IR"/>
-              <a:t>19/07/1447</a:t>
+              <a:t>25/07/1447</a:t>
             </a:fld>
             <a:endParaRPr/>
           </a:p>
@@ -2213,7 +2214,7 @@
             </a:pPr>
             <a:fld id="{BCC18F51-09EC-435C-A3BA-64A766E099C0}" type="datetimeFigureOut">
               <a:rPr lang="fa-IR"/>
-              <a:t>19/07/1447</a:t>
+              <a:t>25/07/1447</a:t>
             </a:fld>
             <a:endParaRPr/>
           </a:p>
@@ -2477,7 +2478,7 @@
             </a:pPr>
             <a:fld id="{BCC18F51-09EC-435C-A3BA-64A766E099C0}" type="datetimeFigureOut">
               <a:rPr lang="fa-IR"/>
-              <a:t>19/07/1447</a:t>
+              <a:t>25/07/1447</a:t>
             </a:fld>
             <a:endParaRPr/>
           </a:p>
@@ -2699,7 +2700,7 @@
             </a:pPr>
             <a:fld id="{BCC18F51-09EC-435C-A3BA-64A766E099C0}" type="datetimeFigureOut">
               <a:rPr lang="fa-IR"/>
-              <a:t>19/07/1447</a:t>
+              <a:t>25/07/1447</a:t>
             </a:fld>
             <a:endParaRPr/>
           </a:p>
@@ -7764,6 +7765,317 @@
     <p:extLst>
       <p:ext uri="{BB962C8B-B14F-4D97-AF65-F5344CB8AC3E}">
         <p14:creationId xmlns:p14="http://schemas.microsoft.com/office/powerpoint/2010/main" val="4215408994"/>
+      </p:ext>
+    </p:extLst>
+  </p:cSld>
+  <p:clrMapOvr>
+    <a:masterClrMapping/>
+  </p:clrMapOvr>
+</p:sld>
+</file>
+
+<file path=ppt/slides/slide2.xml><?xml version="1.0" encoding="utf-8"?>
+<p:sld xmlns:a="http://schemas.openxmlformats.org/drawingml/2006/main" xmlns:r="http://schemas.openxmlformats.org/officeDocument/2006/relationships" xmlns:p="http://schemas.openxmlformats.org/presentationml/2006/main">
+  <p:cSld>
+    <p:spTree>
+      <p:nvGrpSpPr>
+        <p:cNvPr id="1" name=""/>
+        <p:cNvGrpSpPr/>
+        <p:nvPr/>
+      </p:nvGrpSpPr>
+      <p:grpSpPr>
+        <a:xfrm>
+          <a:off x="0" y="0"/>
+          <a:ext cx="0" cy="0"/>
+          <a:chOff x="0" y="0"/>
+          <a:chExt cx="0" cy="0"/>
+        </a:xfrm>
+      </p:grpSpPr>
+      <p:grpSp>
+        <p:nvGrpSpPr>
+          <p:cNvPr id="4" name="Group 3">
+            <a:extLst>
+              <a:ext uri="{FF2B5EF4-FFF2-40B4-BE49-F238E27FC236}">
+                <a16:creationId xmlns:a16="http://schemas.microsoft.com/office/drawing/2014/main" id="{4EDADC7E-47AD-3A6B-6A3D-B3285217977D}"/>
+              </a:ext>
+            </a:extLst>
+          </p:cNvPr>
+          <p:cNvGrpSpPr/>
+          <p:nvPr/>
+        </p:nvGrpSpPr>
+        <p:grpSpPr>
+          <a:xfrm>
+            <a:off x="3279777" y="2142360"/>
+            <a:ext cx="4415037" cy="1480427"/>
+            <a:chOff x="6908802" y="4733160"/>
+            <a:chExt cx="4415037" cy="1480427"/>
+          </a:xfrm>
+        </p:grpSpPr>
+        <p:grpSp>
+          <p:nvGrpSpPr>
+            <p:cNvPr id="5" name="Group 4">
+              <a:extLst>
+                <a:ext uri="{FF2B5EF4-FFF2-40B4-BE49-F238E27FC236}">
+                  <a16:creationId xmlns:a16="http://schemas.microsoft.com/office/drawing/2014/main" id="{5626278F-1179-0432-7228-58F0BDA8ECB3}"/>
+                </a:ext>
+              </a:extLst>
+            </p:cNvPr>
+            <p:cNvGrpSpPr/>
+            <p:nvPr/>
+          </p:nvGrpSpPr>
+          <p:grpSpPr>
+            <a:xfrm>
+              <a:off x="6908802" y="4733160"/>
+              <a:ext cx="2481461" cy="1480427"/>
+              <a:chOff x="784042" y="2078841"/>
+              <a:chExt cx="2353296" cy="1411014"/>
+            </a:xfrm>
+            <a:solidFill>
+              <a:schemeClr val="accent2">
+                <a:alpha val="35000"/>
+              </a:schemeClr>
+            </a:solidFill>
+          </p:grpSpPr>
+          <p:sp>
+            <p:nvSpPr>
+              <p:cNvPr id="9" name="Isosceles Triangle 8">
+                <a:extLst>
+                  <a:ext uri="{FF2B5EF4-FFF2-40B4-BE49-F238E27FC236}">
+                    <a16:creationId xmlns:a16="http://schemas.microsoft.com/office/drawing/2014/main" id="{31E906CE-139E-B497-2EF3-82F4DF4ABFF5}"/>
+                  </a:ext>
+                </a:extLst>
+              </p:cNvPr>
+              <p:cNvSpPr/>
+              <p:nvPr/>
+            </p:nvSpPr>
+            <p:spPr>
+              <a:xfrm>
+                <a:off x="1024759" y="2078841"/>
+                <a:ext cx="2112579" cy="1411014"/>
+              </a:xfrm>
+              <a:prstGeom prst="triangle">
+                <a:avLst>
+                  <a:gd name="adj" fmla="val 88060"/>
+                </a:avLst>
+              </a:prstGeom>
+              <a:grpFill/>
+              <a:ln>
+                <a:noFill/>
+              </a:ln>
+            </p:spPr>
+            <p:style>
+              <a:lnRef idx="2">
+                <a:schemeClr val="accent1">
+                  <a:shade val="15000"/>
+                </a:schemeClr>
+              </a:lnRef>
+              <a:fillRef idx="1">
+                <a:schemeClr val="accent1"/>
+              </a:fillRef>
+              <a:effectRef idx="0">
+                <a:schemeClr val="accent1"/>
+              </a:effectRef>
+              <a:fontRef idx="minor">
+                <a:schemeClr val="lt1"/>
+              </a:fontRef>
+            </p:style>
+            <p:txBody>
+              <a:bodyPr rtlCol="1" anchor="ctr"/>
+              <a:lstStyle/>
+              <a:p>
+                <a:pPr algn="ctr"/>
+                <a:endParaRPr lang="fa-IR"/>
+              </a:p>
+            </p:txBody>
+          </p:sp>
+          <p:sp>
+            <p:nvSpPr>
+              <p:cNvPr id="10" name="Isosceles Triangle 9">
+                <a:extLst>
+                  <a:ext uri="{FF2B5EF4-FFF2-40B4-BE49-F238E27FC236}">
+                    <a16:creationId xmlns:a16="http://schemas.microsoft.com/office/drawing/2014/main" id="{4D0869FF-5BFA-DAEA-F8DF-2D865DE17548}"/>
+                  </a:ext>
+                </a:extLst>
+              </p:cNvPr>
+              <p:cNvSpPr/>
+              <p:nvPr/>
+            </p:nvSpPr>
+            <p:spPr>
+              <a:xfrm rot="10800000" flipV="1">
+                <a:off x="784042" y="2078841"/>
+                <a:ext cx="2112579" cy="1411014"/>
+              </a:xfrm>
+              <a:prstGeom prst="triangle">
+                <a:avLst>
+                  <a:gd name="adj" fmla="val 88060"/>
+                </a:avLst>
+              </a:prstGeom>
+              <a:grpFill/>
+              <a:ln>
+                <a:noFill/>
+              </a:ln>
+            </p:spPr>
+            <p:style>
+              <a:lnRef idx="2">
+                <a:schemeClr val="accent1">
+                  <a:shade val="15000"/>
+                </a:schemeClr>
+              </a:lnRef>
+              <a:fillRef idx="1">
+                <a:schemeClr val="accent1"/>
+              </a:fillRef>
+              <a:effectRef idx="0">
+                <a:schemeClr val="accent1"/>
+              </a:effectRef>
+              <a:fontRef idx="minor">
+                <a:schemeClr val="lt1"/>
+              </a:fontRef>
+            </p:style>
+            <p:txBody>
+              <a:bodyPr rtlCol="1" anchor="ctr"/>
+              <a:lstStyle/>
+              <a:p>
+                <a:pPr algn="ctr"/>
+                <a:endParaRPr lang="fa-IR"/>
+              </a:p>
+            </p:txBody>
+          </p:sp>
+        </p:grpSp>
+        <p:grpSp>
+          <p:nvGrpSpPr>
+            <p:cNvPr id="6" name="Group 5">
+              <a:extLst>
+                <a:ext uri="{FF2B5EF4-FFF2-40B4-BE49-F238E27FC236}">
+                  <a16:creationId xmlns:a16="http://schemas.microsoft.com/office/drawing/2014/main" id="{1156E019-AF22-6E08-6184-6C0F45475E77}"/>
+                </a:ext>
+              </a:extLst>
+            </p:cNvPr>
+            <p:cNvGrpSpPr/>
+            <p:nvPr/>
+          </p:nvGrpSpPr>
+          <p:grpSpPr>
+            <a:xfrm>
+              <a:off x="8842378" y="4741718"/>
+              <a:ext cx="2481461" cy="1471869"/>
+              <a:chOff x="3378056" y="2017986"/>
+              <a:chExt cx="2481461" cy="1471869"/>
+            </a:xfrm>
+            <a:solidFill>
+              <a:schemeClr val="accent2">
+                <a:alpha val="35000"/>
+              </a:schemeClr>
+            </a:solidFill>
+          </p:grpSpPr>
+          <p:sp>
+            <p:nvSpPr>
+              <p:cNvPr id="7" name="Isosceles Triangle 6">
+                <a:extLst>
+                  <a:ext uri="{FF2B5EF4-FFF2-40B4-BE49-F238E27FC236}">
+                    <a16:creationId xmlns:a16="http://schemas.microsoft.com/office/drawing/2014/main" id="{76327B16-FB73-BEAC-03D9-EAF7801E654C}"/>
+                  </a:ext>
+                </a:extLst>
+              </p:cNvPr>
+              <p:cNvSpPr/>
+              <p:nvPr/>
+            </p:nvSpPr>
+            <p:spPr>
+              <a:xfrm rot="10800000">
+                <a:off x="3746938" y="2017986"/>
+                <a:ext cx="2112579" cy="1411014"/>
+              </a:xfrm>
+              <a:prstGeom prst="triangle">
+                <a:avLst>
+                  <a:gd name="adj" fmla="val 88060"/>
+                </a:avLst>
+              </a:prstGeom>
+              <a:grpFill/>
+              <a:ln>
+                <a:noFill/>
+              </a:ln>
+            </p:spPr>
+            <p:style>
+              <a:lnRef idx="2">
+                <a:schemeClr val="accent1">
+                  <a:shade val="15000"/>
+                </a:schemeClr>
+              </a:lnRef>
+              <a:fillRef idx="1">
+                <a:schemeClr val="accent1"/>
+              </a:fillRef>
+              <a:effectRef idx="0">
+                <a:schemeClr val="accent1"/>
+              </a:effectRef>
+              <a:fontRef idx="minor">
+                <a:schemeClr val="lt1"/>
+              </a:fontRef>
+            </p:style>
+            <p:txBody>
+              <a:bodyPr rtlCol="1" anchor="ctr"/>
+              <a:lstStyle/>
+              <a:p>
+                <a:pPr algn="ctr"/>
+                <a:endParaRPr lang="fa-IR"/>
+              </a:p>
+            </p:txBody>
+          </p:sp>
+          <p:sp>
+            <p:nvSpPr>
+              <p:cNvPr id="8" name="Isosceles Triangle 7">
+                <a:extLst>
+                  <a:ext uri="{FF2B5EF4-FFF2-40B4-BE49-F238E27FC236}">
+                    <a16:creationId xmlns:a16="http://schemas.microsoft.com/office/drawing/2014/main" id="{D3D7D3E8-5114-8443-D0D8-54261F8BF29A}"/>
+                  </a:ext>
+                </a:extLst>
+              </p:cNvPr>
+              <p:cNvSpPr/>
+              <p:nvPr/>
+            </p:nvSpPr>
+            <p:spPr>
+              <a:xfrm>
+                <a:off x="3378056" y="2026544"/>
+                <a:ext cx="2112579" cy="1463311"/>
+              </a:xfrm>
+              <a:prstGeom prst="triangle">
+                <a:avLst>
+                  <a:gd name="adj" fmla="val 88060"/>
+                </a:avLst>
+              </a:prstGeom>
+              <a:grpFill/>
+              <a:ln>
+                <a:noFill/>
+              </a:ln>
+            </p:spPr>
+            <p:style>
+              <a:lnRef idx="2">
+                <a:schemeClr val="accent1">
+                  <a:shade val="15000"/>
+                </a:schemeClr>
+              </a:lnRef>
+              <a:fillRef idx="1">
+                <a:schemeClr val="accent1"/>
+              </a:fillRef>
+              <a:effectRef idx="0">
+                <a:schemeClr val="accent1"/>
+              </a:effectRef>
+              <a:fontRef idx="minor">
+                <a:schemeClr val="lt1"/>
+              </a:fontRef>
+            </p:style>
+            <p:txBody>
+              <a:bodyPr rtlCol="1" anchor="ctr"/>
+              <a:lstStyle/>
+              <a:p>
+                <a:pPr algn="ctr"/>
+                <a:endParaRPr lang="fa-IR"/>
+              </a:p>
+            </p:txBody>
+          </p:sp>
+        </p:grpSp>
+      </p:grpSp>
+    </p:spTree>
+    <p:extLst>
+      <p:ext uri="{BB962C8B-B14F-4D97-AF65-F5344CB8AC3E}">
+        <p14:creationId xmlns:p14="http://schemas.microsoft.com/office/powerpoint/2010/main" val="3945135004"/>
       </p:ext>
     </p:extLst>
   </p:cSld>

</xml_diff>

<commit_message>
- (T) can edit Project (Notebook) Subproject (Section)
</commit_message>
<xml_diff>
--- a/ExaminerB/.appCatalog/ExaminerB notes 1404.pptx
+++ b/ExaminerB/.appCatalog/ExaminerB notes 1404.pptx
@@ -279,7 +279,7 @@
             </a:pPr>
             <a:fld id="{BCC18F51-09EC-435C-A3BA-64A766E099C0}" type="datetimeFigureOut">
               <a:rPr lang="fa-IR"/>
-              <a:t>28/07/1447</a:t>
+              <a:t>05/08/1447</a:t>
             </a:fld>
             <a:endParaRPr/>
           </a:p>
@@ -458,7 +458,7 @@
             </a:pPr>
             <a:fld id="{BCC18F51-09EC-435C-A3BA-64A766E099C0}" type="datetimeFigureOut">
               <a:rPr lang="fa-IR"/>
-              <a:t>28/07/1447</a:t>
+              <a:t>05/08/1447</a:t>
             </a:fld>
             <a:endParaRPr/>
           </a:p>
@@ -647,7 +647,7 @@
             </a:pPr>
             <a:fld id="{BCC18F51-09EC-435C-A3BA-64A766E099C0}" type="datetimeFigureOut">
               <a:rPr lang="fa-IR"/>
-              <a:t>28/07/1447</a:t>
+              <a:t>05/08/1447</a:t>
             </a:fld>
             <a:endParaRPr/>
           </a:p>
@@ -826,7 +826,7 @@
             </a:pPr>
             <a:fld id="{BCC18F51-09EC-435C-A3BA-64A766E099C0}" type="datetimeFigureOut">
               <a:rPr lang="fa-IR"/>
-              <a:t>28/07/1447</a:t>
+              <a:t>05/08/1447</a:t>
             </a:fld>
             <a:endParaRPr/>
           </a:p>
@@ -1078,7 +1078,7 @@
             </a:pPr>
             <a:fld id="{BCC18F51-09EC-435C-A3BA-64A766E099C0}" type="datetimeFigureOut">
               <a:rPr lang="fa-IR"/>
-              <a:t>28/07/1447</a:t>
+              <a:t>05/08/1447</a:t>
             </a:fld>
             <a:endParaRPr/>
           </a:p>
@@ -1323,7 +1323,7 @@
             </a:pPr>
             <a:fld id="{BCC18F51-09EC-435C-A3BA-64A766E099C0}" type="datetimeFigureOut">
               <a:rPr lang="fa-IR"/>
-              <a:t>28/07/1447</a:t>
+              <a:t>05/08/1447</a:t>
             </a:fld>
             <a:endParaRPr/>
           </a:p>
@@ -1705,7 +1705,7 @@
             </a:pPr>
             <a:fld id="{BCC18F51-09EC-435C-A3BA-64A766E099C0}" type="datetimeFigureOut">
               <a:rPr lang="fa-IR"/>
-              <a:t>28/07/1447</a:t>
+              <a:t>05/08/1447</a:t>
             </a:fld>
             <a:endParaRPr/>
           </a:p>
@@ -1828,7 +1828,7 @@
             </a:pPr>
             <a:fld id="{BCC18F51-09EC-435C-A3BA-64A766E099C0}" type="datetimeFigureOut">
               <a:rPr lang="fa-IR"/>
-              <a:t>28/07/1447</a:t>
+              <a:t>05/08/1447</a:t>
             </a:fld>
             <a:endParaRPr/>
           </a:p>
@@ -1927,7 +1927,7 @@
             </a:pPr>
             <a:fld id="{BCC18F51-09EC-435C-A3BA-64A766E099C0}" type="datetimeFigureOut">
               <a:rPr lang="fa-IR"/>
-              <a:t>28/07/1447</a:t>
+              <a:t>05/08/1447</a:t>
             </a:fld>
             <a:endParaRPr/>
           </a:p>
@@ -2214,7 +2214,7 @@
             </a:pPr>
             <a:fld id="{BCC18F51-09EC-435C-A3BA-64A766E099C0}" type="datetimeFigureOut">
               <a:rPr lang="fa-IR"/>
-              <a:t>28/07/1447</a:t>
+              <a:t>05/08/1447</a:t>
             </a:fld>
             <a:endParaRPr/>
           </a:p>
@@ -2478,7 +2478,7 @@
             </a:pPr>
             <a:fld id="{BCC18F51-09EC-435C-A3BA-64A766E099C0}" type="datetimeFigureOut">
               <a:rPr lang="fa-IR"/>
-              <a:t>28/07/1447</a:t>
+              <a:t>05/08/1447</a:t>
             </a:fld>
             <a:endParaRPr/>
           </a:p>
@@ -2700,7 +2700,7 @@
             </a:pPr>
             <a:fld id="{BCC18F51-09EC-435C-A3BA-64A766E099C0}" type="datetimeFigureOut">
               <a:rPr lang="fa-IR"/>
-              <a:t>28/07/1447</a:t>
+              <a:t>05/08/1447</a:t>
             </a:fld>
             <a:endParaRPr/>
           </a:p>
@@ -7287,7 +7287,7 @@
             <a:pPr rtl="0"/>
             <a:r>
               <a:rPr lang="en-US" sz="800"/>
-              <a:t>SubProjectName</a:t>
+              <a:t>SubprojectName</a:t>
             </a:r>
           </a:p>
           <a:p>
@@ -7975,10 +7975,10 @@
       </p:grpSpPr>
       <p:grpSp>
         <p:nvGrpSpPr>
-          <p:cNvPr id="4" name="Group 3">
+          <p:cNvPr id="37" name="Group 36">
             <a:extLst>
               <a:ext uri="{FF2B5EF4-FFF2-40B4-BE49-F238E27FC236}">
-                <a16:creationId xmlns:a16="http://schemas.microsoft.com/office/drawing/2014/main" id="{4EDADC7E-47AD-3A6B-6A3D-B3285217977D}"/>
+                <a16:creationId xmlns:a16="http://schemas.microsoft.com/office/drawing/2014/main" id="{4E031B59-FDCF-00D2-0FB7-7B2750CD1ADA}"/>
               </a:ext>
             </a:extLst>
           </p:cNvPr>
@@ -7987,272 +7987,1475 @@
         </p:nvGrpSpPr>
         <p:grpSpPr>
           <a:xfrm>
-            <a:off x="3279777" y="2142360"/>
-            <a:ext cx="4415037" cy="1480427"/>
-            <a:chOff x="6908802" y="4733160"/>
-            <a:chExt cx="4415037" cy="1480427"/>
+            <a:off x="1589356" y="1013892"/>
+            <a:ext cx="6727288" cy="1839044"/>
+            <a:chOff x="1193312" y="2814092"/>
+            <a:chExt cx="6727288" cy="1839044"/>
           </a:xfrm>
         </p:grpSpPr>
-        <p:grpSp>
-          <p:nvGrpSpPr>
-            <p:cNvPr id="5" name="Group 4">
+        <p:sp>
+          <p:nvSpPr>
+            <p:cNvPr id="36" name="Rectangle: Rounded Corners 35">
               <a:extLst>
                 <a:ext uri="{FF2B5EF4-FFF2-40B4-BE49-F238E27FC236}">
-                  <a16:creationId xmlns:a16="http://schemas.microsoft.com/office/drawing/2014/main" id="{5626278F-1179-0432-7228-58F0BDA8ECB3}"/>
+                  <a16:creationId xmlns:a16="http://schemas.microsoft.com/office/drawing/2014/main" id="{3444AEB6-9BD6-AB72-951A-18261436B578}"/>
                 </a:ext>
               </a:extLst>
             </p:cNvPr>
-            <p:cNvGrpSpPr/>
+            <p:cNvSpPr/>
             <p:nvPr/>
-          </p:nvGrpSpPr>
-          <p:grpSpPr>
+          </p:nvSpPr>
+          <p:spPr>
             <a:xfrm>
-              <a:off x="6908802" y="4733160"/>
-              <a:ext cx="2481461" cy="1480427"/>
-              <a:chOff x="784042" y="2078841"/>
-              <a:chExt cx="2353296" cy="1411014"/>
+              <a:off x="1193312" y="2814092"/>
+              <a:ext cx="6727288" cy="1839044"/>
             </a:xfrm>
+            <a:prstGeom prst="roundRect">
+              <a:avLst>
+                <a:gd name="adj" fmla="val 3993"/>
+              </a:avLst>
+            </a:prstGeom>
             <a:solidFill>
-              <a:schemeClr val="accent2">
-                <a:alpha val="35000"/>
+              <a:schemeClr val="tx2">
+                <a:lumMod val="60000"/>
+                <a:lumOff val="40000"/>
+                <a:alpha val="5000"/>
               </a:schemeClr>
             </a:solidFill>
-          </p:grpSpPr>
-          <p:sp>
-            <p:nvSpPr>
-              <p:cNvPr id="9" name="Isosceles Triangle 8">
-                <a:extLst>
-                  <a:ext uri="{FF2B5EF4-FFF2-40B4-BE49-F238E27FC236}">
-                    <a16:creationId xmlns:a16="http://schemas.microsoft.com/office/drawing/2014/main" id="{31E906CE-139E-B497-2EF3-82F4DF4ABFF5}"/>
-                  </a:ext>
-                </a:extLst>
-              </p:cNvPr>
-              <p:cNvSpPr/>
-              <p:nvPr/>
-            </p:nvSpPr>
-            <p:spPr>
-              <a:xfrm>
-                <a:off x="1024759" y="2078841"/>
-                <a:ext cx="2112579" cy="1411014"/>
-              </a:xfrm>
-              <a:prstGeom prst="triangle">
-                <a:avLst>
-                  <a:gd name="adj" fmla="val 88060"/>
-                </a:avLst>
-              </a:prstGeom>
-              <a:grpFill/>
-              <a:ln>
-                <a:noFill/>
-              </a:ln>
-            </p:spPr>
-            <p:style>
-              <a:lnRef idx="2">
-                <a:schemeClr val="accent1">
-                  <a:shade val="15000"/>
-                </a:schemeClr>
-              </a:lnRef>
-              <a:fillRef idx="1">
-                <a:schemeClr val="accent1"/>
-              </a:fillRef>
-              <a:effectRef idx="0">
-                <a:schemeClr val="accent1"/>
-              </a:effectRef>
-              <a:fontRef idx="minor">
-                <a:schemeClr val="lt1"/>
-              </a:fontRef>
-            </p:style>
-            <p:txBody>
-              <a:bodyPr rtlCol="1" anchor="ctr"/>
-              <a:lstStyle/>
-              <a:p>
-                <a:pPr algn="ctr"/>
-                <a:endParaRPr lang="fa-IR"/>
-              </a:p>
-            </p:txBody>
-          </p:sp>
-          <p:sp>
-            <p:nvSpPr>
-              <p:cNvPr id="10" name="Isosceles Triangle 9">
-                <a:extLst>
-                  <a:ext uri="{FF2B5EF4-FFF2-40B4-BE49-F238E27FC236}">
-                    <a16:creationId xmlns:a16="http://schemas.microsoft.com/office/drawing/2014/main" id="{4D0869FF-5BFA-DAEA-F8DF-2D865DE17548}"/>
-                  </a:ext>
-                </a:extLst>
-              </p:cNvPr>
-              <p:cNvSpPr/>
-              <p:nvPr/>
-            </p:nvSpPr>
-            <p:spPr>
-              <a:xfrm rot="10800000" flipV="1">
-                <a:off x="784042" y="2078841"/>
-                <a:ext cx="2112579" cy="1411014"/>
-              </a:xfrm>
-              <a:prstGeom prst="triangle">
-                <a:avLst>
-                  <a:gd name="adj" fmla="val 88060"/>
-                </a:avLst>
-              </a:prstGeom>
-              <a:grpFill/>
-              <a:ln>
-                <a:noFill/>
-              </a:ln>
-            </p:spPr>
-            <p:style>
-              <a:lnRef idx="2">
-                <a:schemeClr val="accent1">
-                  <a:shade val="15000"/>
-                </a:schemeClr>
-              </a:lnRef>
-              <a:fillRef idx="1">
-                <a:schemeClr val="accent1"/>
-              </a:fillRef>
-              <a:effectRef idx="0">
-                <a:schemeClr val="accent1"/>
-              </a:effectRef>
-              <a:fontRef idx="minor">
-                <a:schemeClr val="lt1"/>
-              </a:fontRef>
-            </p:style>
-            <p:txBody>
-              <a:bodyPr rtlCol="1" anchor="ctr"/>
-              <a:lstStyle/>
-              <a:p>
-                <a:pPr algn="ctr"/>
-                <a:endParaRPr lang="fa-IR"/>
-              </a:p>
-            </p:txBody>
-          </p:sp>
-        </p:grpSp>
-        <p:grpSp>
-          <p:nvGrpSpPr>
-            <p:cNvPr id="6" name="Group 5">
+            <a:ln w="6350">
+              <a:solidFill>
+                <a:schemeClr val="accent3"/>
+              </a:solidFill>
+              <a:extLst>
+                <a:ext uri="{C807C97D-BFC1-408E-A445-0C87EB9F89A2}">
+                  <ask:lineSketchStyleProps xmlns:ask="http://schemas.microsoft.com/office/drawing/2018/sketchyshapes" sd="3879774215">
+                    <a:custGeom>
+                      <a:avLst/>
+                      <a:gdLst>
+                        <a:gd name="csX0" fmla="*/ 0 w 6408712"/>
+                        <a:gd name="csY0" fmla="*/ 72490 h 1815427"/>
+                        <a:gd name="csX1" fmla="*/ 72490 w 6408712"/>
+                        <a:gd name="csY1" fmla="*/ 0 h 1815427"/>
+                        <a:gd name="csX2" fmla="*/ 579283 w 6408712"/>
+                        <a:gd name="csY2" fmla="*/ 0 h 1815427"/>
+                        <a:gd name="csX3" fmla="*/ 1148713 w 6408712"/>
+                        <a:gd name="csY3" fmla="*/ 0 h 1815427"/>
+                        <a:gd name="csX4" fmla="*/ 1530231 w 6408712"/>
+                        <a:gd name="csY4" fmla="*/ 0 h 1815427"/>
+                        <a:gd name="csX5" fmla="*/ 1974387 w 6408712"/>
+                        <a:gd name="csY5" fmla="*/ 0 h 1815427"/>
+                        <a:gd name="csX6" fmla="*/ 2669092 w 6408712"/>
+                        <a:gd name="csY6" fmla="*/ 0 h 1815427"/>
+                        <a:gd name="csX7" fmla="*/ 3301159 w 6408712"/>
+                        <a:gd name="csY7" fmla="*/ 0 h 1815427"/>
+                        <a:gd name="csX8" fmla="*/ 3745315 w 6408712"/>
+                        <a:gd name="csY8" fmla="*/ 0 h 1815427"/>
+                        <a:gd name="csX9" fmla="*/ 4377382 w 6408712"/>
+                        <a:gd name="csY9" fmla="*/ 0 h 1815427"/>
+                        <a:gd name="csX10" fmla="*/ 5009450 w 6408712"/>
+                        <a:gd name="csY10" fmla="*/ 0 h 1815427"/>
+                        <a:gd name="csX11" fmla="*/ 5641517 w 6408712"/>
+                        <a:gd name="csY11" fmla="*/ 0 h 1815427"/>
+                        <a:gd name="csX12" fmla="*/ 6336222 w 6408712"/>
+                        <a:gd name="csY12" fmla="*/ 0 h 1815427"/>
+                        <a:gd name="csX13" fmla="*/ 6408712 w 6408712"/>
+                        <a:gd name="csY13" fmla="*/ 72490 h 1815427"/>
+                        <a:gd name="csX14" fmla="*/ 6408712 w 6408712"/>
+                        <a:gd name="csY14" fmla="*/ 595897 h 1815427"/>
+                        <a:gd name="csX15" fmla="*/ 6408712 w 6408712"/>
+                        <a:gd name="csY15" fmla="*/ 1136008 h 1815427"/>
+                        <a:gd name="csX16" fmla="*/ 6408712 w 6408712"/>
+                        <a:gd name="csY16" fmla="*/ 1742937 h 1815427"/>
+                        <a:gd name="csX17" fmla="*/ 6336222 w 6408712"/>
+                        <a:gd name="csY17" fmla="*/ 1815427 h 1815427"/>
+                        <a:gd name="csX18" fmla="*/ 5704154 w 6408712"/>
+                        <a:gd name="csY18" fmla="*/ 1815427 h 1815427"/>
+                        <a:gd name="csX19" fmla="*/ 5322636 w 6408712"/>
+                        <a:gd name="csY19" fmla="*/ 1815427 h 1815427"/>
+                        <a:gd name="csX20" fmla="*/ 4753206 w 6408712"/>
+                        <a:gd name="csY20" fmla="*/ 1815427 h 1815427"/>
+                        <a:gd name="csX21" fmla="*/ 4371688 w 6408712"/>
+                        <a:gd name="csY21" fmla="*/ 1815427 h 1815427"/>
+                        <a:gd name="csX22" fmla="*/ 3990170 w 6408712"/>
+                        <a:gd name="csY22" fmla="*/ 1815427 h 1815427"/>
+                        <a:gd name="csX23" fmla="*/ 3358102 w 6408712"/>
+                        <a:gd name="csY23" fmla="*/ 1815427 h 1815427"/>
+                        <a:gd name="csX24" fmla="*/ 2976584 w 6408712"/>
+                        <a:gd name="csY24" fmla="*/ 1815427 h 1815427"/>
+                        <a:gd name="csX25" fmla="*/ 2469791 w 6408712"/>
+                        <a:gd name="csY25" fmla="*/ 1815427 h 1815427"/>
+                        <a:gd name="csX26" fmla="*/ 2025636 w 6408712"/>
+                        <a:gd name="csY26" fmla="*/ 1815427 h 1815427"/>
+                        <a:gd name="csX27" fmla="*/ 1581480 w 6408712"/>
+                        <a:gd name="csY27" fmla="*/ 1815427 h 1815427"/>
+                        <a:gd name="csX28" fmla="*/ 949412 w 6408712"/>
+                        <a:gd name="csY28" fmla="*/ 1815427 h 1815427"/>
+                        <a:gd name="csX29" fmla="*/ 567894 w 6408712"/>
+                        <a:gd name="csY29" fmla="*/ 1815427 h 1815427"/>
+                        <a:gd name="csX30" fmla="*/ 72490 w 6408712"/>
+                        <a:gd name="csY30" fmla="*/ 1815427 h 1815427"/>
+                        <a:gd name="csX31" fmla="*/ 0 w 6408712"/>
+                        <a:gd name="csY31" fmla="*/ 1742937 h 1815427"/>
+                        <a:gd name="csX32" fmla="*/ 0 w 6408712"/>
+                        <a:gd name="csY32" fmla="*/ 1236235 h 1815427"/>
+                        <a:gd name="csX33" fmla="*/ 0 w 6408712"/>
+                        <a:gd name="csY33" fmla="*/ 679419 h 1815427"/>
+                        <a:gd name="csX34" fmla="*/ 0 w 6408712"/>
+                        <a:gd name="csY34" fmla="*/ 72490 h 1815427"/>
+                      </a:gdLst>
+                      <a:ahLst/>
+                      <a:cxnLst>
+                        <a:cxn ang="0">
+                          <a:pos x="csX0" y="csY0"/>
+                        </a:cxn>
+                        <a:cxn ang="0">
+                          <a:pos x="csX1" y="csY1"/>
+                        </a:cxn>
+                        <a:cxn ang="0">
+                          <a:pos x="csX2" y="csY2"/>
+                        </a:cxn>
+                        <a:cxn ang="0">
+                          <a:pos x="csX3" y="csY3"/>
+                        </a:cxn>
+                        <a:cxn ang="0">
+                          <a:pos x="csX4" y="csY4"/>
+                        </a:cxn>
+                        <a:cxn ang="0">
+                          <a:pos x="csX5" y="csY5"/>
+                        </a:cxn>
+                        <a:cxn ang="0">
+                          <a:pos x="csX6" y="csY6"/>
+                        </a:cxn>
+                        <a:cxn ang="0">
+                          <a:pos x="csX7" y="csY7"/>
+                        </a:cxn>
+                        <a:cxn ang="0">
+                          <a:pos x="csX8" y="csY8"/>
+                        </a:cxn>
+                        <a:cxn ang="0">
+                          <a:pos x="csX9" y="csY9"/>
+                        </a:cxn>
+                        <a:cxn ang="0">
+                          <a:pos x="csX10" y="csY10"/>
+                        </a:cxn>
+                        <a:cxn ang="0">
+                          <a:pos x="csX11" y="csY11"/>
+                        </a:cxn>
+                        <a:cxn ang="0">
+                          <a:pos x="csX12" y="csY12"/>
+                        </a:cxn>
+                        <a:cxn ang="0">
+                          <a:pos x="csX13" y="csY13"/>
+                        </a:cxn>
+                        <a:cxn ang="0">
+                          <a:pos x="csX14" y="csY14"/>
+                        </a:cxn>
+                        <a:cxn ang="0">
+                          <a:pos x="csX15" y="csY15"/>
+                        </a:cxn>
+                        <a:cxn ang="0">
+                          <a:pos x="csX16" y="csY16"/>
+                        </a:cxn>
+                        <a:cxn ang="0">
+                          <a:pos x="csX17" y="csY17"/>
+                        </a:cxn>
+                        <a:cxn ang="0">
+                          <a:pos x="csX18" y="csY18"/>
+                        </a:cxn>
+                        <a:cxn ang="0">
+                          <a:pos x="csX19" y="csY19"/>
+                        </a:cxn>
+                        <a:cxn ang="0">
+                          <a:pos x="csX20" y="csY20"/>
+                        </a:cxn>
+                        <a:cxn ang="0">
+                          <a:pos x="csX21" y="csY21"/>
+                        </a:cxn>
+                        <a:cxn ang="0">
+                          <a:pos x="csX22" y="csY22"/>
+                        </a:cxn>
+                        <a:cxn ang="0">
+                          <a:pos x="csX23" y="csY23"/>
+                        </a:cxn>
+                        <a:cxn ang="0">
+                          <a:pos x="csX24" y="csY24"/>
+                        </a:cxn>
+                        <a:cxn ang="0">
+                          <a:pos x="csX25" y="csY25"/>
+                        </a:cxn>
+                        <a:cxn ang="0">
+                          <a:pos x="csX26" y="csY26"/>
+                        </a:cxn>
+                        <a:cxn ang="0">
+                          <a:pos x="csX27" y="csY27"/>
+                        </a:cxn>
+                        <a:cxn ang="0">
+                          <a:pos x="csX28" y="csY28"/>
+                        </a:cxn>
+                        <a:cxn ang="0">
+                          <a:pos x="csX29" y="csY29"/>
+                        </a:cxn>
+                        <a:cxn ang="0">
+                          <a:pos x="csX30" y="csY30"/>
+                        </a:cxn>
+                        <a:cxn ang="0">
+                          <a:pos x="csX31" y="csY31"/>
+                        </a:cxn>
+                        <a:cxn ang="0">
+                          <a:pos x="csX32" y="csY32"/>
+                        </a:cxn>
+                        <a:cxn ang="0">
+                          <a:pos x="csX33" y="csY33"/>
+                        </a:cxn>
+                        <a:cxn ang="0">
+                          <a:pos x="csX34" y="csY34"/>
+                        </a:cxn>
+                      </a:cxnLst>
+                      <a:rect l="l" t="t" r="r" b="b"/>
+                      <a:pathLst>
+                        <a:path w="6408712" h="1815427" fill="none" extrusionOk="0">
+                          <a:moveTo>
+                            <a:pt x="0" y="72490"/>
+                          </a:moveTo>
+                          <a:cubicBezTo>
+                            <a:pt x="2440" y="33763"/>
+                            <a:pt x="39263" y="-776"/>
+                            <a:pt x="72490" y="0"/>
+                          </a:cubicBezTo>
+                          <a:cubicBezTo>
+                            <a:pt x="192973" y="-38538"/>
+                            <a:pt x="392771" y="41667"/>
+                            <a:pt x="579283" y="0"/>
+                          </a:cubicBezTo>
+                          <a:cubicBezTo>
+                            <a:pt x="765795" y="-41667"/>
+                            <a:pt x="1029846" y="27267"/>
+                            <a:pt x="1148713" y="0"/>
+                          </a:cubicBezTo>
+                          <a:cubicBezTo>
+                            <a:pt x="1267580" y="-27267"/>
+                            <a:pt x="1340498" y="27393"/>
+                            <a:pt x="1530231" y="0"/>
+                          </a:cubicBezTo>
+                          <a:cubicBezTo>
+                            <a:pt x="1719964" y="-27393"/>
+                            <a:pt x="1780503" y="24954"/>
+                            <a:pt x="1974387" y="0"/>
+                          </a:cubicBezTo>
+                          <a:cubicBezTo>
+                            <a:pt x="2168271" y="-24954"/>
+                            <a:pt x="2339024" y="58456"/>
+                            <a:pt x="2669092" y="0"/>
+                          </a:cubicBezTo>
+                          <a:cubicBezTo>
+                            <a:pt x="2999160" y="-58456"/>
+                            <a:pt x="3100822" y="66002"/>
+                            <a:pt x="3301159" y="0"/>
+                          </a:cubicBezTo>
+                          <a:cubicBezTo>
+                            <a:pt x="3501496" y="-66002"/>
+                            <a:pt x="3645981" y="48918"/>
+                            <a:pt x="3745315" y="0"/>
+                          </a:cubicBezTo>
+                          <a:cubicBezTo>
+                            <a:pt x="3844649" y="-48918"/>
+                            <a:pt x="4200861" y="14620"/>
+                            <a:pt x="4377382" y="0"/>
+                          </a:cubicBezTo>
+                          <a:cubicBezTo>
+                            <a:pt x="4553903" y="-14620"/>
+                            <a:pt x="4816710" y="20422"/>
+                            <a:pt x="5009450" y="0"/>
+                          </a:cubicBezTo>
+                          <a:cubicBezTo>
+                            <a:pt x="5202190" y="-20422"/>
+                            <a:pt x="5456852" y="69325"/>
+                            <a:pt x="5641517" y="0"/>
+                          </a:cubicBezTo>
+                          <a:cubicBezTo>
+                            <a:pt x="5826182" y="-69325"/>
+                            <a:pt x="6183599" y="25256"/>
+                            <a:pt x="6336222" y="0"/>
+                          </a:cubicBezTo>
+                          <a:cubicBezTo>
+                            <a:pt x="6372865" y="-6913"/>
+                            <a:pt x="6406057" y="34069"/>
+                            <a:pt x="6408712" y="72490"/>
+                          </a:cubicBezTo>
+                          <a:cubicBezTo>
+                            <a:pt x="6452171" y="309336"/>
+                            <a:pt x="6365853" y="392431"/>
+                            <a:pt x="6408712" y="595897"/>
+                          </a:cubicBezTo>
+                          <a:cubicBezTo>
+                            <a:pt x="6451571" y="799363"/>
+                            <a:pt x="6390360" y="918757"/>
+                            <a:pt x="6408712" y="1136008"/>
+                          </a:cubicBezTo>
+                          <a:cubicBezTo>
+                            <a:pt x="6427064" y="1353259"/>
+                            <a:pt x="6394108" y="1486738"/>
+                            <a:pt x="6408712" y="1742937"/>
+                          </a:cubicBezTo>
+                          <a:cubicBezTo>
+                            <a:pt x="6411040" y="1781804"/>
+                            <a:pt x="6373308" y="1820753"/>
+                            <a:pt x="6336222" y="1815427"/>
+                          </a:cubicBezTo>
+                          <a:cubicBezTo>
+                            <a:pt x="6083013" y="1825527"/>
+                            <a:pt x="5896758" y="1806243"/>
+                            <a:pt x="5704154" y="1815427"/>
+                          </a:cubicBezTo>
+                          <a:cubicBezTo>
+                            <a:pt x="5511550" y="1824611"/>
+                            <a:pt x="5468066" y="1783445"/>
+                            <a:pt x="5322636" y="1815427"/>
+                          </a:cubicBezTo>
+                          <a:cubicBezTo>
+                            <a:pt x="5177206" y="1847409"/>
+                            <a:pt x="4888885" y="1806291"/>
+                            <a:pt x="4753206" y="1815427"/>
+                          </a:cubicBezTo>
+                          <a:cubicBezTo>
+                            <a:pt x="4617527" y="1824563"/>
+                            <a:pt x="4537870" y="1796754"/>
+                            <a:pt x="4371688" y="1815427"/>
+                          </a:cubicBezTo>
+                          <a:cubicBezTo>
+                            <a:pt x="4205506" y="1834100"/>
+                            <a:pt x="4077074" y="1782646"/>
+                            <a:pt x="3990170" y="1815427"/>
+                          </a:cubicBezTo>
+                          <a:cubicBezTo>
+                            <a:pt x="3903266" y="1848208"/>
+                            <a:pt x="3534420" y="1766457"/>
+                            <a:pt x="3358102" y="1815427"/>
+                          </a:cubicBezTo>
+                          <a:cubicBezTo>
+                            <a:pt x="3181784" y="1864397"/>
+                            <a:pt x="3096475" y="1799714"/>
+                            <a:pt x="2976584" y="1815427"/>
+                          </a:cubicBezTo>
+                          <a:cubicBezTo>
+                            <a:pt x="2856693" y="1831140"/>
+                            <a:pt x="2718879" y="1772848"/>
+                            <a:pt x="2469791" y="1815427"/>
+                          </a:cubicBezTo>
+                          <a:cubicBezTo>
+                            <a:pt x="2220703" y="1858006"/>
+                            <a:pt x="2199212" y="1777458"/>
+                            <a:pt x="2025636" y="1815427"/>
+                          </a:cubicBezTo>
+                          <a:cubicBezTo>
+                            <a:pt x="1852060" y="1853396"/>
+                            <a:pt x="1741209" y="1777565"/>
+                            <a:pt x="1581480" y="1815427"/>
+                          </a:cubicBezTo>
+                          <a:cubicBezTo>
+                            <a:pt x="1421751" y="1853289"/>
+                            <a:pt x="1155314" y="1769843"/>
+                            <a:pt x="949412" y="1815427"/>
+                          </a:cubicBezTo>
+                          <a:cubicBezTo>
+                            <a:pt x="743510" y="1861011"/>
+                            <a:pt x="723444" y="1786014"/>
+                            <a:pt x="567894" y="1815427"/>
+                          </a:cubicBezTo>
+                          <a:cubicBezTo>
+                            <a:pt x="412344" y="1844840"/>
+                            <a:pt x="300775" y="1775690"/>
+                            <a:pt x="72490" y="1815427"/>
+                          </a:cubicBezTo>
+                          <a:cubicBezTo>
+                            <a:pt x="33790" y="1814101"/>
+                            <a:pt x="7333" y="1780029"/>
+                            <a:pt x="0" y="1742937"/>
+                          </a:cubicBezTo>
+                          <a:cubicBezTo>
+                            <a:pt x="-15485" y="1599856"/>
+                            <a:pt x="51713" y="1420076"/>
+                            <a:pt x="0" y="1236235"/>
+                          </a:cubicBezTo>
+                          <a:cubicBezTo>
+                            <a:pt x="-51713" y="1052394"/>
+                            <a:pt x="9439" y="843652"/>
+                            <a:pt x="0" y="679419"/>
+                          </a:cubicBezTo>
+                          <a:cubicBezTo>
+                            <a:pt x="-9439" y="515186"/>
+                            <a:pt x="49467" y="369944"/>
+                            <a:pt x="0" y="72490"/>
+                          </a:cubicBezTo>
+                          <a:close/>
+                        </a:path>
+                        <a:path w="6408712" h="1815427" stroke="0" extrusionOk="0">
+                          <a:moveTo>
+                            <a:pt x="0" y="72490"/>
+                          </a:moveTo>
+                          <a:cubicBezTo>
+                            <a:pt x="-6606" y="31375"/>
+                            <a:pt x="36207" y="-3650"/>
+                            <a:pt x="72490" y="0"/>
+                          </a:cubicBezTo>
+                          <a:cubicBezTo>
+                            <a:pt x="253279" y="-47094"/>
+                            <a:pt x="353936" y="44432"/>
+                            <a:pt x="579283" y="0"/>
+                          </a:cubicBezTo>
+                          <a:cubicBezTo>
+                            <a:pt x="804630" y="-44432"/>
+                            <a:pt x="961261" y="35607"/>
+                            <a:pt x="1148713" y="0"/>
+                          </a:cubicBezTo>
+                          <a:cubicBezTo>
+                            <a:pt x="1336165" y="-35607"/>
+                            <a:pt x="1430333" y="44534"/>
+                            <a:pt x="1530231" y="0"/>
+                          </a:cubicBezTo>
+                          <a:cubicBezTo>
+                            <a:pt x="1630129" y="-44534"/>
+                            <a:pt x="1952011" y="73524"/>
+                            <a:pt x="2224936" y="0"/>
+                          </a:cubicBezTo>
+                          <a:cubicBezTo>
+                            <a:pt x="2497861" y="-73524"/>
+                            <a:pt x="2478230" y="35478"/>
+                            <a:pt x="2606454" y="0"/>
+                          </a:cubicBezTo>
+                          <a:cubicBezTo>
+                            <a:pt x="2734678" y="-35478"/>
+                            <a:pt x="3021198" y="40397"/>
+                            <a:pt x="3175884" y="0"/>
+                          </a:cubicBezTo>
+                          <a:cubicBezTo>
+                            <a:pt x="3330570" y="-40397"/>
+                            <a:pt x="3459869" y="6223"/>
+                            <a:pt x="3557403" y="0"/>
+                          </a:cubicBezTo>
+                          <a:cubicBezTo>
+                            <a:pt x="3654937" y="-6223"/>
+                            <a:pt x="3959704" y="32007"/>
+                            <a:pt x="4064196" y="0"/>
+                          </a:cubicBezTo>
+                          <a:cubicBezTo>
+                            <a:pt x="4168688" y="-32007"/>
+                            <a:pt x="4545412" y="31652"/>
+                            <a:pt x="4758900" y="0"/>
+                          </a:cubicBezTo>
+                          <a:cubicBezTo>
+                            <a:pt x="4972388" y="-31652"/>
+                            <a:pt x="5100269" y="30001"/>
+                            <a:pt x="5328331" y="0"/>
+                          </a:cubicBezTo>
+                          <a:cubicBezTo>
+                            <a:pt x="5556393" y="-30001"/>
+                            <a:pt x="5616366" y="38205"/>
+                            <a:pt x="5835123" y="0"/>
+                          </a:cubicBezTo>
+                          <a:cubicBezTo>
+                            <a:pt x="6053880" y="-38205"/>
+                            <a:pt x="6112680" y="4757"/>
+                            <a:pt x="6336222" y="0"/>
+                          </a:cubicBezTo>
+                          <a:cubicBezTo>
+                            <a:pt x="6374944" y="-5898"/>
+                            <a:pt x="6405807" y="42681"/>
+                            <a:pt x="6408712" y="72490"/>
+                          </a:cubicBezTo>
+                          <a:cubicBezTo>
+                            <a:pt x="6418216" y="274360"/>
+                            <a:pt x="6406339" y="413793"/>
+                            <a:pt x="6408712" y="612601"/>
+                          </a:cubicBezTo>
+                          <a:cubicBezTo>
+                            <a:pt x="6411085" y="811409"/>
+                            <a:pt x="6356491" y="974916"/>
+                            <a:pt x="6408712" y="1186121"/>
+                          </a:cubicBezTo>
+                          <a:cubicBezTo>
+                            <a:pt x="6460933" y="1397326"/>
+                            <a:pt x="6393035" y="1623485"/>
+                            <a:pt x="6408712" y="1742937"/>
+                          </a:cubicBezTo>
+                          <a:cubicBezTo>
+                            <a:pt x="6405996" y="1773416"/>
+                            <a:pt x="6367706" y="1810194"/>
+                            <a:pt x="6336222" y="1815427"/>
+                          </a:cubicBezTo>
+                          <a:cubicBezTo>
+                            <a:pt x="6188031" y="1823381"/>
+                            <a:pt x="5856039" y="1749959"/>
+                            <a:pt x="5641517" y="1815427"/>
+                          </a:cubicBezTo>
+                          <a:cubicBezTo>
+                            <a:pt x="5426996" y="1880895"/>
+                            <a:pt x="5305365" y="1771643"/>
+                            <a:pt x="5134724" y="1815427"/>
+                          </a:cubicBezTo>
+                          <a:cubicBezTo>
+                            <a:pt x="4964083" y="1859211"/>
+                            <a:pt x="4666056" y="1813129"/>
+                            <a:pt x="4440019" y="1815427"/>
+                          </a:cubicBezTo>
+                          <a:cubicBezTo>
+                            <a:pt x="4213983" y="1817725"/>
+                            <a:pt x="4120071" y="1790248"/>
+                            <a:pt x="3870589" y="1815427"/>
+                          </a:cubicBezTo>
+                          <a:cubicBezTo>
+                            <a:pt x="3621107" y="1840606"/>
+                            <a:pt x="3573916" y="1810928"/>
+                            <a:pt x="3363796" y="1815427"/>
+                          </a:cubicBezTo>
+                          <a:cubicBezTo>
+                            <a:pt x="3153676" y="1819926"/>
+                            <a:pt x="3030474" y="1783614"/>
+                            <a:pt x="2919641" y="1815427"/>
+                          </a:cubicBezTo>
+                          <a:cubicBezTo>
+                            <a:pt x="2808809" y="1847240"/>
+                            <a:pt x="2499765" y="1774828"/>
+                            <a:pt x="2350211" y="1815427"/>
+                          </a:cubicBezTo>
+                          <a:cubicBezTo>
+                            <a:pt x="2200657" y="1856026"/>
+                            <a:pt x="2063318" y="1806602"/>
+                            <a:pt x="1843418" y="1815427"/>
+                          </a:cubicBezTo>
+                          <a:cubicBezTo>
+                            <a:pt x="1623518" y="1824252"/>
+                            <a:pt x="1407356" y="1746071"/>
+                            <a:pt x="1211350" y="1815427"/>
+                          </a:cubicBezTo>
+                          <a:cubicBezTo>
+                            <a:pt x="1015344" y="1884783"/>
+                            <a:pt x="825364" y="1790847"/>
+                            <a:pt x="704558" y="1815427"/>
+                          </a:cubicBezTo>
+                          <a:cubicBezTo>
+                            <a:pt x="583752" y="1840007"/>
+                            <a:pt x="381839" y="1808125"/>
+                            <a:pt x="72490" y="1815427"/>
+                          </a:cubicBezTo>
+                          <a:cubicBezTo>
+                            <a:pt x="23239" y="1808812"/>
+                            <a:pt x="-4542" y="1784490"/>
+                            <a:pt x="0" y="1742937"/>
+                          </a:cubicBezTo>
+                          <a:cubicBezTo>
+                            <a:pt x="-2903" y="1527595"/>
+                            <a:pt x="54710" y="1463371"/>
+                            <a:pt x="0" y="1236235"/>
+                          </a:cubicBezTo>
+                          <a:cubicBezTo>
+                            <a:pt x="-54710" y="1009099"/>
+                            <a:pt x="3096" y="848482"/>
+                            <a:pt x="0" y="679419"/>
+                          </a:cubicBezTo>
+                          <a:cubicBezTo>
+                            <a:pt x="-3096" y="510356"/>
+                            <a:pt x="53729" y="242500"/>
+                            <a:pt x="0" y="72490"/>
+                          </a:cubicBezTo>
+                          <a:close/>
+                        </a:path>
+                      </a:pathLst>
+                    </a:custGeom>
+                    <ask:type>
+                      <ask:lineSketchNone/>
+                    </ask:type>
+                  </ask:lineSketchStyleProps>
+                </a:ext>
+              </a:extLst>
+            </a:ln>
+          </p:spPr>
+          <p:style>
+            <a:lnRef idx="2">
+              <a:schemeClr val="accent1">
+                <a:shade val="15000"/>
+              </a:schemeClr>
+            </a:lnRef>
+            <a:fillRef idx="1">
+              <a:schemeClr val="accent1"/>
+            </a:fillRef>
+            <a:effectRef idx="0">
+              <a:schemeClr val="accent1"/>
+            </a:effectRef>
+            <a:fontRef idx="minor">
+              <a:schemeClr val="lt1"/>
+            </a:fontRef>
+          </p:style>
+          <p:txBody>
+            <a:bodyPr rtlCol="1" anchor="ctr"/>
+            <a:lstStyle/>
+            <a:p>
+              <a:pPr algn="ctr"/>
+              <a:endParaRPr lang="fa-IR"/>
+            </a:p>
+          </p:txBody>
+        </p:sp>
+        <p:sp>
+          <p:nvSpPr>
+            <p:cNvPr id="19" name="Isosceles Triangle 18">
               <a:extLst>
                 <a:ext uri="{FF2B5EF4-FFF2-40B4-BE49-F238E27FC236}">
-                  <a16:creationId xmlns:a16="http://schemas.microsoft.com/office/drawing/2014/main" id="{1156E019-AF22-6E08-6184-6C0F45475E77}"/>
+                  <a16:creationId xmlns:a16="http://schemas.microsoft.com/office/drawing/2014/main" id="{A68C7F0B-C391-B55C-47BC-A0FF1617461E}"/>
                 </a:ext>
               </a:extLst>
             </p:cNvPr>
-            <p:cNvGrpSpPr/>
+            <p:cNvSpPr/>
             <p:nvPr/>
-          </p:nvGrpSpPr>
-          <p:grpSpPr>
+          </p:nvSpPr>
+          <p:spPr>
             <a:xfrm>
-              <a:off x="8842378" y="4741718"/>
-              <a:ext cx="2481461" cy="1471869"/>
-              <a:chOff x="3378056" y="2017986"/>
-              <a:chExt cx="2481461" cy="1471869"/>
+              <a:off x="1474972" y="3017796"/>
+              <a:ext cx="2227634" cy="1480427"/>
             </a:xfrm>
+            <a:prstGeom prst="triangle">
+              <a:avLst>
+                <a:gd name="adj" fmla="val 88060"/>
+              </a:avLst>
+            </a:prstGeom>
             <a:solidFill>
-              <a:schemeClr val="accent2">
-                <a:alpha val="35000"/>
+              <a:srgbClr val="FF0000">
+                <a:alpha val="25000"/>
+              </a:srgbClr>
+            </a:solidFill>
+            <a:ln>
+              <a:noFill/>
+            </a:ln>
+          </p:spPr>
+          <p:style>
+            <a:lnRef idx="2">
+              <a:schemeClr val="accent1">
+                <a:shade val="15000"/>
+              </a:schemeClr>
+            </a:lnRef>
+            <a:fillRef idx="1">
+              <a:schemeClr val="accent1"/>
+            </a:fillRef>
+            <a:effectRef idx="0">
+              <a:schemeClr val="accent1"/>
+            </a:effectRef>
+            <a:fontRef idx="minor">
+              <a:schemeClr val="lt1"/>
+            </a:fontRef>
+          </p:style>
+          <p:txBody>
+            <a:bodyPr rtlCol="1" anchor="ctr"/>
+            <a:lstStyle/>
+            <a:p>
+              <a:pPr algn="ctr"/>
+              <a:endParaRPr lang="fa-IR"/>
+            </a:p>
+          </p:txBody>
+        </p:sp>
+        <p:sp>
+          <p:nvSpPr>
+            <p:cNvPr id="20" name="Isosceles Triangle 19">
+              <a:extLst>
+                <a:ext uri="{FF2B5EF4-FFF2-40B4-BE49-F238E27FC236}">
+                  <a16:creationId xmlns:a16="http://schemas.microsoft.com/office/drawing/2014/main" id="{F29E6DAF-4CAA-F9AE-00D3-C3E45DEC8ABB}"/>
+                </a:ext>
+              </a:extLst>
+            </p:cNvPr>
+            <p:cNvSpPr/>
+            <p:nvPr/>
+          </p:nvSpPr>
+          <p:spPr>
+            <a:xfrm rot="10800000" flipV="1">
+              <a:off x="1474971" y="3017796"/>
+              <a:ext cx="2212381" cy="1480427"/>
+            </a:xfrm>
+            <a:prstGeom prst="triangle">
+              <a:avLst>
+                <a:gd name="adj" fmla="val 88060"/>
+              </a:avLst>
+            </a:prstGeom>
+            <a:solidFill>
+              <a:srgbClr val="FF0000">
+                <a:alpha val="25000"/>
+              </a:srgbClr>
+            </a:solidFill>
+            <a:ln>
+              <a:noFill/>
+            </a:ln>
+          </p:spPr>
+          <p:style>
+            <a:lnRef idx="2">
+              <a:schemeClr val="accent1">
+                <a:shade val="15000"/>
+              </a:schemeClr>
+            </a:lnRef>
+            <a:fillRef idx="1">
+              <a:schemeClr val="accent1"/>
+            </a:fillRef>
+            <a:effectRef idx="0">
+              <a:schemeClr val="accent1"/>
+            </a:effectRef>
+            <a:fontRef idx="minor">
+              <a:schemeClr val="lt1"/>
+            </a:fontRef>
+          </p:style>
+          <p:txBody>
+            <a:bodyPr rtlCol="1" anchor="ctr"/>
+            <a:lstStyle/>
+            <a:p>
+              <a:pPr algn="ctr"/>
+              <a:endParaRPr lang="fa-IR"/>
+            </a:p>
+          </p:txBody>
+        </p:sp>
+        <p:sp>
+          <p:nvSpPr>
+            <p:cNvPr id="21" name="Isosceles Triangle 20">
+              <a:extLst>
+                <a:ext uri="{FF2B5EF4-FFF2-40B4-BE49-F238E27FC236}">
+                  <a16:creationId xmlns:a16="http://schemas.microsoft.com/office/drawing/2014/main" id="{BCE94C59-064A-8189-BECB-5300E76493D6}"/>
+                </a:ext>
+              </a:extLst>
+            </p:cNvPr>
+            <p:cNvSpPr/>
+            <p:nvPr/>
+          </p:nvSpPr>
+          <p:spPr>
+            <a:xfrm rot="10800000">
+              <a:off x="3523603" y="3026354"/>
+              <a:ext cx="2112579" cy="1411014"/>
+            </a:xfrm>
+            <a:prstGeom prst="triangle">
+              <a:avLst>
+                <a:gd name="adj" fmla="val 88060"/>
+              </a:avLst>
+            </a:prstGeom>
+            <a:solidFill>
+              <a:schemeClr val="accent6">
+                <a:alpha val="28000"/>
               </a:schemeClr>
             </a:solidFill>
-          </p:grpSpPr>
-          <p:sp>
-            <p:nvSpPr>
-              <p:cNvPr id="7" name="Isosceles Triangle 6">
-                <a:extLst>
-                  <a:ext uri="{FF2B5EF4-FFF2-40B4-BE49-F238E27FC236}">
-                    <a16:creationId xmlns:a16="http://schemas.microsoft.com/office/drawing/2014/main" id="{76327B16-FB73-BEAC-03D9-EAF7801E654C}"/>
-                  </a:ext>
-                </a:extLst>
-              </p:cNvPr>
-              <p:cNvSpPr/>
-              <p:nvPr/>
-            </p:nvSpPr>
-            <p:spPr>
-              <a:xfrm rot="10800000">
-                <a:off x="3746938" y="2017986"/>
-                <a:ext cx="2112579" cy="1411014"/>
-              </a:xfrm>
-              <a:prstGeom prst="triangle">
-                <a:avLst>
-                  <a:gd name="adj" fmla="val 88060"/>
-                </a:avLst>
-              </a:prstGeom>
-              <a:grpFill/>
-              <a:ln>
-                <a:noFill/>
-              </a:ln>
-            </p:spPr>
-            <p:style>
-              <a:lnRef idx="2">
-                <a:schemeClr val="accent1">
-                  <a:shade val="15000"/>
-                </a:schemeClr>
-              </a:lnRef>
-              <a:fillRef idx="1">
-                <a:schemeClr val="accent1"/>
-              </a:fillRef>
-              <a:effectRef idx="0">
-                <a:schemeClr val="accent1"/>
-              </a:effectRef>
-              <a:fontRef idx="minor">
-                <a:schemeClr val="lt1"/>
-              </a:fontRef>
-            </p:style>
-            <p:txBody>
-              <a:bodyPr rtlCol="1" anchor="ctr"/>
-              <a:lstStyle/>
-              <a:p>
-                <a:pPr algn="ctr"/>
-                <a:endParaRPr lang="fa-IR"/>
-              </a:p>
-            </p:txBody>
-          </p:sp>
-          <p:sp>
-            <p:nvSpPr>
-              <p:cNvPr id="8" name="Isosceles Triangle 7">
-                <a:extLst>
-                  <a:ext uri="{FF2B5EF4-FFF2-40B4-BE49-F238E27FC236}">
-                    <a16:creationId xmlns:a16="http://schemas.microsoft.com/office/drawing/2014/main" id="{D3D7D3E8-5114-8443-D0D8-54261F8BF29A}"/>
-                  </a:ext>
-                </a:extLst>
-              </p:cNvPr>
-              <p:cNvSpPr/>
-              <p:nvPr/>
-            </p:nvSpPr>
-            <p:spPr>
-              <a:xfrm>
-                <a:off x="3378056" y="2026544"/>
-                <a:ext cx="2112579" cy="1463311"/>
-              </a:xfrm>
-              <a:prstGeom prst="triangle">
-                <a:avLst>
-                  <a:gd name="adj" fmla="val 88060"/>
-                </a:avLst>
-              </a:prstGeom>
-              <a:grpFill/>
-              <a:ln>
-                <a:noFill/>
-              </a:ln>
-            </p:spPr>
-            <p:style>
-              <a:lnRef idx="2">
-                <a:schemeClr val="accent1">
-                  <a:shade val="15000"/>
-                </a:schemeClr>
-              </a:lnRef>
-              <a:fillRef idx="1">
-                <a:schemeClr val="accent1"/>
-              </a:fillRef>
-              <a:effectRef idx="0">
-                <a:schemeClr val="accent1"/>
-              </a:effectRef>
-              <a:fontRef idx="minor">
-                <a:schemeClr val="lt1"/>
-              </a:fontRef>
-            </p:style>
-            <p:txBody>
-              <a:bodyPr rtlCol="1" anchor="ctr"/>
-              <a:lstStyle/>
-              <a:p>
-                <a:pPr algn="ctr"/>
-                <a:endParaRPr lang="fa-IR"/>
-              </a:p>
-            </p:txBody>
-          </p:sp>
-        </p:grpSp>
+            <a:ln>
+              <a:noFill/>
+            </a:ln>
+          </p:spPr>
+          <p:style>
+            <a:lnRef idx="2">
+              <a:schemeClr val="accent1">
+                <a:shade val="15000"/>
+              </a:schemeClr>
+            </a:lnRef>
+            <a:fillRef idx="1">
+              <a:schemeClr val="accent1"/>
+            </a:fillRef>
+            <a:effectRef idx="0">
+              <a:schemeClr val="accent1"/>
+            </a:effectRef>
+            <a:fontRef idx="minor">
+              <a:schemeClr val="lt1"/>
+            </a:fontRef>
+          </p:style>
+          <p:txBody>
+            <a:bodyPr rtlCol="1" anchor="ctr"/>
+            <a:lstStyle/>
+            <a:p>
+              <a:pPr algn="ctr"/>
+              <a:endParaRPr lang="fa-IR"/>
+            </a:p>
+          </p:txBody>
+        </p:sp>
+        <p:sp>
+          <p:nvSpPr>
+            <p:cNvPr id="22" name="Isosceles Triangle 21">
+              <a:extLst>
+                <a:ext uri="{FF2B5EF4-FFF2-40B4-BE49-F238E27FC236}">
+                  <a16:creationId xmlns:a16="http://schemas.microsoft.com/office/drawing/2014/main" id="{FD8E63FB-7AB4-D5E0-A496-57C9756433C2}"/>
+                </a:ext>
+              </a:extLst>
+            </p:cNvPr>
+            <p:cNvSpPr/>
+            <p:nvPr/>
+          </p:nvSpPr>
+          <p:spPr>
+            <a:xfrm>
+              <a:off x="3243015" y="3034912"/>
+              <a:ext cx="2112579" cy="1463311"/>
+            </a:xfrm>
+            <a:prstGeom prst="triangle">
+              <a:avLst>
+                <a:gd name="adj" fmla="val 88060"/>
+              </a:avLst>
+            </a:prstGeom>
+            <a:solidFill>
+              <a:schemeClr val="accent6">
+                <a:alpha val="28000"/>
+              </a:schemeClr>
+            </a:solidFill>
+            <a:ln>
+              <a:noFill/>
+            </a:ln>
+          </p:spPr>
+          <p:style>
+            <a:lnRef idx="2">
+              <a:schemeClr val="accent1">
+                <a:shade val="15000"/>
+              </a:schemeClr>
+            </a:lnRef>
+            <a:fillRef idx="1">
+              <a:schemeClr val="accent1"/>
+            </a:fillRef>
+            <a:effectRef idx="0">
+              <a:schemeClr val="accent1"/>
+            </a:effectRef>
+            <a:fontRef idx="minor">
+              <a:schemeClr val="lt1"/>
+            </a:fontRef>
+          </p:style>
+          <p:txBody>
+            <a:bodyPr rtlCol="1" anchor="ctr"/>
+            <a:lstStyle/>
+            <a:p>
+              <a:pPr algn="ctr"/>
+              <a:endParaRPr lang="fa-IR"/>
+            </a:p>
+          </p:txBody>
+        </p:sp>
+        <p:sp>
+          <p:nvSpPr>
+            <p:cNvPr id="23" name="Isosceles Triangle 22">
+              <a:extLst>
+                <a:ext uri="{FF2B5EF4-FFF2-40B4-BE49-F238E27FC236}">
+                  <a16:creationId xmlns:a16="http://schemas.microsoft.com/office/drawing/2014/main" id="{AE909714-3D44-FBBE-D98F-416489CEFA03}"/>
+                </a:ext>
+              </a:extLst>
+            </p:cNvPr>
+            <p:cNvSpPr/>
+            <p:nvPr/>
+          </p:nvSpPr>
+          <p:spPr>
+            <a:xfrm rot="15349267" flipV="1">
+              <a:off x="6467061" y="3115264"/>
+              <a:ext cx="1462064" cy="1121031"/>
+            </a:xfrm>
+            <a:prstGeom prst="triangle">
+              <a:avLst>
+                <a:gd name="adj" fmla="val 88060"/>
+              </a:avLst>
+            </a:prstGeom>
+            <a:solidFill>
+              <a:schemeClr val="accent4">
+                <a:lumMod val="75000"/>
+                <a:alpha val="38000"/>
+              </a:schemeClr>
+            </a:solidFill>
+            <a:ln>
+              <a:noFill/>
+            </a:ln>
+          </p:spPr>
+          <p:style>
+            <a:lnRef idx="2">
+              <a:schemeClr val="accent1">
+                <a:shade val="15000"/>
+              </a:schemeClr>
+            </a:lnRef>
+            <a:fillRef idx="1">
+              <a:schemeClr val="accent1"/>
+            </a:fillRef>
+            <a:effectRef idx="0">
+              <a:schemeClr val="accent1"/>
+            </a:effectRef>
+            <a:fontRef idx="minor">
+              <a:schemeClr val="lt1"/>
+            </a:fontRef>
+          </p:style>
+          <p:txBody>
+            <a:bodyPr rtlCol="1" anchor="ctr"/>
+            <a:lstStyle/>
+            <a:p>
+              <a:pPr algn="ctr"/>
+              <a:endParaRPr lang="fa-IR"/>
+            </a:p>
+          </p:txBody>
+        </p:sp>
+        <p:sp>
+          <p:nvSpPr>
+            <p:cNvPr id="24" name="Isosceles Triangle 23">
+              <a:extLst>
+                <a:ext uri="{FF2B5EF4-FFF2-40B4-BE49-F238E27FC236}">
+                  <a16:creationId xmlns:a16="http://schemas.microsoft.com/office/drawing/2014/main" id="{FDF59576-5476-FD7E-59A3-ACACB88EF8DB}"/>
+                </a:ext>
+              </a:extLst>
+            </p:cNvPr>
+            <p:cNvSpPr/>
+            <p:nvPr/>
+          </p:nvSpPr>
+          <p:spPr>
+            <a:xfrm rot="17022562">
+              <a:off x="5751059" y="3125908"/>
+              <a:ext cx="1480751" cy="1075355"/>
+            </a:xfrm>
+            <a:prstGeom prst="triangle">
+              <a:avLst>
+                <a:gd name="adj" fmla="val 88060"/>
+              </a:avLst>
+            </a:prstGeom>
+            <a:solidFill>
+              <a:schemeClr val="accent4">
+                <a:lumMod val="75000"/>
+                <a:alpha val="38000"/>
+              </a:schemeClr>
+            </a:solidFill>
+            <a:ln>
+              <a:noFill/>
+            </a:ln>
+          </p:spPr>
+          <p:style>
+            <a:lnRef idx="2">
+              <a:schemeClr val="accent1">
+                <a:shade val="15000"/>
+              </a:schemeClr>
+            </a:lnRef>
+            <a:fillRef idx="1">
+              <a:schemeClr val="accent1"/>
+            </a:fillRef>
+            <a:effectRef idx="0">
+              <a:schemeClr val="accent1"/>
+            </a:effectRef>
+            <a:fontRef idx="minor">
+              <a:schemeClr val="lt1"/>
+            </a:fontRef>
+          </p:style>
+          <p:txBody>
+            <a:bodyPr rtlCol="1" anchor="ctr"/>
+            <a:lstStyle/>
+            <a:p>
+              <a:pPr algn="ctr"/>
+              <a:endParaRPr lang="fa-IR"/>
+            </a:p>
+          </p:txBody>
+        </p:sp>
+        <p:sp>
+          <p:nvSpPr>
+            <p:cNvPr id="25" name="Isosceles Triangle 24">
+              <a:extLst>
+                <a:ext uri="{FF2B5EF4-FFF2-40B4-BE49-F238E27FC236}">
+                  <a16:creationId xmlns:a16="http://schemas.microsoft.com/office/drawing/2014/main" id="{45DEEFC6-2A68-0149-4918-8F988855421A}"/>
+                </a:ext>
+              </a:extLst>
+            </p:cNvPr>
+            <p:cNvSpPr/>
+            <p:nvPr/>
+          </p:nvSpPr>
+          <p:spPr>
+            <a:xfrm rot="15519398" flipV="1">
+              <a:off x="5119490" y="3099987"/>
+              <a:ext cx="1497693" cy="1121031"/>
+            </a:xfrm>
+            <a:prstGeom prst="triangle">
+              <a:avLst>
+                <a:gd name="adj" fmla="val 88060"/>
+              </a:avLst>
+            </a:prstGeom>
+            <a:solidFill>
+              <a:schemeClr val="accent5">
+                <a:alpha val="36000"/>
+              </a:schemeClr>
+            </a:solidFill>
+            <a:ln>
+              <a:noFill/>
+            </a:ln>
+          </p:spPr>
+          <p:style>
+            <a:lnRef idx="2">
+              <a:schemeClr val="accent1">
+                <a:shade val="15000"/>
+              </a:schemeClr>
+            </a:lnRef>
+            <a:fillRef idx="1">
+              <a:schemeClr val="accent1"/>
+            </a:fillRef>
+            <a:effectRef idx="0">
+              <a:schemeClr val="accent1"/>
+            </a:effectRef>
+            <a:fontRef idx="minor">
+              <a:schemeClr val="lt1"/>
+            </a:fontRef>
+          </p:style>
+          <p:txBody>
+            <a:bodyPr rtlCol="1" anchor="ctr"/>
+            <a:lstStyle/>
+            <a:p>
+              <a:pPr algn="ctr"/>
+              <a:endParaRPr lang="fa-IR"/>
+            </a:p>
+          </p:txBody>
+        </p:sp>
+        <p:sp>
+          <p:nvSpPr>
+            <p:cNvPr id="26" name="Isosceles Triangle 25">
+              <a:extLst>
+                <a:ext uri="{FF2B5EF4-FFF2-40B4-BE49-F238E27FC236}">
+                  <a16:creationId xmlns:a16="http://schemas.microsoft.com/office/drawing/2014/main" id="{F95274A8-A1F5-FD0B-F639-2AC5C65CFF15}"/>
+                </a:ext>
+              </a:extLst>
+            </p:cNvPr>
+            <p:cNvSpPr/>
+            <p:nvPr/>
+          </p:nvSpPr>
+          <p:spPr>
+            <a:xfrm rot="17022562">
+              <a:off x="5090012" y="3133316"/>
+              <a:ext cx="1501729" cy="1075355"/>
+            </a:xfrm>
+            <a:prstGeom prst="triangle">
+              <a:avLst>
+                <a:gd name="adj" fmla="val 88060"/>
+              </a:avLst>
+            </a:prstGeom>
+            <a:solidFill>
+              <a:schemeClr val="accent5">
+                <a:alpha val="36000"/>
+              </a:schemeClr>
+            </a:solidFill>
+            <a:ln>
+              <a:noFill/>
+            </a:ln>
+          </p:spPr>
+          <p:style>
+            <a:lnRef idx="2">
+              <a:schemeClr val="accent1">
+                <a:shade val="15000"/>
+              </a:schemeClr>
+            </a:lnRef>
+            <a:fillRef idx="1">
+              <a:schemeClr val="accent1"/>
+            </a:fillRef>
+            <a:effectRef idx="0">
+              <a:schemeClr val="accent1"/>
+            </a:effectRef>
+            <a:fontRef idx="minor">
+              <a:schemeClr val="lt1"/>
+            </a:fontRef>
+          </p:style>
+          <p:txBody>
+            <a:bodyPr rtlCol="1" anchor="ctr"/>
+            <a:lstStyle/>
+            <a:p>
+              <a:pPr algn="ctr"/>
+              <a:endParaRPr lang="fa-IR"/>
+            </a:p>
+          </p:txBody>
+        </p:sp>
+      </p:grpSp>
+      <p:grpSp>
+        <p:nvGrpSpPr>
+          <p:cNvPr id="12" name="Group 11">
+            <a:extLst>
+              <a:ext uri="{FF2B5EF4-FFF2-40B4-BE49-F238E27FC236}">
+                <a16:creationId xmlns:a16="http://schemas.microsoft.com/office/drawing/2014/main" id="{1969C9B7-5920-A33D-C8E3-DA0473D65AD4}"/>
+              </a:ext>
+            </a:extLst>
+          </p:cNvPr>
+          <p:cNvGrpSpPr/>
+          <p:nvPr/>
+        </p:nvGrpSpPr>
+        <p:grpSpPr>
+          <a:xfrm>
+            <a:off x="7570676" y="3333581"/>
+            <a:ext cx="742693" cy="190837"/>
+            <a:chOff x="1980235" y="3333581"/>
+            <a:chExt cx="742693" cy="190837"/>
+          </a:xfrm>
+        </p:grpSpPr>
+        <p:cxnSp>
+          <p:nvCxnSpPr>
+            <p:cNvPr id="2" name="Straight Connector 1">
+              <a:extLst>
+                <a:ext uri="{FF2B5EF4-FFF2-40B4-BE49-F238E27FC236}">
+                  <a16:creationId xmlns:a16="http://schemas.microsoft.com/office/drawing/2014/main" id="{D60B27F0-B1E2-A3B0-9BCD-8FC1DEAFF121}"/>
+                </a:ext>
+              </a:extLst>
+            </p:cNvPr>
+            <p:cNvCxnSpPr>
+              <a:cxnSpLocks/>
+            </p:cNvCxnSpPr>
+            <p:nvPr/>
+          </p:nvCxnSpPr>
+          <p:spPr>
+            <a:xfrm flipH="1">
+              <a:off x="2258345" y="3357909"/>
+              <a:ext cx="149488" cy="0"/>
+            </a:xfrm>
+            <a:prstGeom prst="line">
+              <a:avLst/>
+            </a:prstGeom>
+            <a:ln w="38100"/>
+          </p:spPr>
+          <p:style>
+            <a:lnRef idx="3">
+              <a:schemeClr val="accent2"/>
+            </a:lnRef>
+            <a:fillRef idx="0">
+              <a:schemeClr val="accent2"/>
+            </a:fillRef>
+            <a:effectRef idx="2">
+              <a:schemeClr val="accent2"/>
+            </a:effectRef>
+            <a:fontRef idx="minor">
+              <a:schemeClr val="tx1"/>
+            </a:fontRef>
+          </p:style>
+        </p:cxnSp>
+        <p:cxnSp>
+          <p:nvCxnSpPr>
+            <p:cNvPr id="3" name="Straight Connector 2">
+              <a:extLst>
+                <a:ext uri="{FF2B5EF4-FFF2-40B4-BE49-F238E27FC236}">
+                  <a16:creationId xmlns:a16="http://schemas.microsoft.com/office/drawing/2014/main" id="{4FA2CEF3-A8DE-8F0F-3762-A1599CE5F86B}"/>
+                </a:ext>
+              </a:extLst>
+            </p:cNvPr>
+            <p:cNvCxnSpPr>
+              <a:cxnSpLocks/>
+            </p:cNvCxnSpPr>
+            <p:nvPr/>
+          </p:nvCxnSpPr>
+          <p:spPr>
+            <a:xfrm flipH="1">
+              <a:off x="2281925" y="3436494"/>
+              <a:ext cx="99707" cy="0"/>
+            </a:xfrm>
+            <a:prstGeom prst="line">
+              <a:avLst/>
+            </a:prstGeom>
+            <a:ln w="38100"/>
+          </p:spPr>
+          <p:style>
+            <a:lnRef idx="3">
+              <a:schemeClr val="accent2"/>
+            </a:lnRef>
+            <a:fillRef idx="0">
+              <a:schemeClr val="accent2"/>
+            </a:fillRef>
+            <a:effectRef idx="2">
+              <a:schemeClr val="accent2"/>
+            </a:effectRef>
+            <a:fontRef idx="minor">
+              <a:schemeClr val="tx1"/>
+            </a:fontRef>
+          </p:style>
+        </p:cxnSp>
+        <p:cxnSp>
+          <p:nvCxnSpPr>
+            <p:cNvPr id="4" name="Straight Connector 3">
+              <a:extLst>
+                <a:ext uri="{FF2B5EF4-FFF2-40B4-BE49-F238E27FC236}">
+                  <a16:creationId xmlns:a16="http://schemas.microsoft.com/office/drawing/2014/main" id="{6870E863-A002-20BB-72AE-5638538C9630}"/>
+                </a:ext>
+              </a:extLst>
+            </p:cNvPr>
+            <p:cNvCxnSpPr>
+              <a:cxnSpLocks/>
+            </p:cNvCxnSpPr>
+            <p:nvPr/>
+          </p:nvCxnSpPr>
+          <p:spPr>
+            <a:xfrm>
+              <a:off x="2577224" y="3428608"/>
+              <a:ext cx="0" cy="95810"/>
+            </a:xfrm>
+            <a:prstGeom prst="line">
+              <a:avLst/>
+            </a:prstGeom>
+            <a:ln w="76200"/>
+          </p:spPr>
+          <p:style>
+            <a:lnRef idx="3">
+              <a:schemeClr val="accent2"/>
+            </a:lnRef>
+            <a:fillRef idx="0">
+              <a:schemeClr val="accent2"/>
+            </a:fillRef>
+            <a:effectRef idx="2">
+              <a:schemeClr val="accent2"/>
+            </a:effectRef>
+            <a:fontRef idx="minor">
+              <a:schemeClr val="tx1"/>
+            </a:fontRef>
+          </p:style>
+        </p:cxnSp>
+        <p:cxnSp>
+          <p:nvCxnSpPr>
+            <p:cNvPr id="5" name="Straight Connector 4">
+              <a:extLst>
+                <a:ext uri="{FF2B5EF4-FFF2-40B4-BE49-F238E27FC236}">
+                  <a16:creationId xmlns:a16="http://schemas.microsoft.com/office/drawing/2014/main" id="{BEA5C3F5-63C6-1B31-0403-0D5ACDEE66BA}"/>
+                </a:ext>
+              </a:extLst>
+            </p:cNvPr>
+            <p:cNvCxnSpPr>
+              <a:cxnSpLocks/>
+            </p:cNvCxnSpPr>
+            <p:nvPr/>
+          </p:nvCxnSpPr>
+          <p:spPr>
+            <a:xfrm flipH="1">
+              <a:off x="2621028" y="3385294"/>
+              <a:ext cx="101900" cy="0"/>
+            </a:xfrm>
+            <a:prstGeom prst="line">
+              <a:avLst/>
+            </a:prstGeom>
+            <a:ln w="76200"/>
+          </p:spPr>
+          <p:style>
+            <a:lnRef idx="3">
+              <a:schemeClr val="accent2"/>
+            </a:lnRef>
+            <a:fillRef idx="0">
+              <a:schemeClr val="accent2"/>
+            </a:fillRef>
+            <a:effectRef idx="2">
+              <a:schemeClr val="accent2"/>
+            </a:effectRef>
+            <a:fontRef idx="minor">
+              <a:schemeClr val="tx1"/>
+            </a:fontRef>
+          </p:style>
+        </p:cxnSp>
+        <p:cxnSp>
+          <p:nvCxnSpPr>
+            <p:cNvPr id="6" name="Straight Connector 5">
+              <a:extLst>
+                <a:ext uri="{FF2B5EF4-FFF2-40B4-BE49-F238E27FC236}">
+                  <a16:creationId xmlns:a16="http://schemas.microsoft.com/office/drawing/2014/main" id="{B32D99E6-8705-C28C-AAA0-F94A2DF5BDFA}"/>
+                </a:ext>
+              </a:extLst>
+            </p:cNvPr>
+            <p:cNvCxnSpPr>
+              <a:cxnSpLocks/>
+            </p:cNvCxnSpPr>
+            <p:nvPr/>
+          </p:nvCxnSpPr>
+          <p:spPr>
+            <a:xfrm>
+              <a:off x="2472567" y="3333581"/>
+              <a:ext cx="0" cy="190837"/>
+            </a:xfrm>
+            <a:prstGeom prst="line">
+              <a:avLst/>
+            </a:prstGeom>
+            <a:ln w="76200"/>
+          </p:spPr>
+          <p:style>
+            <a:lnRef idx="3">
+              <a:schemeClr val="accent2"/>
+            </a:lnRef>
+            <a:fillRef idx="0">
+              <a:schemeClr val="accent2"/>
+            </a:fillRef>
+            <a:effectRef idx="2">
+              <a:schemeClr val="accent2"/>
+            </a:effectRef>
+            <a:fontRef idx="minor">
+              <a:schemeClr val="tx1"/>
+            </a:fontRef>
+          </p:style>
+        </p:cxnSp>
+        <p:cxnSp>
+          <p:nvCxnSpPr>
+            <p:cNvPr id="7" name="Straight Connector 6">
+              <a:extLst>
+                <a:ext uri="{FF2B5EF4-FFF2-40B4-BE49-F238E27FC236}">
+                  <a16:creationId xmlns:a16="http://schemas.microsoft.com/office/drawing/2014/main" id="{D740549B-6069-223E-23C3-026A75324B42}"/>
+                </a:ext>
+              </a:extLst>
+            </p:cNvPr>
+            <p:cNvCxnSpPr>
+              <a:cxnSpLocks/>
+            </p:cNvCxnSpPr>
+            <p:nvPr/>
+          </p:nvCxnSpPr>
+          <p:spPr>
+            <a:xfrm>
+              <a:off x="2690087" y="3333581"/>
+              <a:ext cx="0" cy="190837"/>
+            </a:xfrm>
+            <a:prstGeom prst="line">
+              <a:avLst/>
+            </a:prstGeom>
+            <a:ln w="76200"/>
+          </p:spPr>
+          <p:style>
+            <a:lnRef idx="3">
+              <a:schemeClr val="accent2"/>
+            </a:lnRef>
+            <a:fillRef idx="0">
+              <a:schemeClr val="accent2"/>
+            </a:fillRef>
+            <a:effectRef idx="2">
+              <a:schemeClr val="accent2"/>
+            </a:effectRef>
+            <a:fontRef idx="minor">
+              <a:schemeClr val="tx1"/>
+            </a:fontRef>
+          </p:style>
+        </p:cxnSp>
+        <p:cxnSp>
+          <p:nvCxnSpPr>
+            <p:cNvPr id="8" name="Straight Connector 7">
+              <a:extLst>
+                <a:ext uri="{FF2B5EF4-FFF2-40B4-BE49-F238E27FC236}">
+                  <a16:creationId xmlns:a16="http://schemas.microsoft.com/office/drawing/2014/main" id="{15324755-7C32-B3A8-536E-9050849C5CBD}"/>
+                </a:ext>
+              </a:extLst>
+            </p:cNvPr>
+            <p:cNvCxnSpPr>
+              <a:cxnSpLocks/>
+            </p:cNvCxnSpPr>
+            <p:nvPr/>
+          </p:nvCxnSpPr>
+          <p:spPr>
+            <a:xfrm>
+              <a:off x="2194348" y="3333581"/>
+              <a:ext cx="0" cy="190053"/>
+            </a:xfrm>
+            <a:prstGeom prst="line">
+              <a:avLst/>
+            </a:prstGeom>
+            <a:ln w="76200"/>
+          </p:spPr>
+          <p:style>
+            <a:lnRef idx="3">
+              <a:schemeClr val="accent2"/>
+            </a:lnRef>
+            <a:fillRef idx="0">
+              <a:schemeClr val="accent2"/>
+            </a:fillRef>
+            <a:effectRef idx="2">
+              <a:schemeClr val="accent2"/>
+            </a:effectRef>
+            <a:fontRef idx="minor">
+              <a:schemeClr val="tx1"/>
+            </a:fontRef>
+          </p:style>
+        </p:cxnSp>
+        <p:cxnSp>
+          <p:nvCxnSpPr>
+            <p:cNvPr id="9" name="Straight Connector 8">
+              <a:extLst>
+                <a:ext uri="{FF2B5EF4-FFF2-40B4-BE49-F238E27FC236}">
+                  <a16:creationId xmlns:a16="http://schemas.microsoft.com/office/drawing/2014/main" id="{9210D44F-62CE-DCC1-1CD7-EE569C0FA2F4}"/>
+                </a:ext>
+              </a:extLst>
+            </p:cNvPr>
+            <p:cNvCxnSpPr>
+              <a:cxnSpLocks/>
+            </p:cNvCxnSpPr>
+            <p:nvPr/>
+          </p:nvCxnSpPr>
+          <p:spPr>
+            <a:xfrm>
+              <a:off x="2089171" y="3333582"/>
+              <a:ext cx="0" cy="119679"/>
+            </a:xfrm>
+            <a:prstGeom prst="line">
+              <a:avLst/>
+            </a:prstGeom>
+            <a:ln w="76200"/>
+          </p:spPr>
+          <p:style>
+            <a:lnRef idx="3">
+              <a:schemeClr val="accent2"/>
+            </a:lnRef>
+            <a:fillRef idx="0">
+              <a:schemeClr val="accent2"/>
+            </a:fillRef>
+            <a:effectRef idx="2">
+              <a:schemeClr val="accent2"/>
+            </a:effectRef>
+            <a:fontRef idx="minor">
+              <a:schemeClr val="tx1"/>
+            </a:fontRef>
+          </p:style>
+        </p:cxnSp>
+        <p:cxnSp>
+          <p:nvCxnSpPr>
+            <p:cNvPr id="10" name="Straight Connector 9">
+              <a:extLst>
+                <a:ext uri="{FF2B5EF4-FFF2-40B4-BE49-F238E27FC236}">
+                  <a16:creationId xmlns:a16="http://schemas.microsoft.com/office/drawing/2014/main" id="{7AB48CDB-C3DC-CB74-DB53-F89C30C49446}"/>
+                </a:ext>
+              </a:extLst>
+            </p:cNvPr>
+            <p:cNvCxnSpPr>
+              <a:cxnSpLocks/>
+            </p:cNvCxnSpPr>
+            <p:nvPr/>
+          </p:nvCxnSpPr>
+          <p:spPr>
+            <a:xfrm>
+              <a:off x="1980235" y="3333581"/>
+              <a:ext cx="0" cy="190053"/>
+            </a:xfrm>
+            <a:prstGeom prst="line">
+              <a:avLst/>
+            </a:prstGeom>
+            <a:ln w="76200"/>
+          </p:spPr>
+          <p:style>
+            <a:lnRef idx="3">
+              <a:schemeClr val="accent2"/>
+            </a:lnRef>
+            <a:fillRef idx="0">
+              <a:schemeClr val="accent2"/>
+            </a:fillRef>
+            <a:effectRef idx="2">
+              <a:schemeClr val="accent2"/>
+            </a:effectRef>
+            <a:fontRef idx="minor">
+              <a:schemeClr val="tx1"/>
+            </a:fontRef>
+          </p:style>
+        </p:cxnSp>
+        <p:cxnSp>
+          <p:nvCxnSpPr>
+            <p:cNvPr id="11" name="Straight Connector 10">
+              <a:extLst>
+                <a:ext uri="{FF2B5EF4-FFF2-40B4-BE49-F238E27FC236}">
+                  <a16:creationId xmlns:a16="http://schemas.microsoft.com/office/drawing/2014/main" id="{427DFE30-C4B8-2E20-9BF4-AB13044C7F0B}"/>
+                </a:ext>
+              </a:extLst>
+            </p:cNvPr>
+            <p:cNvCxnSpPr>
+              <a:cxnSpLocks/>
+            </p:cNvCxnSpPr>
+            <p:nvPr/>
+          </p:nvCxnSpPr>
+          <p:spPr>
+            <a:xfrm flipH="1">
+              <a:off x="2258345" y="3523634"/>
+              <a:ext cx="149488" cy="0"/>
+            </a:xfrm>
+            <a:prstGeom prst="line">
+              <a:avLst/>
+            </a:prstGeom>
+            <a:ln w="38100"/>
+          </p:spPr>
+          <p:style>
+            <a:lnRef idx="3">
+              <a:schemeClr val="accent2"/>
+            </a:lnRef>
+            <a:fillRef idx="0">
+              <a:schemeClr val="accent2"/>
+            </a:fillRef>
+            <a:effectRef idx="2">
+              <a:schemeClr val="accent2"/>
+            </a:effectRef>
+            <a:fontRef idx="minor">
+              <a:schemeClr val="tx1"/>
+            </a:fontRef>
+          </p:style>
+        </p:cxnSp>
       </p:grpSp>
     </p:spTree>
     <p:extLst>

</xml_diff>

<commit_message>
-Import tests from different Excel Worksheets OK
</commit_message>
<xml_diff>
--- a/ExaminerB/.appCatalog/ExaminerB notes 1404.pptx
+++ b/ExaminerB/.appCatalog/ExaminerB notes 1404.pptx
@@ -279,7 +279,7 @@
             </a:pPr>
             <a:fld id="{BCC18F51-09EC-435C-A3BA-64A766E099C0}" type="datetimeFigureOut">
               <a:rPr lang="fa-IR"/>
-              <a:t>17/08/1447</a:t>
+              <a:t>18/08/1447</a:t>
             </a:fld>
             <a:endParaRPr/>
           </a:p>
@@ -458,7 +458,7 @@
             </a:pPr>
             <a:fld id="{BCC18F51-09EC-435C-A3BA-64A766E099C0}" type="datetimeFigureOut">
               <a:rPr lang="fa-IR"/>
-              <a:t>17/08/1447</a:t>
+              <a:t>18/08/1447</a:t>
             </a:fld>
             <a:endParaRPr/>
           </a:p>
@@ -647,7 +647,7 @@
             </a:pPr>
             <a:fld id="{BCC18F51-09EC-435C-A3BA-64A766E099C0}" type="datetimeFigureOut">
               <a:rPr lang="fa-IR"/>
-              <a:t>17/08/1447</a:t>
+              <a:t>18/08/1447</a:t>
             </a:fld>
             <a:endParaRPr/>
           </a:p>
@@ -826,7 +826,7 @@
             </a:pPr>
             <a:fld id="{BCC18F51-09EC-435C-A3BA-64A766E099C0}" type="datetimeFigureOut">
               <a:rPr lang="fa-IR"/>
-              <a:t>17/08/1447</a:t>
+              <a:t>18/08/1447</a:t>
             </a:fld>
             <a:endParaRPr/>
           </a:p>
@@ -1078,7 +1078,7 @@
             </a:pPr>
             <a:fld id="{BCC18F51-09EC-435C-A3BA-64A766E099C0}" type="datetimeFigureOut">
               <a:rPr lang="fa-IR"/>
-              <a:t>17/08/1447</a:t>
+              <a:t>18/08/1447</a:t>
             </a:fld>
             <a:endParaRPr/>
           </a:p>
@@ -1323,7 +1323,7 @@
             </a:pPr>
             <a:fld id="{BCC18F51-09EC-435C-A3BA-64A766E099C0}" type="datetimeFigureOut">
               <a:rPr lang="fa-IR"/>
-              <a:t>17/08/1447</a:t>
+              <a:t>18/08/1447</a:t>
             </a:fld>
             <a:endParaRPr/>
           </a:p>
@@ -1705,7 +1705,7 @@
             </a:pPr>
             <a:fld id="{BCC18F51-09EC-435C-A3BA-64A766E099C0}" type="datetimeFigureOut">
               <a:rPr lang="fa-IR"/>
-              <a:t>17/08/1447</a:t>
+              <a:t>18/08/1447</a:t>
             </a:fld>
             <a:endParaRPr/>
           </a:p>
@@ -1828,7 +1828,7 @@
             </a:pPr>
             <a:fld id="{BCC18F51-09EC-435C-A3BA-64A766E099C0}" type="datetimeFigureOut">
               <a:rPr lang="fa-IR"/>
-              <a:t>17/08/1447</a:t>
+              <a:t>18/08/1447</a:t>
             </a:fld>
             <a:endParaRPr/>
           </a:p>
@@ -1927,7 +1927,7 @@
             </a:pPr>
             <a:fld id="{BCC18F51-09EC-435C-A3BA-64A766E099C0}" type="datetimeFigureOut">
               <a:rPr lang="fa-IR"/>
-              <a:t>17/08/1447</a:t>
+              <a:t>18/08/1447</a:t>
             </a:fld>
             <a:endParaRPr/>
           </a:p>
@@ -2214,7 +2214,7 @@
             </a:pPr>
             <a:fld id="{BCC18F51-09EC-435C-A3BA-64A766E099C0}" type="datetimeFigureOut">
               <a:rPr lang="fa-IR"/>
-              <a:t>17/08/1447</a:t>
+              <a:t>18/08/1447</a:t>
             </a:fld>
             <a:endParaRPr/>
           </a:p>
@@ -2478,7 +2478,7 @@
             </a:pPr>
             <a:fld id="{BCC18F51-09EC-435C-A3BA-64A766E099C0}" type="datetimeFigureOut">
               <a:rPr lang="fa-IR"/>
-              <a:t>17/08/1447</a:t>
+              <a:t>18/08/1447</a:t>
             </a:fld>
             <a:endParaRPr/>
           </a:p>
@@ -2700,7 +2700,7 @@
             </a:pPr>
             <a:fld id="{BCC18F51-09EC-435C-A3BA-64A766E099C0}" type="datetimeFigureOut">
               <a:rPr lang="fa-IR"/>
-              <a:t>17/08/1447</a:t>
+              <a:t>18/08/1447</a:t>
             </a:fld>
             <a:endParaRPr/>
           </a:p>
@@ -7688,8 +7688,8 @@
         </p:nvSpPr>
         <p:spPr bwMode="auto">
           <a:xfrm>
-            <a:off x="163013" y="6482272"/>
-            <a:ext cx="1656185" cy="333367"/>
+            <a:off x="56455" y="6482272"/>
+            <a:ext cx="1870695" cy="333367"/>
           </a:xfrm>
           <a:prstGeom prst="borderCallout2">
             <a:avLst>
@@ -7756,7 +7756,7 @@
                 <a:ea typeface="Calibri" panose="020F0502020204030204" pitchFamily="34" charset="0"/>
                 <a:cs typeface="Calibri Light" panose="020F0302020204030204" pitchFamily="34" charset="0"/>
               </a:rPr>
-              <a:t>1:U 2:SP 3:S 4:G 5:C 6:E</a:t>
+              <a:t>1:U 2:SP 3:S 4:G 5:C 6:E 7: SN</a:t>
             </a:r>
           </a:p>
         </p:txBody>
@@ -8095,7 +8095,31 @@
                 <a:ea typeface="Calibri" panose="020F0502020204030204" pitchFamily="34" charset="0"/>
                 <a:cs typeface="Calibri Light" panose="020F0302020204030204" pitchFamily="34" charset="0"/>
               </a:rPr>
-              <a:t>NoteTags 1:rtl 2:done 4:shared 8:readonly 16:S-Note?</a:t>
+              <a:t>NoteTags 1:rtl 2:done 4:shared 8:</a:t>
+            </a:r>
+            <a:r>
+              <a:rPr lang="en-US" sz="800" kern="100">
+                <a:solidFill>
+                  <a:srgbClr val="FF0000"/>
+                </a:solidFill>
+                <a:effectLst/>
+                <a:latin typeface="Consolas" panose="020B0609020204030204" pitchFamily="49" charset="0"/>
+                <a:ea typeface="Calibri" panose="020F0502020204030204" pitchFamily="34" charset="0"/>
+                <a:cs typeface="Calibri Light" panose="020F0302020204030204" pitchFamily="34" charset="0"/>
+              </a:rPr>
+              <a:t>readonly</a:t>
+            </a:r>
+            <a:r>
+              <a:rPr lang="en-US" sz="800" kern="100">
+                <a:solidFill>
+                  <a:schemeClr val="tx1"/>
+                </a:solidFill>
+                <a:effectLst/>
+                <a:latin typeface="Consolas" panose="020B0609020204030204" pitchFamily="49" charset="0"/>
+                <a:ea typeface="Calibri" panose="020F0502020204030204" pitchFamily="34" charset="0"/>
+                <a:cs typeface="Calibri Light" panose="020F0302020204030204" pitchFamily="34" charset="0"/>
+              </a:rPr>
+              <a:t> 16:S-Note?</a:t>
             </a:r>
           </a:p>
         </p:txBody>

</xml_diff>